<commit_message>
Neue version von Alex
</commit_message>
<xml_diff>
--- a/Praktikum_6/Abgabe 6.pptx
+++ b/Praktikum_6/Abgabe 6.pptx
@@ -5,7 +5,7 @@
     <p:sldMasterId id="2147483648" r:id="rId1"/>
   </p:sldMasterIdLst>
   <p:notesMasterIdLst>
-    <p:notesMasterId r:id="rId35"/>
+    <p:notesMasterId r:id="rId36"/>
   </p:notesMasterIdLst>
   <p:sldIdLst>
     <p:sldId id="256" r:id="rId2"/>
@@ -32,15 +32,16 @@
     <p:sldId id="305" r:id="rId23"/>
     <p:sldId id="291" r:id="rId24"/>
     <p:sldId id="309" r:id="rId25"/>
-    <p:sldId id="315" r:id="rId26"/>
-    <p:sldId id="311" r:id="rId27"/>
-    <p:sldId id="314" r:id="rId28"/>
-    <p:sldId id="308" r:id="rId29"/>
-    <p:sldId id="293" r:id="rId30"/>
-    <p:sldId id="312" r:id="rId31"/>
-    <p:sldId id="313" r:id="rId32"/>
-    <p:sldId id="281" r:id="rId33"/>
-    <p:sldId id="277" r:id="rId34"/>
+    <p:sldId id="316" r:id="rId26"/>
+    <p:sldId id="315" r:id="rId27"/>
+    <p:sldId id="311" r:id="rId28"/>
+    <p:sldId id="314" r:id="rId29"/>
+    <p:sldId id="308" r:id="rId30"/>
+    <p:sldId id="293" r:id="rId31"/>
+    <p:sldId id="312" r:id="rId32"/>
+    <p:sldId id="313" r:id="rId33"/>
+    <p:sldId id="281" r:id="rId34"/>
+    <p:sldId id="277" r:id="rId35"/>
   </p:sldIdLst>
   <p:sldSz cx="12192000" cy="6858000"/>
   <p:notesSz cx="6858000" cy="9144000"/>
@@ -1805,7 +1806,7 @@
     </p:spTree>
     <p:extLst>
       <p:ext uri="{BB962C8B-B14F-4D97-AF65-F5344CB8AC3E}">
-        <p14:creationId xmlns:p14="http://schemas.microsoft.com/office/powerpoint/2010/main" val="406160463"/>
+        <p14:creationId xmlns:p14="http://schemas.microsoft.com/office/powerpoint/2010/main" val="1618161514"/>
       </p:ext>
     </p:extLst>
   </p:cSld>
@@ -1889,7 +1890,7 @@
     </p:spTree>
     <p:extLst>
       <p:ext uri="{BB962C8B-B14F-4D97-AF65-F5344CB8AC3E}">
-        <p14:creationId xmlns:p14="http://schemas.microsoft.com/office/powerpoint/2010/main" val="2791557570"/>
+        <p14:creationId xmlns:p14="http://schemas.microsoft.com/office/powerpoint/2010/main" val="406160463"/>
       </p:ext>
     </p:extLst>
   </p:cSld>
@@ -1973,7 +1974,7 @@
     </p:spTree>
     <p:extLst>
       <p:ext uri="{BB962C8B-B14F-4D97-AF65-F5344CB8AC3E}">
-        <p14:creationId xmlns:p14="http://schemas.microsoft.com/office/powerpoint/2010/main" val="4137031017"/>
+        <p14:creationId xmlns:p14="http://schemas.microsoft.com/office/powerpoint/2010/main" val="2791557570"/>
       </p:ext>
     </p:extLst>
   </p:cSld>
@@ -2057,7 +2058,7 @@
     </p:spTree>
     <p:extLst>
       <p:ext uri="{BB962C8B-B14F-4D97-AF65-F5344CB8AC3E}">
-        <p14:creationId xmlns:p14="http://schemas.microsoft.com/office/powerpoint/2010/main" val="544103937"/>
+        <p14:creationId xmlns:p14="http://schemas.microsoft.com/office/powerpoint/2010/main" val="4137031017"/>
       </p:ext>
     </p:extLst>
   </p:cSld>
@@ -2141,7 +2142,7 @@
     </p:spTree>
     <p:extLst>
       <p:ext uri="{BB962C8B-B14F-4D97-AF65-F5344CB8AC3E}">
-        <p14:creationId xmlns:p14="http://schemas.microsoft.com/office/powerpoint/2010/main" val="601079304"/>
+        <p14:creationId xmlns:p14="http://schemas.microsoft.com/office/powerpoint/2010/main" val="544103937"/>
       </p:ext>
     </p:extLst>
   </p:cSld>
@@ -2225,7 +2226,7 @@
     </p:spTree>
     <p:extLst>
       <p:ext uri="{BB962C8B-B14F-4D97-AF65-F5344CB8AC3E}">
-        <p14:creationId xmlns:p14="http://schemas.microsoft.com/office/powerpoint/2010/main" val="3561241889"/>
+        <p14:creationId xmlns:p14="http://schemas.microsoft.com/office/powerpoint/2010/main" val="601079304"/>
       </p:ext>
     </p:extLst>
   </p:cSld>
@@ -2309,7 +2310,7 @@
     </p:spTree>
     <p:extLst>
       <p:ext uri="{BB962C8B-B14F-4D97-AF65-F5344CB8AC3E}">
-        <p14:creationId xmlns:p14="http://schemas.microsoft.com/office/powerpoint/2010/main" val="2116576985"/>
+        <p14:creationId xmlns:p14="http://schemas.microsoft.com/office/powerpoint/2010/main" val="3561241889"/>
       </p:ext>
     </p:extLst>
   </p:cSld>
@@ -2537,6 +2538,90 @@
     </p:spTree>
     <p:extLst>
       <p:ext uri="{BB962C8B-B14F-4D97-AF65-F5344CB8AC3E}">
+        <p14:creationId xmlns:p14="http://schemas.microsoft.com/office/powerpoint/2010/main" val="2116576985"/>
+      </p:ext>
+    </p:extLst>
+  </p:cSld>
+  <p:clrMapOvr>
+    <a:masterClrMapping/>
+  </p:clrMapOvr>
+</p:notes>
+</file>
+
+<file path=ppt/notesSlides/notesSlide31.xml><?xml version="1.0" encoding="utf-8"?>
+<p:notes xmlns:a="http://schemas.openxmlformats.org/drawingml/2006/main" xmlns:r="http://schemas.openxmlformats.org/officeDocument/2006/relationships" xmlns:p="http://schemas.openxmlformats.org/presentationml/2006/main">
+  <p:cSld>
+    <p:spTree>
+      <p:nvGrpSpPr>
+        <p:cNvPr id="1" name=""/>
+        <p:cNvGrpSpPr/>
+        <p:nvPr/>
+      </p:nvGrpSpPr>
+      <p:grpSpPr>
+        <a:xfrm>
+          <a:off x="0" y="0"/>
+          <a:ext cx="0" cy="0"/>
+          <a:chOff x="0" y="0"/>
+          <a:chExt cx="0" cy="0"/>
+        </a:xfrm>
+      </p:grpSpPr>
+      <p:sp>
+        <p:nvSpPr>
+          <p:cNvPr id="2" name="Folienbildplatzhalter 1"/>
+          <p:cNvSpPr>
+            <a:spLocks noGrp="1" noRot="1" noChangeAspect="1"/>
+          </p:cNvSpPr>
+          <p:nvPr>
+            <p:ph type="sldImg"/>
+          </p:nvPr>
+        </p:nvSpPr>
+        <p:spPr/>
+      </p:sp>
+      <p:sp>
+        <p:nvSpPr>
+          <p:cNvPr id="3" name="Notizenplatzhalter 2"/>
+          <p:cNvSpPr>
+            <a:spLocks noGrp="1"/>
+          </p:cNvSpPr>
+          <p:nvPr>
+            <p:ph type="body" idx="1"/>
+          </p:nvPr>
+        </p:nvSpPr>
+        <p:spPr/>
+        <p:txBody>
+          <a:bodyPr/>
+          <a:lstStyle/>
+          <a:p>
+            <a:endParaRPr lang="de-DE" dirty="0"/>
+          </a:p>
+        </p:txBody>
+      </p:sp>
+      <p:sp>
+        <p:nvSpPr>
+          <p:cNvPr id="4" name="Foliennummernplatzhalter 3"/>
+          <p:cNvSpPr>
+            <a:spLocks noGrp="1"/>
+          </p:cNvSpPr>
+          <p:nvPr>
+            <p:ph type="sldNum" sz="quarter" idx="5"/>
+          </p:nvPr>
+        </p:nvSpPr>
+        <p:spPr/>
+        <p:txBody>
+          <a:bodyPr/>
+          <a:lstStyle/>
+          <a:p>
+            <a:fld id="{52267A27-16C0-714D-83C5-54B46B511F52}" type="slidenum">
+              <a:rPr lang="de-DE" smtClean="0"/>
+              <a:t>33</a:t>
+            </a:fld>
+            <a:endParaRPr lang="de-DE"/>
+          </a:p>
+        </p:txBody>
+      </p:sp>
+    </p:spTree>
+    <p:extLst>
+      <p:ext uri="{BB962C8B-B14F-4D97-AF65-F5344CB8AC3E}">
         <p14:creationId xmlns:p14="http://schemas.microsoft.com/office/powerpoint/2010/main" val="2360861896"/>
       </p:ext>
     </p:extLst>
@@ -3114,7 +3199,7 @@
           <p:cNvPr id="2" name="Titel 1">
             <a:extLst>
               <a:ext uri="{FF2B5EF4-FFF2-40B4-BE49-F238E27FC236}">
-                <a16:creationId xmlns:a16="http://schemas.microsoft.com/office/drawing/2014/main" xmlns="" id="{9729E139-B9C1-1343-8D77-54875F0E38E2}"/>
+                <a16:creationId xmlns="" xmlns:a16="http://schemas.microsoft.com/office/drawing/2014/main" id="{9729E139-B9C1-1343-8D77-54875F0E38E2}"/>
               </a:ext>
             </a:extLst>
           </p:cNvPr>
@@ -3151,7 +3236,7 @@
           <p:cNvPr id="3" name="Untertitel 2">
             <a:extLst>
               <a:ext uri="{FF2B5EF4-FFF2-40B4-BE49-F238E27FC236}">
-                <a16:creationId xmlns:a16="http://schemas.microsoft.com/office/drawing/2014/main" xmlns="" id="{CD0DC60B-5925-7245-9AD4-70DD2088C669}"/>
+                <a16:creationId xmlns="" xmlns:a16="http://schemas.microsoft.com/office/drawing/2014/main" id="{CD0DC60B-5925-7245-9AD4-70DD2088C669}"/>
               </a:ext>
             </a:extLst>
           </p:cNvPr>
@@ -3221,7 +3306,7 @@
           <p:cNvPr id="4" name="Datumsplatzhalter 3">
             <a:extLst>
               <a:ext uri="{FF2B5EF4-FFF2-40B4-BE49-F238E27FC236}">
-                <a16:creationId xmlns:a16="http://schemas.microsoft.com/office/drawing/2014/main" xmlns="" id="{48071E95-2AB9-EB43-8B4E-ECA6DA6E4AD5}"/>
+                <a16:creationId xmlns="" xmlns:a16="http://schemas.microsoft.com/office/drawing/2014/main" id="{48071E95-2AB9-EB43-8B4E-ECA6DA6E4AD5}"/>
               </a:ext>
             </a:extLst>
           </p:cNvPr>
@@ -3250,7 +3335,7 @@
           <p:cNvPr id="5" name="Fußzeilenplatzhalter 4">
             <a:extLst>
               <a:ext uri="{FF2B5EF4-FFF2-40B4-BE49-F238E27FC236}">
-                <a16:creationId xmlns:a16="http://schemas.microsoft.com/office/drawing/2014/main" xmlns="" id="{F1BDF94A-7043-F94B-A957-905DCDFD9521}"/>
+                <a16:creationId xmlns="" xmlns:a16="http://schemas.microsoft.com/office/drawing/2014/main" id="{F1BDF94A-7043-F94B-A957-905DCDFD9521}"/>
               </a:ext>
             </a:extLst>
           </p:cNvPr>
@@ -3275,7 +3360,7 @@
           <p:cNvPr id="6" name="Foliennummernplatzhalter 5">
             <a:extLst>
               <a:ext uri="{FF2B5EF4-FFF2-40B4-BE49-F238E27FC236}">
-                <a16:creationId xmlns:a16="http://schemas.microsoft.com/office/drawing/2014/main" xmlns="" id="{32A861AE-5302-CD4F-9C7C-2BFEE23DBE0B}"/>
+                <a16:creationId xmlns="" xmlns:a16="http://schemas.microsoft.com/office/drawing/2014/main" id="{32A861AE-5302-CD4F-9C7C-2BFEE23DBE0B}"/>
               </a:ext>
             </a:extLst>
           </p:cNvPr>
@@ -3334,7 +3419,7 @@
           <p:cNvPr id="2" name="Titel 1">
             <a:extLst>
               <a:ext uri="{FF2B5EF4-FFF2-40B4-BE49-F238E27FC236}">
-                <a16:creationId xmlns:a16="http://schemas.microsoft.com/office/drawing/2014/main" xmlns="" id="{63E0E303-0843-9E43-B4FE-B741D51AF29D}"/>
+                <a16:creationId xmlns="" xmlns:a16="http://schemas.microsoft.com/office/drawing/2014/main" id="{63E0E303-0843-9E43-B4FE-B741D51AF29D}"/>
               </a:ext>
             </a:extLst>
           </p:cNvPr>
@@ -3362,7 +3447,7 @@
           <p:cNvPr id="3" name="Vertikaler Textplatzhalter 2">
             <a:extLst>
               <a:ext uri="{FF2B5EF4-FFF2-40B4-BE49-F238E27FC236}">
-                <a16:creationId xmlns:a16="http://schemas.microsoft.com/office/drawing/2014/main" xmlns="" id="{E389E2A2-C12F-4044-8208-9AC0B7DA7698}"/>
+                <a16:creationId xmlns="" xmlns:a16="http://schemas.microsoft.com/office/drawing/2014/main" id="{E389E2A2-C12F-4044-8208-9AC0B7DA7698}"/>
               </a:ext>
             </a:extLst>
           </p:cNvPr>
@@ -3394,7 +3479,7 @@
           <p:cNvPr id="4" name="Datumsplatzhalter 3">
             <a:extLst>
               <a:ext uri="{FF2B5EF4-FFF2-40B4-BE49-F238E27FC236}">
-                <a16:creationId xmlns:a16="http://schemas.microsoft.com/office/drawing/2014/main" xmlns="" id="{D51E15B6-E46A-6E41-87EF-FB1CB3BE30B6}"/>
+                <a16:creationId xmlns="" xmlns:a16="http://schemas.microsoft.com/office/drawing/2014/main" id="{D51E15B6-E46A-6E41-87EF-FB1CB3BE30B6}"/>
               </a:ext>
             </a:extLst>
           </p:cNvPr>
@@ -3423,7 +3508,7 @@
           <p:cNvPr id="5" name="Fußzeilenplatzhalter 4">
             <a:extLst>
               <a:ext uri="{FF2B5EF4-FFF2-40B4-BE49-F238E27FC236}">
-                <a16:creationId xmlns:a16="http://schemas.microsoft.com/office/drawing/2014/main" xmlns="" id="{0B5FA6FB-9899-E140-BC17-76C683560149}"/>
+                <a16:creationId xmlns="" xmlns:a16="http://schemas.microsoft.com/office/drawing/2014/main" id="{0B5FA6FB-9899-E140-BC17-76C683560149}"/>
               </a:ext>
             </a:extLst>
           </p:cNvPr>
@@ -3448,7 +3533,7 @@
           <p:cNvPr id="6" name="Foliennummernplatzhalter 5">
             <a:extLst>
               <a:ext uri="{FF2B5EF4-FFF2-40B4-BE49-F238E27FC236}">
-                <a16:creationId xmlns:a16="http://schemas.microsoft.com/office/drawing/2014/main" xmlns="" id="{C0350015-ADC1-E74B-8051-43AB5C8B14FC}"/>
+                <a16:creationId xmlns="" xmlns:a16="http://schemas.microsoft.com/office/drawing/2014/main" id="{C0350015-ADC1-E74B-8051-43AB5C8B14FC}"/>
               </a:ext>
             </a:extLst>
           </p:cNvPr>
@@ -3507,7 +3592,7 @@
           <p:cNvPr id="2" name="Vertikaler Titel 1">
             <a:extLst>
               <a:ext uri="{FF2B5EF4-FFF2-40B4-BE49-F238E27FC236}">
-                <a16:creationId xmlns:a16="http://schemas.microsoft.com/office/drawing/2014/main" xmlns="" id="{CD5514F9-5F1A-1849-BD9D-42DE2B7A8602}"/>
+                <a16:creationId xmlns="" xmlns:a16="http://schemas.microsoft.com/office/drawing/2014/main" id="{CD5514F9-5F1A-1849-BD9D-42DE2B7A8602}"/>
               </a:ext>
             </a:extLst>
           </p:cNvPr>
@@ -3540,7 +3625,7 @@
           <p:cNvPr id="3" name="Vertikaler Textplatzhalter 2">
             <a:extLst>
               <a:ext uri="{FF2B5EF4-FFF2-40B4-BE49-F238E27FC236}">
-                <a16:creationId xmlns:a16="http://schemas.microsoft.com/office/drawing/2014/main" xmlns="" id="{3BF2A873-5EA8-CB4C-AE0C-2BA2237C50DB}"/>
+                <a16:creationId xmlns="" xmlns:a16="http://schemas.microsoft.com/office/drawing/2014/main" id="{3BF2A873-5EA8-CB4C-AE0C-2BA2237C50DB}"/>
               </a:ext>
             </a:extLst>
           </p:cNvPr>
@@ -3577,7 +3662,7 @@
           <p:cNvPr id="4" name="Datumsplatzhalter 3">
             <a:extLst>
               <a:ext uri="{FF2B5EF4-FFF2-40B4-BE49-F238E27FC236}">
-                <a16:creationId xmlns:a16="http://schemas.microsoft.com/office/drawing/2014/main" xmlns="" id="{7CF35C86-7F7F-7D4A-9E5E-691310FDB770}"/>
+                <a16:creationId xmlns="" xmlns:a16="http://schemas.microsoft.com/office/drawing/2014/main" id="{7CF35C86-7F7F-7D4A-9E5E-691310FDB770}"/>
               </a:ext>
             </a:extLst>
           </p:cNvPr>
@@ -3606,7 +3691,7 @@
           <p:cNvPr id="5" name="Fußzeilenplatzhalter 4">
             <a:extLst>
               <a:ext uri="{FF2B5EF4-FFF2-40B4-BE49-F238E27FC236}">
-                <a16:creationId xmlns:a16="http://schemas.microsoft.com/office/drawing/2014/main" xmlns="" id="{3F495B2B-E913-4740-9EBA-30653E27DE50}"/>
+                <a16:creationId xmlns="" xmlns:a16="http://schemas.microsoft.com/office/drawing/2014/main" id="{3F495B2B-E913-4740-9EBA-30653E27DE50}"/>
               </a:ext>
             </a:extLst>
           </p:cNvPr>
@@ -3631,7 +3716,7 @@
           <p:cNvPr id="6" name="Foliennummernplatzhalter 5">
             <a:extLst>
               <a:ext uri="{FF2B5EF4-FFF2-40B4-BE49-F238E27FC236}">
-                <a16:creationId xmlns:a16="http://schemas.microsoft.com/office/drawing/2014/main" xmlns="" id="{1B917D15-5200-3A4B-932D-A97B10281BDC}"/>
+                <a16:creationId xmlns="" xmlns:a16="http://schemas.microsoft.com/office/drawing/2014/main" id="{1B917D15-5200-3A4B-932D-A97B10281BDC}"/>
               </a:ext>
             </a:extLst>
           </p:cNvPr>
@@ -3690,7 +3775,7 @@
           <p:cNvPr id="2" name="Titel 1">
             <a:extLst>
               <a:ext uri="{FF2B5EF4-FFF2-40B4-BE49-F238E27FC236}">
-                <a16:creationId xmlns:a16="http://schemas.microsoft.com/office/drawing/2014/main" xmlns="" id="{D905D12F-79BE-CD41-9F97-DD37C1750845}"/>
+                <a16:creationId xmlns="" xmlns:a16="http://schemas.microsoft.com/office/drawing/2014/main" id="{D905D12F-79BE-CD41-9F97-DD37C1750845}"/>
               </a:ext>
             </a:extLst>
           </p:cNvPr>
@@ -3718,7 +3803,7 @@
           <p:cNvPr id="3" name="Inhaltsplatzhalter 2">
             <a:extLst>
               <a:ext uri="{FF2B5EF4-FFF2-40B4-BE49-F238E27FC236}">
-                <a16:creationId xmlns:a16="http://schemas.microsoft.com/office/drawing/2014/main" xmlns="" id="{D8957224-0D0D-7746-BCBD-E4F8208E8E10}"/>
+                <a16:creationId xmlns="" xmlns:a16="http://schemas.microsoft.com/office/drawing/2014/main" id="{D8957224-0D0D-7746-BCBD-E4F8208E8E10}"/>
               </a:ext>
             </a:extLst>
           </p:cNvPr>
@@ -3750,7 +3835,7 @@
           <p:cNvPr id="4" name="Datumsplatzhalter 3">
             <a:extLst>
               <a:ext uri="{FF2B5EF4-FFF2-40B4-BE49-F238E27FC236}">
-                <a16:creationId xmlns:a16="http://schemas.microsoft.com/office/drawing/2014/main" xmlns="" id="{0B4E4D52-5024-2A4E-8037-AED189B9E264}"/>
+                <a16:creationId xmlns="" xmlns:a16="http://schemas.microsoft.com/office/drawing/2014/main" id="{0B4E4D52-5024-2A4E-8037-AED189B9E264}"/>
               </a:ext>
             </a:extLst>
           </p:cNvPr>
@@ -3779,7 +3864,7 @@
           <p:cNvPr id="5" name="Fußzeilenplatzhalter 4">
             <a:extLst>
               <a:ext uri="{FF2B5EF4-FFF2-40B4-BE49-F238E27FC236}">
-                <a16:creationId xmlns:a16="http://schemas.microsoft.com/office/drawing/2014/main" xmlns="" id="{12897E99-FDA3-BF4B-86A3-95486763DDF9}"/>
+                <a16:creationId xmlns="" xmlns:a16="http://schemas.microsoft.com/office/drawing/2014/main" id="{12897E99-FDA3-BF4B-86A3-95486763DDF9}"/>
               </a:ext>
             </a:extLst>
           </p:cNvPr>
@@ -3804,7 +3889,7 @@
           <p:cNvPr id="6" name="Foliennummernplatzhalter 5">
             <a:extLst>
               <a:ext uri="{FF2B5EF4-FFF2-40B4-BE49-F238E27FC236}">
-                <a16:creationId xmlns:a16="http://schemas.microsoft.com/office/drawing/2014/main" xmlns="" id="{EE1AA7CD-B421-C740-8D36-D478D7689E50}"/>
+                <a16:creationId xmlns="" xmlns:a16="http://schemas.microsoft.com/office/drawing/2014/main" id="{EE1AA7CD-B421-C740-8D36-D478D7689E50}"/>
               </a:ext>
             </a:extLst>
           </p:cNvPr>
@@ -3863,7 +3948,7 @@
           <p:cNvPr id="2" name="Titel 1">
             <a:extLst>
               <a:ext uri="{FF2B5EF4-FFF2-40B4-BE49-F238E27FC236}">
-                <a16:creationId xmlns:a16="http://schemas.microsoft.com/office/drawing/2014/main" xmlns="" id="{0A061298-7A62-2F4C-B6A3-0A8BB714DFA3}"/>
+                <a16:creationId xmlns="" xmlns:a16="http://schemas.microsoft.com/office/drawing/2014/main" id="{0A061298-7A62-2F4C-B6A3-0A8BB714DFA3}"/>
               </a:ext>
             </a:extLst>
           </p:cNvPr>
@@ -3900,7 +3985,7 @@
           <p:cNvPr id="3" name="Textplatzhalter 2">
             <a:extLst>
               <a:ext uri="{FF2B5EF4-FFF2-40B4-BE49-F238E27FC236}">
-                <a16:creationId xmlns:a16="http://schemas.microsoft.com/office/drawing/2014/main" xmlns="" id="{EF880BAB-4A8A-F247-B79A-5FB85578A25C}"/>
+                <a16:creationId xmlns="" xmlns:a16="http://schemas.microsoft.com/office/drawing/2014/main" id="{EF880BAB-4A8A-F247-B79A-5FB85578A25C}"/>
               </a:ext>
             </a:extLst>
           </p:cNvPr>
@@ -4028,7 +4113,7 @@
           <p:cNvPr id="4" name="Datumsplatzhalter 3">
             <a:extLst>
               <a:ext uri="{FF2B5EF4-FFF2-40B4-BE49-F238E27FC236}">
-                <a16:creationId xmlns:a16="http://schemas.microsoft.com/office/drawing/2014/main" xmlns="" id="{5C1CF969-A856-B443-84E7-5170F0482FB6}"/>
+                <a16:creationId xmlns="" xmlns:a16="http://schemas.microsoft.com/office/drawing/2014/main" id="{5C1CF969-A856-B443-84E7-5170F0482FB6}"/>
               </a:ext>
             </a:extLst>
           </p:cNvPr>
@@ -4057,7 +4142,7 @@
           <p:cNvPr id="5" name="Fußzeilenplatzhalter 4">
             <a:extLst>
               <a:ext uri="{FF2B5EF4-FFF2-40B4-BE49-F238E27FC236}">
-                <a16:creationId xmlns:a16="http://schemas.microsoft.com/office/drawing/2014/main" xmlns="" id="{A8270CB1-A61B-984D-BC84-AC4F045BD50C}"/>
+                <a16:creationId xmlns="" xmlns:a16="http://schemas.microsoft.com/office/drawing/2014/main" id="{A8270CB1-A61B-984D-BC84-AC4F045BD50C}"/>
               </a:ext>
             </a:extLst>
           </p:cNvPr>
@@ -4082,7 +4167,7 @@
           <p:cNvPr id="6" name="Foliennummernplatzhalter 5">
             <a:extLst>
               <a:ext uri="{FF2B5EF4-FFF2-40B4-BE49-F238E27FC236}">
-                <a16:creationId xmlns:a16="http://schemas.microsoft.com/office/drawing/2014/main" xmlns="" id="{FCECD375-628F-DA42-A831-7F718D0EB176}"/>
+                <a16:creationId xmlns="" xmlns:a16="http://schemas.microsoft.com/office/drawing/2014/main" id="{FCECD375-628F-DA42-A831-7F718D0EB176}"/>
               </a:ext>
             </a:extLst>
           </p:cNvPr>
@@ -4141,7 +4226,7 @@
           <p:cNvPr id="2" name="Titel 1">
             <a:extLst>
               <a:ext uri="{FF2B5EF4-FFF2-40B4-BE49-F238E27FC236}">
-                <a16:creationId xmlns:a16="http://schemas.microsoft.com/office/drawing/2014/main" xmlns="" id="{80E4E4B0-260E-644D-B091-8D4ECF7CC9B0}"/>
+                <a16:creationId xmlns="" xmlns:a16="http://schemas.microsoft.com/office/drawing/2014/main" id="{80E4E4B0-260E-644D-B091-8D4ECF7CC9B0}"/>
               </a:ext>
             </a:extLst>
           </p:cNvPr>
@@ -4169,7 +4254,7 @@
           <p:cNvPr id="3" name="Inhaltsplatzhalter 2">
             <a:extLst>
               <a:ext uri="{FF2B5EF4-FFF2-40B4-BE49-F238E27FC236}">
-                <a16:creationId xmlns:a16="http://schemas.microsoft.com/office/drawing/2014/main" xmlns="" id="{61D23B07-CED5-CA4E-87AD-D2D5FACA2F01}"/>
+                <a16:creationId xmlns="" xmlns:a16="http://schemas.microsoft.com/office/drawing/2014/main" id="{61D23B07-CED5-CA4E-87AD-D2D5FACA2F01}"/>
               </a:ext>
             </a:extLst>
           </p:cNvPr>
@@ -4206,7 +4291,7 @@
           <p:cNvPr id="4" name="Inhaltsplatzhalter 3">
             <a:extLst>
               <a:ext uri="{FF2B5EF4-FFF2-40B4-BE49-F238E27FC236}">
-                <a16:creationId xmlns:a16="http://schemas.microsoft.com/office/drawing/2014/main" xmlns="" id="{EC933EF0-6705-964F-A423-C4CD1C51F0E3}"/>
+                <a16:creationId xmlns="" xmlns:a16="http://schemas.microsoft.com/office/drawing/2014/main" id="{EC933EF0-6705-964F-A423-C4CD1C51F0E3}"/>
               </a:ext>
             </a:extLst>
           </p:cNvPr>
@@ -4243,7 +4328,7 @@
           <p:cNvPr id="5" name="Datumsplatzhalter 4">
             <a:extLst>
               <a:ext uri="{FF2B5EF4-FFF2-40B4-BE49-F238E27FC236}">
-                <a16:creationId xmlns:a16="http://schemas.microsoft.com/office/drawing/2014/main" xmlns="" id="{4007FD09-99BE-0B4F-877F-711C21654352}"/>
+                <a16:creationId xmlns="" xmlns:a16="http://schemas.microsoft.com/office/drawing/2014/main" id="{4007FD09-99BE-0B4F-877F-711C21654352}"/>
               </a:ext>
             </a:extLst>
           </p:cNvPr>
@@ -4272,7 +4357,7 @@
           <p:cNvPr id="6" name="Fußzeilenplatzhalter 5">
             <a:extLst>
               <a:ext uri="{FF2B5EF4-FFF2-40B4-BE49-F238E27FC236}">
-                <a16:creationId xmlns:a16="http://schemas.microsoft.com/office/drawing/2014/main" xmlns="" id="{25A4E2E0-2F8B-664C-A019-87A33C679F04}"/>
+                <a16:creationId xmlns="" xmlns:a16="http://schemas.microsoft.com/office/drawing/2014/main" id="{25A4E2E0-2F8B-664C-A019-87A33C679F04}"/>
               </a:ext>
             </a:extLst>
           </p:cNvPr>
@@ -4297,7 +4382,7 @@
           <p:cNvPr id="7" name="Foliennummernplatzhalter 6">
             <a:extLst>
               <a:ext uri="{FF2B5EF4-FFF2-40B4-BE49-F238E27FC236}">
-                <a16:creationId xmlns:a16="http://schemas.microsoft.com/office/drawing/2014/main" xmlns="" id="{A5C35ABB-E1A2-344E-A2AE-FB7DB3DB6E4D}"/>
+                <a16:creationId xmlns="" xmlns:a16="http://schemas.microsoft.com/office/drawing/2014/main" id="{A5C35ABB-E1A2-344E-A2AE-FB7DB3DB6E4D}"/>
               </a:ext>
             </a:extLst>
           </p:cNvPr>
@@ -4356,7 +4441,7 @@
           <p:cNvPr id="2" name="Titel 1">
             <a:extLst>
               <a:ext uri="{FF2B5EF4-FFF2-40B4-BE49-F238E27FC236}">
-                <a16:creationId xmlns:a16="http://schemas.microsoft.com/office/drawing/2014/main" xmlns="" id="{90A92756-B025-954F-BB8C-31EAF4F45171}"/>
+                <a16:creationId xmlns="" xmlns:a16="http://schemas.microsoft.com/office/drawing/2014/main" id="{90A92756-B025-954F-BB8C-31EAF4F45171}"/>
               </a:ext>
             </a:extLst>
           </p:cNvPr>
@@ -4389,7 +4474,7 @@
           <p:cNvPr id="3" name="Textplatzhalter 2">
             <a:extLst>
               <a:ext uri="{FF2B5EF4-FFF2-40B4-BE49-F238E27FC236}">
-                <a16:creationId xmlns:a16="http://schemas.microsoft.com/office/drawing/2014/main" xmlns="" id="{497B8FA7-E40E-E04D-8E82-8D25D0FE009D}"/>
+                <a16:creationId xmlns="" xmlns:a16="http://schemas.microsoft.com/office/drawing/2014/main" id="{497B8FA7-E40E-E04D-8E82-8D25D0FE009D}"/>
               </a:ext>
             </a:extLst>
           </p:cNvPr>
@@ -4463,7 +4548,7 @@
           <p:cNvPr id="4" name="Inhaltsplatzhalter 3">
             <a:extLst>
               <a:ext uri="{FF2B5EF4-FFF2-40B4-BE49-F238E27FC236}">
-                <a16:creationId xmlns:a16="http://schemas.microsoft.com/office/drawing/2014/main" xmlns="" id="{9DB891E8-89E7-8D44-827F-D9B3C359A443}"/>
+                <a16:creationId xmlns="" xmlns:a16="http://schemas.microsoft.com/office/drawing/2014/main" id="{9DB891E8-89E7-8D44-827F-D9B3C359A443}"/>
               </a:ext>
             </a:extLst>
           </p:cNvPr>
@@ -4500,7 +4585,7 @@
           <p:cNvPr id="5" name="Textplatzhalter 4">
             <a:extLst>
               <a:ext uri="{FF2B5EF4-FFF2-40B4-BE49-F238E27FC236}">
-                <a16:creationId xmlns:a16="http://schemas.microsoft.com/office/drawing/2014/main" xmlns="" id="{C4A992B5-BEA7-864F-B9A3-B0D6EC89AEB3}"/>
+                <a16:creationId xmlns="" xmlns:a16="http://schemas.microsoft.com/office/drawing/2014/main" id="{C4A992B5-BEA7-864F-B9A3-B0D6EC89AEB3}"/>
               </a:ext>
             </a:extLst>
           </p:cNvPr>
@@ -4574,7 +4659,7 @@
           <p:cNvPr id="6" name="Inhaltsplatzhalter 5">
             <a:extLst>
               <a:ext uri="{FF2B5EF4-FFF2-40B4-BE49-F238E27FC236}">
-                <a16:creationId xmlns:a16="http://schemas.microsoft.com/office/drawing/2014/main" xmlns="" id="{C6F24F96-7021-F04D-BE0C-70D6C357A6AE}"/>
+                <a16:creationId xmlns="" xmlns:a16="http://schemas.microsoft.com/office/drawing/2014/main" id="{C6F24F96-7021-F04D-BE0C-70D6C357A6AE}"/>
               </a:ext>
             </a:extLst>
           </p:cNvPr>
@@ -4611,7 +4696,7 @@
           <p:cNvPr id="7" name="Datumsplatzhalter 6">
             <a:extLst>
               <a:ext uri="{FF2B5EF4-FFF2-40B4-BE49-F238E27FC236}">
-                <a16:creationId xmlns:a16="http://schemas.microsoft.com/office/drawing/2014/main" xmlns="" id="{BE8C1B9C-6184-CB4E-998F-A480AA5D43AB}"/>
+                <a16:creationId xmlns="" xmlns:a16="http://schemas.microsoft.com/office/drawing/2014/main" id="{BE8C1B9C-6184-CB4E-998F-A480AA5D43AB}"/>
               </a:ext>
             </a:extLst>
           </p:cNvPr>
@@ -4640,7 +4725,7 @@
           <p:cNvPr id="8" name="Fußzeilenplatzhalter 7">
             <a:extLst>
               <a:ext uri="{FF2B5EF4-FFF2-40B4-BE49-F238E27FC236}">
-                <a16:creationId xmlns:a16="http://schemas.microsoft.com/office/drawing/2014/main" xmlns="" id="{99C2775A-AE5F-FB42-B461-4A3C859181DF}"/>
+                <a16:creationId xmlns="" xmlns:a16="http://schemas.microsoft.com/office/drawing/2014/main" id="{99C2775A-AE5F-FB42-B461-4A3C859181DF}"/>
               </a:ext>
             </a:extLst>
           </p:cNvPr>
@@ -4665,7 +4750,7 @@
           <p:cNvPr id="9" name="Foliennummernplatzhalter 8">
             <a:extLst>
               <a:ext uri="{FF2B5EF4-FFF2-40B4-BE49-F238E27FC236}">
-                <a16:creationId xmlns:a16="http://schemas.microsoft.com/office/drawing/2014/main" xmlns="" id="{9E7E469E-F8E9-864F-8754-123A6C0AF0FA}"/>
+                <a16:creationId xmlns="" xmlns:a16="http://schemas.microsoft.com/office/drawing/2014/main" id="{9E7E469E-F8E9-864F-8754-123A6C0AF0FA}"/>
               </a:ext>
             </a:extLst>
           </p:cNvPr>
@@ -4724,7 +4809,7 @@
           <p:cNvPr id="2" name="Titel 1">
             <a:extLst>
               <a:ext uri="{FF2B5EF4-FFF2-40B4-BE49-F238E27FC236}">
-                <a16:creationId xmlns:a16="http://schemas.microsoft.com/office/drawing/2014/main" xmlns="" id="{27B83529-C5C5-D144-9F6A-C5D11E437C82}"/>
+                <a16:creationId xmlns="" xmlns:a16="http://schemas.microsoft.com/office/drawing/2014/main" id="{27B83529-C5C5-D144-9F6A-C5D11E437C82}"/>
               </a:ext>
             </a:extLst>
           </p:cNvPr>
@@ -4752,7 +4837,7 @@
           <p:cNvPr id="3" name="Datumsplatzhalter 2">
             <a:extLst>
               <a:ext uri="{FF2B5EF4-FFF2-40B4-BE49-F238E27FC236}">
-                <a16:creationId xmlns:a16="http://schemas.microsoft.com/office/drawing/2014/main" xmlns="" id="{74D3C6F4-02B6-A540-A96A-C806AF1D7567}"/>
+                <a16:creationId xmlns="" xmlns:a16="http://schemas.microsoft.com/office/drawing/2014/main" id="{74D3C6F4-02B6-A540-A96A-C806AF1D7567}"/>
               </a:ext>
             </a:extLst>
           </p:cNvPr>
@@ -4781,7 +4866,7 @@
           <p:cNvPr id="4" name="Fußzeilenplatzhalter 3">
             <a:extLst>
               <a:ext uri="{FF2B5EF4-FFF2-40B4-BE49-F238E27FC236}">
-                <a16:creationId xmlns:a16="http://schemas.microsoft.com/office/drawing/2014/main" xmlns="" id="{4B864B59-4F52-AC41-9BF9-9DF815F6F997}"/>
+                <a16:creationId xmlns="" xmlns:a16="http://schemas.microsoft.com/office/drawing/2014/main" id="{4B864B59-4F52-AC41-9BF9-9DF815F6F997}"/>
               </a:ext>
             </a:extLst>
           </p:cNvPr>
@@ -4806,7 +4891,7 @@
           <p:cNvPr id="5" name="Foliennummernplatzhalter 4">
             <a:extLst>
               <a:ext uri="{FF2B5EF4-FFF2-40B4-BE49-F238E27FC236}">
-                <a16:creationId xmlns:a16="http://schemas.microsoft.com/office/drawing/2014/main" xmlns="" id="{71CB689E-DE78-C74D-AB5B-8D48ABB7E879}"/>
+                <a16:creationId xmlns="" xmlns:a16="http://schemas.microsoft.com/office/drawing/2014/main" id="{71CB689E-DE78-C74D-AB5B-8D48ABB7E879}"/>
               </a:ext>
             </a:extLst>
           </p:cNvPr>
@@ -4865,7 +4950,7 @@
           <p:cNvPr id="2" name="Datumsplatzhalter 1">
             <a:extLst>
               <a:ext uri="{FF2B5EF4-FFF2-40B4-BE49-F238E27FC236}">
-                <a16:creationId xmlns:a16="http://schemas.microsoft.com/office/drawing/2014/main" xmlns="" id="{5BC291DB-90BD-9241-99D8-1F5124577947}"/>
+                <a16:creationId xmlns="" xmlns:a16="http://schemas.microsoft.com/office/drawing/2014/main" id="{5BC291DB-90BD-9241-99D8-1F5124577947}"/>
               </a:ext>
             </a:extLst>
           </p:cNvPr>
@@ -4894,7 +4979,7 @@
           <p:cNvPr id="3" name="Fußzeilenplatzhalter 2">
             <a:extLst>
               <a:ext uri="{FF2B5EF4-FFF2-40B4-BE49-F238E27FC236}">
-                <a16:creationId xmlns:a16="http://schemas.microsoft.com/office/drawing/2014/main" xmlns="" id="{4E7EC7FC-159A-C44F-876B-3776F19A851A}"/>
+                <a16:creationId xmlns="" xmlns:a16="http://schemas.microsoft.com/office/drawing/2014/main" id="{4E7EC7FC-159A-C44F-876B-3776F19A851A}"/>
               </a:ext>
             </a:extLst>
           </p:cNvPr>
@@ -4919,7 +5004,7 @@
           <p:cNvPr id="4" name="Foliennummernplatzhalter 3">
             <a:extLst>
               <a:ext uri="{FF2B5EF4-FFF2-40B4-BE49-F238E27FC236}">
-                <a16:creationId xmlns:a16="http://schemas.microsoft.com/office/drawing/2014/main" xmlns="" id="{1DB2D74F-318D-EE4A-9108-D8BB5459A64E}"/>
+                <a16:creationId xmlns="" xmlns:a16="http://schemas.microsoft.com/office/drawing/2014/main" id="{1DB2D74F-318D-EE4A-9108-D8BB5459A64E}"/>
               </a:ext>
             </a:extLst>
           </p:cNvPr>
@@ -4978,7 +5063,7 @@
           <p:cNvPr id="2" name="Titel 1">
             <a:extLst>
               <a:ext uri="{FF2B5EF4-FFF2-40B4-BE49-F238E27FC236}">
-                <a16:creationId xmlns:a16="http://schemas.microsoft.com/office/drawing/2014/main" xmlns="" id="{1F503ED0-8A44-D44C-8A18-A34E562AAAB3}"/>
+                <a16:creationId xmlns="" xmlns:a16="http://schemas.microsoft.com/office/drawing/2014/main" id="{1F503ED0-8A44-D44C-8A18-A34E562AAAB3}"/>
               </a:ext>
             </a:extLst>
           </p:cNvPr>
@@ -5015,7 +5100,7 @@
           <p:cNvPr id="3" name="Inhaltsplatzhalter 2">
             <a:extLst>
               <a:ext uri="{FF2B5EF4-FFF2-40B4-BE49-F238E27FC236}">
-                <a16:creationId xmlns:a16="http://schemas.microsoft.com/office/drawing/2014/main" xmlns="" id="{D3932178-D92F-7848-9D38-3F69B5D68A5F}"/>
+                <a16:creationId xmlns="" xmlns:a16="http://schemas.microsoft.com/office/drawing/2014/main" id="{D3932178-D92F-7848-9D38-3F69B5D68A5F}"/>
               </a:ext>
             </a:extLst>
           </p:cNvPr>
@@ -5080,7 +5165,7 @@
           <p:cNvPr id="4" name="Textplatzhalter 3">
             <a:extLst>
               <a:ext uri="{FF2B5EF4-FFF2-40B4-BE49-F238E27FC236}">
-                <a16:creationId xmlns:a16="http://schemas.microsoft.com/office/drawing/2014/main" xmlns="" id="{5C6AA2F8-50ED-3647-AEA1-E34559135061}"/>
+                <a16:creationId xmlns="" xmlns:a16="http://schemas.microsoft.com/office/drawing/2014/main" id="{5C6AA2F8-50ED-3647-AEA1-E34559135061}"/>
               </a:ext>
             </a:extLst>
           </p:cNvPr>
@@ -5154,7 +5239,7 @@
           <p:cNvPr id="5" name="Datumsplatzhalter 4">
             <a:extLst>
               <a:ext uri="{FF2B5EF4-FFF2-40B4-BE49-F238E27FC236}">
-                <a16:creationId xmlns:a16="http://schemas.microsoft.com/office/drawing/2014/main" xmlns="" id="{BC5543C1-9669-C64B-9EBE-5E94B1E17274}"/>
+                <a16:creationId xmlns="" xmlns:a16="http://schemas.microsoft.com/office/drawing/2014/main" id="{BC5543C1-9669-C64B-9EBE-5E94B1E17274}"/>
               </a:ext>
             </a:extLst>
           </p:cNvPr>
@@ -5183,7 +5268,7 @@
           <p:cNvPr id="6" name="Fußzeilenplatzhalter 5">
             <a:extLst>
               <a:ext uri="{FF2B5EF4-FFF2-40B4-BE49-F238E27FC236}">
-                <a16:creationId xmlns:a16="http://schemas.microsoft.com/office/drawing/2014/main" xmlns="" id="{54557C59-F283-944A-816A-C03DD83F3A97}"/>
+                <a16:creationId xmlns="" xmlns:a16="http://schemas.microsoft.com/office/drawing/2014/main" id="{54557C59-F283-944A-816A-C03DD83F3A97}"/>
               </a:ext>
             </a:extLst>
           </p:cNvPr>
@@ -5208,7 +5293,7 @@
           <p:cNvPr id="7" name="Foliennummernplatzhalter 6">
             <a:extLst>
               <a:ext uri="{FF2B5EF4-FFF2-40B4-BE49-F238E27FC236}">
-                <a16:creationId xmlns:a16="http://schemas.microsoft.com/office/drawing/2014/main" xmlns="" id="{6179C710-E331-EE4C-93AE-08FB8966BF32}"/>
+                <a16:creationId xmlns="" xmlns:a16="http://schemas.microsoft.com/office/drawing/2014/main" id="{6179C710-E331-EE4C-93AE-08FB8966BF32}"/>
               </a:ext>
             </a:extLst>
           </p:cNvPr>
@@ -5267,7 +5352,7 @@
           <p:cNvPr id="2" name="Titel 1">
             <a:extLst>
               <a:ext uri="{FF2B5EF4-FFF2-40B4-BE49-F238E27FC236}">
-                <a16:creationId xmlns:a16="http://schemas.microsoft.com/office/drawing/2014/main" xmlns="" id="{AD2ECE74-C933-E44E-95B1-F16000E13C95}"/>
+                <a16:creationId xmlns="" xmlns:a16="http://schemas.microsoft.com/office/drawing/2014/main" id="{AD2ECE74-C933-E44E-95B1-F16000E13C95}"/>
               </a:ext>
             </a:extLst>
           </p:cNvPr>
@@ -5304,7 +5389,7 @@
           <p:cNvPr id="3" name="Bildplatzhalter 2">
             <a:extLst>
               <a:ext uri="{FF2B5EF4-FFF2-40B4-BE49-F238E27FC236}">
-                <a16:creationId xmlns:a16="http://schemas.microsoft.com/office/drawing/2014/main" xmlns="" id="{03FEF7E5-F3DF-5141-83FE-98C75B214B39}"/>
+                <a16:creationId xmlns="" xmlns:a16="http://schemas.microsoft.com/office/drawing/2014/main" id="{03FEF7E5-F3DF-5141-83FE-98C75B214B39}"/>
               </a:ext>
             </a:extLst>
           </p:cNvPr>
@@ -5371,7 +5456,7 @@
           <p:cNvPr id="4" name="Textplatzhalter 3">
             <a:extLst>
               <a:ext uri="{FF2B5EF4-FFF2-40B4-BE49-F238E27FC236}">
-                <a16:creationId xmlns:a16="http://schemas.microsoft.com/office/drawing/2014/main" xmlns="" id="{6CB8AA1C-0014-1E4C-94BD-C32414268D3A}"/>
+                <a16:creationId xmlns="" xmlns:a16="http://schemas.microsoft.com/office/drawing/2014/main" id="{6CB8AA1C-0014-1E4C-94BD-C32414268D3A}"/>
               </a:ext>
             </a:extLst>
           </p:cNvPr>
@@ -5445,7 +5530,7 @@
           <p:cNvPr id="5" name="Datumsplatzhalter 4">
             <a:extLst>
               <a:ext uri="{FF2B5EF4-FFF2-40B4-BE49-F238E27FC236}">
-                <a16:creationId xmlns:a16="http://schemas.microsoft.com/office/drawing/2014/main" xmlns="" id="{3E12F7FF-A4AE-0749-83D0-9E8694912287}"/>
+                <a16:creationId xmlns="" xmlns:a16="http://schemas.microsoft.com/office/drawing/2014/main" id="{3E12F7FF-A4AE-0749-83D0-9E8694912287}"/>
               </a:ext>
             </a:extLst>
           </p:cNvPr>
@@ -5474,7 +5559,7 @@
           <p:cNvPr id="6" name="Fußzeilenplatzhalter 5">
             <a:extLst>
               <a:ext uri="{FF2B5EF4-FFF2-40B4-BE49-F238E27FC236}">
-                <a16:creationId xmlns:a16="http://schemas.microsoft.com/office/drawing/2014/main" xmlns="" id="{0F1B4690-838E-E14E-B13F-D7C19E602E64}"/>
+                <a16:creationId xmlns="" xmlns:a16="http://schemas.microsoft.com/office/drawing/2014/main" id="{0F1B4690-838E-E14E-B13F-D7C19E602E64}"/>
               </a:ext>
             </a:extLst>
           </p:cNvPr>
@@ -5499,7 +5584,7 @@
           <p:cNvPr id="7" name="Foliennummernplatzhalter 6">
             <a:extLst>
               <a:ext uri="{FF2B5EF4-FFF2-40B4-BE49-F238E27FC236}">
-                <a16:creationId xmlns:a16="http://schemas.microsoft.com/office/drawing/2014/main" xmlns="" id="{7A8D8463-A954-6748-9879-ADC8AF02B50D}"/>
+                <a16:creationId xmlns="" xmlns:a16="http://schemas.microsoft.com/office/drawing/2014/main" id="{7A8D8463-A954-6748-9879-ADC8AF02B50D}"/>
               </a:ext>
             </a:extLst>
           </p:cNvPr>
@@ -5566,7 +5651,7 @@
           <p:cNvPr id="2" name="Titelplatzhalter 1">
             <a:extLst>
               <a:ext uri="{FF2B5EF4-FFF2-40B4-BE49-F238E27FC236}">
-                <a16:creationId xmlns:a16="http://schemas.microsoft.com/office/drawing/2014/main" xmlns="" id="{F3BBD851-5D2A-0241-81EC-77B06DAD8D51}"/>
+                <a16:creationId xmlns="" xmlns:a16="http://schemas.microsoft.com/office/drawing/2014/main" id="{F3BBD851-5D2A-0241-81EC-77B06DAD8D51}"/>
               </a:ext>
             </a:extLst>
           </p:cNvPr>
@@ -5604,7 +5689,7 @@
           <p:cNvPr id="3" name="Textplatzhalter 2">
             <a:extLst>
               <a:ext uri="{FF2B5EF4-FFF2-40B4-BE49-F238E27FC236}">
-                <a16:creationId xmlns:a16="http://schemas.microsoft.com/office/drawing/2014/main" xmlns="" id="{6AF28E1A-8C3C-824D-A69D-B77AD2003BE1}"/>
+                <a16:creationId xmlns="" xmlns:a16="http://schemas.microsoft.com/office/drawing/2014/main" id="{6AF28E1A-8C3C-824D-A69D-B77AD2003BE1}"/>
               </a:ext>
             </a:extLst>
           </p:cNvPr>
@@ -5646,7 +5731,7 @@
           <p:cNvPr id="4" name="Datumsplatzhalter 3">
             <a:extLst>
               <a:ext uri="{FF2B5EF4-FFF2-40B4-BE49-F238E27FC236}">
-                <a16:creationId xmlns:a16="http://schemas.microsoft.com/office/drawing/2014/main" xmlns="" id="{14F36C74-AEF6-324A-939D-781EA85E6B37}"/>
+                <a16:creationId xmlns="" xmlns:a16="http://schemas.microsoft.com/office/drawing/2014/main" id="{14F36C74-AEF6-324A-939D-781EA85E6B37}"/>
               </a:ext>
             </a:extLst>
           </p:cNvPr>
@@ -5693,7 +5778,7 @@
           <p:cNvPr id="5" name="Fußzeilenplatzhalter 4">
             <a:extLst>
               <a:ext uri="{FF2B5EF4-FFF2-40B4-BE49-F238E27FC236}">
-                <a16:creationId xmlns:a16="http://schemas.microsoft.com/office/drawing/2014/main" xmlns="" id="{CF454ED0-5B84-894F-BB54-EE635A5499CA}"/>
+                <a16:creationId xmlns="" xmlns:a16="http://schemas.microsoft.com/office/drawing/2014/main" id="{CF454ED0-5B84-894F-BB54-EE635A5499CA}"/>
               </a:ext>
             </a:extLst>
           </p:cNvPr>
@@ -5736,7 +5821,7 @@
           <p:cNvPr id="6" name="Foliennummernplatzhalter 5">
             <a:extLst>
               <a:ext uri="{FF2B5EF4-FFF2-40B4-BE49-F238E27FC236}">
-                <a16:creationId xmlns:a16="http://schemas.microsoft.com/office/drawing/2014/main" xmlns="" id="{A276BFAA-BED4-FD44-A7A3-E7419BE028A8}"/>
+                <a16:creationId xmlns="" xmlns:a16="http://schemas.microsoft.com/office/drawing/2014/main" id="{A276BFAA-BED4-FD44-A7A3-E7419BE028A8}"/>
               </a:ext>
             </a:extLst>
           </p:cNvPr>
@@ -6112,10 +6197,10 @@
           <p:cNvPr id="26" name="Rectangle 25">
             <a:extLst>
               <a:ext uri="{FF2B5EF4-FFF2-40B4-BE49-F238E27FC236}">
-                <a16:creationId xmlns:a16="http://schemas.microsoft.com/office/drawing/2014/main" xmlns="" id="{6F9EB9F2-07E2-4D64-BBD8-BB5B217F1218}"/>
+                <a16:creationId xmlns="" xmlns:a16="http://schemas.microsoft.com/office/drawing/2014/main" id="{6F9EB9F2-07E2-4D64-BBD8-BB5B217F1218}"/>
               </a:ext>
               <a:ext uri="{C183D7F6-B498-43B3-948B-1728B52AA6E4}">
-                <adec:decorative xmlns:adec="http://schemas.microsoft.com/office/drawing/2017/decorative" xmlns="" val="1"/>
+                <adec:decorative xmlns="" xmlns:adec="http://schemas.microsoft.com/office/drawing/2017/decorative" val="1"/>
               </a:ext>
             </a:extLst>
           </p:cNvPr>
@@ -6125,7 +6210,7 @@
           <p:nvPr>
             <p:extLst>
               <p:ext uri="{386F3935-93C4-4BCD-93E2-E3B085C9AB24}">
-                <p16:designElem xmlns:p16="http://schemas.microsoft.com/office/powerpoint/2015/main" xmlns="" val="1"/>
+                <p16:designElem xmlns="" xmlns:p16="http://schemas.microsoft.com/office/powerpoint/2015/main" val="1"/>
               </p:ext>
             </p:extLst>
           </p:nvPr>
@@ -6177,7 +6262,7 @@
           <p:cNvPr id="2" name="Titel 1">
             <a:extLst>
               <a:ext uri="{FF2B5EF4-FFF2-40B4-BE49-F238E27FC236}">
-                <a16:creationId xmlns:a16="http://schemas.microsoft.com/office/drawing/2014/main" xmlns="" id="{3E2C9346-6092-1E41-B6A4-C53308C7DFBF}"/>
+                <a16:creationId xmlns="" xmlns:a16="http://schemas.microsoft.com/office/drawing/2014/main" id="{3E2C9346-6092-1E41-B6A4-C53308C7DFBF}"/>
               </a:ext>
             </a:extLst>
           </p:cNvPr>
@@ -6225,10 +6310,10 @@
           <p:cNvPr id="28" name="Straight Connector 27">
             <a:extLst>
               <a:ext uri="{FF2B5EF4-FFF2-40B4-BE49-F238E27FC236}">
-                <a16:creationId xmlns:a16="http://schemas.microsoft.com/office/drawing/2014/main" xmlns="" id="{F0C57C7C-DFE9-4A1E-B7A9-DF40E63366BB}"/>
+                <a16:creationId xmlns="" xmlns:a16="http://schemas.microsoft.com/office/drawing/2014/main" id="{F0C57C7C-DFE9-4A1E-B7A9-DF40E63366BB}"/>
               </a:ext>
               <a:ext uri="{C183D7F6-B498-43B3-948B-1728B52AA6E4}">
-                <adec:decorative xmlns:adec="http://schemas.microsoft.com/office/drawing/2017/decorative" xmlns="" val="1"/>
+                <adec:decorative xmlns="" xmlns:adec="http://schemas.microsoft.com/office/drawing/2017/decorative" val="1"/>
               </a:ext>
             </a:extLst>
           </p:cNvPr>
@@ -6238,7 +6323,7 @@
           <p:nvPr>
             <p:extLst>
               <p:ext uri="{386F3935-93C4-4BCD-93E2-E3B085C9AB24}">
-                <p16:designElem xmlns:p16="http://schemas.microsoft.com/office/powerpoint/2015/main" xmlns="" val="1"/>
+                <p16:designElem xmlns="" xmlns:p16="http://schemas.microsoft.com/office/powerpoint/2015/main" val="1"/>
               </p:ext>
             </p:extLst>
           </p:nvPr>
@@ -6337,10 +6422,10 @@
           <p:cNvPr id="8" name="Rectangle 7">
             <a:extLst>
               <a:ext uri="{FF2B5EF4-FFF2-40B4-BE49-F238E27FC236}">
-                <a16:creationId xmlns:a16="http://schemas.microsoft.com/office/drawing/2014/main" xmlns="" id="{8D70B121-56F4-4848-B38B-182089D909FA}"/>
+                <a16:creationId xmlns="" xmlns:a16="http://schemas.microsoft.com/office/drawing/2014/main" id="{8D70B121-56F4-4848-B38B-182089D909FA}"/>
               </a:ext>
               <a:ext uri="{C183D7F6-B498-43B3-948B-1728B52AA6E4}">
-                <adec:decorative xmlns:adec="http://schemas.microsoft.com/office/drawing/2017/decorative" xmlns="" val="1"/>
+                <adec:decorative xmlns="" xmlns:adec="http://schemas.microsoft.com/office/drawing/2017/decorative" val="1"/>
               </a:ext>
             </a:extLst>
           </p:cNvPr>
@@ -6350,7 +6435,7 @@
           <p:nvPr>
             <p:extLst>
               <p:ext uri="{386F3935-93C4-4BCD-93E2-E3B085C9AB24}">
-                <p16:designElem xmlns:p16="http://schemas.microsoft.com/office/powerpoint/2015/main" xmlns="" val="1"/>
+                <p16:designElem xmlns="" xmlns:p16="http://schemas.microsoft.com/office/powerpoint/2015/main" val="1"/>
               </p:ext>
             </p:extLst>
           </p:nvPr>
@@ -6402,7 +6487,7 @@
           <p:cNvPr id="2" name="Titel 1">
             <a:extLst>
               <a:ext uri="{FF2B5EF4-FFF2-40B4-BE49-F238E27FC236}">
-                <a16:creationId xmlns:a16="http://schemas.microsoft.com/office/drawing/2014/main" xmlns="" id="{0B5D0F8F-C92F-BC46-ACC4-7A21698DD272}"/>
+                <a16:creationId xmlns="" xmlns:a16="http://schemas.microsoft.com/office/drawing/2014/main" id="{0B5D0F8F-C92F-BC46-ACC4-7A21698DD272}"/>
               </a:ext>
             </a:extLst>
           </p:cNvPr>
@@ -6442,10 +6527,10 @@
           <p:cNvPr id="10" name="Straight Connector 9">
             <a:extLst>
               <a:ext uri="{FF2B5EF4-FFF2-40B4-BE49-F238E27FC236}">
-                <a16:creationId xmlns:a16="http://schemas.microsoft.com/office/drawing/2014/main" xmlns="" id="{2D72A2C9-F3CA-4216-8BAD-FA4C970C3C4E}"/>
+                <a16:creationId xmlns="" xmlns:a16="http://schemas.microsoft.com/office/drawing/2014/main" id="{2D72A2C9-F3CA-4216-8BAD-FA4C970C3C4E}"/>
               </a:ext>
               <a:ext uri="{C183D7F6-B498-43B3-948B-1728B52AA6E4}">
-                <adec:decorative xmlns:adec="http://schemas.microsoft.com/office/drawing/2017/decorative" xmlns="" val="1"/>
+                <adec:decorative xmlns="" xmlns:adec="http://schemas.microsoft.com/office/drawing/2017/decorative" val="1"/>
               </a:ext>
             </a:extLst>
           </p:cNvPr>
@@ -6455,7 +6540,7 @@
           <p:nvPr>
             <p:extLst>
               <p:ext uri="{386F3935-93C4-4BCD-93E2-E3B085C9AB24}">
-                <p16:designElem xmlns:p16="http://schemas.microsoft.com/office/powerpoint/2015/main" xmlns="" val="1"/>
+                <p16:designElem xmlns="" xmlns:p16="http://schemas.microsoft.com/office/powerpoint/2015/main" val="1"/>
               </p:ext>
             </p:extLst>
           </p:nvPr>
@@ -6497,7 +6582,7 @@
           <p:cNvPr id="3" name="Inhaltsplatzhalter 2">
             <a:extLst>
               <a:ext uri="{FF2B5EF4-FFF2-40B4-BE49-F238E27FC236}">
-                <a16:creationId xmlns:a16="http://schemas.microsoft.com/office/drawing/2014/main" xmlns="" id="{692C889E-3E0C-9E40-9512-4230892B2B42}"/>
+                <a16:creationId xmlns="" xmlns:a16="http://schemas.microsoft.com/office/drawing/2014/main" id="{692C889E-3E0C-9E40-9512-4230892B2B42}"/>
               </a:ext>
             </a:extLst>
           </p:cNvPr>
@@ -6634,10 +6719,10 @@
           <p:cNvPr id="19" name="Rectangle 18">
             <a:extLst>
               <a:ext uri="{FF2B5EF4-FFF2-40B4-BE49-F238E27FC236}">
-                <a16:creationId xmlns:a16="http://schemas.microsoft.com/office/drawing/2014/main" xmlns="" id="{8D70B121-56F4-4848-B38B-182089D909FA}"/>
+                <a16:creationId xmlns="" xmlns:a16="http://schemas.microsoft.com/office/drawing/2014/main" id="{8D70B121-56F4-4848-B38B-182089D909FA}"/>
               </a:ext>
               <a:ext uri="{C183D7F6-B498-43B3-948B-1728B52AA6E4}">
-                <adec:decorative xmlns:adec="http://schemas.microsoft.com/office/drawing/2017/decorative" xmlns="" val="1"/>
+                <adec:decorative xmlns="" xmlns:adec="http://schemas.microsoft.com/office/drawing/2017/decorative" val="1"/>
               </a:ext>
             </a:extLst>
           </p:cNvPr>
@@ -6647,7 +6732,7 @@
           <p:nvPr>
             <p:extLst>
               <p:ext uri="{386F3935-93C4-4BCD-93E2-E3B085C9AB24}">
-                <p16:designElem xmlns:p16="http://schemas.microsoft.com/office/powerpoint/2015/main" xmlns="" val="1"/>
+                <p16:designElem xmlns="" xmlns:p16="http://schemas.microsoft.com/office/powerpoint/2015/main" val="1"/>
               </p:ext>
             </p:extLst>
           </p:nvPr>
@@ -6699,7 +6784,7 @@
           <p:cNvPr id="2" name="Titel 1">
             <a:extLst>
               <a:ext uri="{FF2B5EF4-FFF2-40B4-BE49-F238E27FC236}">
-                <a16:creationId xmlns:a16="http://schemas.microsoft.com/office/drawing/2014/main" xmlns="" id="{35BFDC70-A169-E142-B051-5ABC9190E094}"/>
+                <a16:creationId xmlns="" xmlns:a16="http://schemas.microsoft.com/office/drawing/2014/main" id="{35BFDC70-A169-E142-B051-5ABC9190E094}"/>
               </a:ext>
             </a:extLst>
           </p:cNvPr>
@@ -6750,10 +6835,10 @@
           <p:cNvPr id="21" name="Straight Connector 20">
             <a:extLst>
               <a:ext uri="{FF2B5EF4-FFF2-40B4-BE49-F238E27FC236}">
-                <a16:creationId xmlns:a16="http://schemas.microsoft.com/office/drawing/2014/main" xmlns="" id="{2D72A2C9-F3CA-4216-8BAD-FA4C970C3C4E}"/>
+                <a16:creationId xmlns="" xmlns:a16="http://schemas.microsoft.com/office/drawing/2014/main" id="{2D72A2C9-F3CA-4216-8BAD-FA4C970C3C4E}"/>
               </a:ext>
               <a:ext uri="{C183D7F6-B498-43B3-948B-1728B52AA6E4}">
-                <adec:decorative xmlns:adec="http://schemas.microsoft.com/office/drawing/2017/decorative" xmlns="" val="1"/>
+                <adec:decorative xmlns="" xmlns:adec="http://schemas.microsoft.com/office/drawing/2017/decorative" val="1"/>
               </a:ext>
             </a:extLst>
           </p:cNvPr>
@@ -6763,7 +6848,7 @@
           <p:nvPr>
             <p:extLst>
               <p:ext uri="{386F3935-93C4-4BCD-93E2-E3B085C9AB24}">
-                <p16:designElem xmlns:p16="http://schemas.microsoft.com/office/powerpoint/2015/main" xmlns="" val="1"/>
+                <p16:designElem xmlns="" xmlns:p16="http://schemas.microsoft.com/office/powerpoint/2015/main" val="1"/>
               </p:ext>
             </p:extLst>
           </p:nvPr>
@@ -6801,7 +6886,7 @@
         </p:style>
       </p:cxnSp>
       <mc:AlternateContent xmlns:mc="http://schemas.openxmlformats.org/markup-compatibility/2006">
-        <mc:Choice xmlns:pslz="http://schemas.microsoft.com/office/powerpoint/2016/slidezoom" xmlns="" Requires="pslz">
+        <mc:Choice xmlns="" xmlns:pslz="http://schemas.microsoft.com/office/powerpoint/2016/slidezoom" Requires="pslz">
           <p:graphicFrame>
             <p:nvGraphicFramePr>
               <p:cNvPr id="10" name="Folienzoom 9">
@@ -6865,7 +6950,7 @@
                 <a:hlinkClick r:id="rId4" action="ppaction://hlinksldjump"/>
                 <a:extLst>
                   <a:ext uri="{FF2B5EF4-FFF2-40B4-BE49-F238E27FC236}">
-                    <a16:creationId xmlns:a16="http://schemas.microsoft.com/office/drawing/2014/main" xmlns="" xmlns:pslz="http://schemas.microsoft.com/office/powerpoint/2016/slidezoom" id="{B215CFD4-A22E-BE4F-9AB9-4E33929D0E8E}"/>
+                    <a16:creationId xmlns:pslz="http://schemas.microsoft.com/office/powerpoint/2016/slidezoom" xmlns="" xmlns:a16="http://schemas.microsoft.com/office/drawing/2014/main" id="{B215CFD4-A22E-BE4F-9AB9-4E33929D0E8E}"/>
                   </a:ext>
                 </a:extLst>
               </p:cNvPr>
@@ -6947,10 +7032,10 @@
           <p:cNvPr id="19" name="Rectangle 18">
             <a:extLst>
               <a:ext uri="{FF2B5EF4-FFF2-40B4-BE49-F238E27FC236}">
-                <a16:creationId xmlns:a16="http://schemas.microsoft.com/office/drawing/2014/main" xmlns="" id="{8D70B121-56F4-4848-B38B-182089D909FA}"/>
+                <a16:creationId xmlns="" xmlns:a16="http://schemas.microsoft.com/office/drawing/2014/main" id="{8D70B121-56F4-4848-B38B-182089D909FA}"/>
               </a:ext>
               <a:ext uri="{C183D7F6-B498-43B3-948B-1728B52AA6E4}">
-                <adec:decorative xmlns:adec="http://schemas.microsoft.com/office/drawing/2017/decorative" xmlns="" val="1"/>
+                <adec:decorative xmlns="" xmlns:adec="http://schemas.microsoft.com/office/drawing/2017/decorative" val="1"/>
               </a:ext>
             </a:extLst>
           </p:cNvPr>
@@ -6960,7 +7045,7 @@
           <p:nvPr>
             <p:extLst>
               <p:ext uri="{386F3935-93C4-4BCD-93E2-E3B085C9AB24}">
-                <p16:designElem xmlns:p16="http://schemas.microsoft.com/office/powerpoint/2015/main" xmlns="" val="1"/>
+                <p16:designElem xmlns="" xmlns:p16="http://schemas.microsoft.com/office/powerpoint/2015/main" val="1"/>
               </p:ext>
             </p:extLst>
           </p:nvPr>
@@ -7012,10 +7097,10 @@
           <p:cNvPr id="21" name="Straight Connector 20">
             <a:extLst>
               <a:ext uri="{FF2B5EF4-FFF2-40B4-BE49-F238E27FC236}">
-                <a16:creationId xmlns:a16="http://schemas.microsoft.com/office/drawing/2014/main" xmlns="" id="{2D72A2C9-F3CA-4216-8BAD-FA4C970C3C4E}"/>
+                <a16:creationId xmlns="" xmlns:a16="http://schemas.microsoft.com/office/drawing/2014/main" id="{2D72A2C9-F3CA-4216-8BAD-FA4C970C3C4E}"/>
               </a:ext>
               <a:ext uri="{C183D7F6-B498-43B3-948B-1728B52AA6E4}">
-                <adec:decorative xmlns:adec="http://schemas.microsoft.com/office/drawing/2017/decorative" xmlns="" val="1"/>
+                <adec:decorative xmlns="" xmlns:adec="http://schemas.microsoft.com/office/drawing/2017/decorative" val="1"/>
               </a:ext>
             </a:extLst>
           </p:cNvPr>
@@ -7025,7 +7110,7 @@
           <p:nvPr>
             <p:extLst>
               <p:ext uri="{386F3935-93C4-4BCD-93E2-E3B085C9AB24}">
-                <p16:designElem xmlns:p16="http://schemas.microsoft.com/office/powerpoint/2015/main" xmlns="" val="1"/>
+                <p16:designElem xmlns="" xmlns:p16="http://schemas.microsoft.com/office/powerpoint/2015/main" val="1"/>
               </p:ext>
             </p:extLst>
           </p:nvPr>
@@ -7067,7 +7152,7 @@
           <p:cNvPr id="4" name="Grafik 3" descr="Ein Bild, das Screenshot enthält.&#10;&#10;Automatisch generierte Beschreibung">
             <a:extLst>
               <a:ext uri="{FF2B5EF4-FFF2-40B4-BE49-F238E27FC236}">
-                <a16:creationId xmlns:a16="http://schemas.microsoft.com/office/drawing/2014/main" xmlns="" id="{CA8E3E2A-3140-AC49-8635-006BC43846E8}"/>
+                <a16:creationId xmlns="" xmlns:a16="http://schemas.microsoft.com/office/drawing/2014/main" id="{CA8E3E2A-3140-AC49-8635-006BC43846E8}"/>
               </a:ext>
             </a:extLst>
           </p:cNvPr>
@@ -7142,10 +7227,10 @@
           <p:cNvPr id="19" name="Rectangle 18">
             <a:extLst>
               <a:ext uri="{FF2B5EF4-FFF2-40B4-BE49-F238E27FC236}">
-                <a16:creationId xmlns:a16="http://schemas.microsoft.com/office/drawing/2014/main" xmlns="" id="{8D70B121-56F4-4848-B38B-182089D909FA}"/>
+                <a16:creationId xmlns="" xmlns:a16="http://schemas.microsoft.com/office/drawing/2014/main" id="{8D70B121-56F4-4848-B38B-182089D909FA}"/>
               </a:ext>
               <a:ext uri="{C183D7F6-B498-43B3-948B-1728B52AA6E4}">
-                <adec:decorative xmlns:adec="http://schemas.microsoft.com/office/drawing/2017/decorative" xmlns="" val="1"/>
+                <adec:decorative xmlns="" xmlns:adec="http://schemas.microsoft.com/office/drawing/2017/decorative" val="1"/>
               </a:ext>
             </a:extLst>
           </p:cNvPr>
@@ -7155,7 +7240,7 @@
           <p:nvPr>
             <p:extLst>
               <p:ext uri="{386F3935-93C4-4BCD-93E2-E3B085C9AB24}">
-                <p16:designElem xmlns:p16="http://schemas.microsoft.com/office/powerpoint/2015/main" xmlns="" val="1"/>
+                <p16:designElem xmlns="" xmlns:p16="http://schemas.microsoft.com/office/powerpoint/2015/main" val="1"/>
               </p:ext>
             </p:extLst>
           </p:nvPr>
@@ -7207,7 +7292,7 @@
           <p:cNvPr id="2" name="Titel 1">
             <a:extLst>
               <a:ext uri="{FF2B5EF4-FFF2-40B4-BE49-F238E27FC236}">
-                <a16:creationId xmlns:a16="http://schemas.microsoft.com/office/drawing/2014/main" xmlns="" id="{35BFDC70-A169-E142-B051-5ABC9190E094}"/>
+                <a16:creationId xmlns="" xmlns:a16="http://schemas.microsoft.com/office/drawing/2014/main" id="{35BFDC70-A169-E142-B051-5ABC9190E094}"/>
               </a:ext>
             </a:extLst>
           </p:cNvPr>
@@ -7258,10 +7343,10 @@
           <p:cNvPr id="21" name="Straight Connector 20">
             <a:extLst>
               <a:ext uri="{FF2B5EF4-FFF2-40B4-BE49-F238E27FC236}">
-                <a16:creationId xmlns:a16="http://schemas.microsoft.com/office/drawing/2014/main" xmlns="" id="{2D72A2C9-F3CA-4216-8BAD-FA4C970C3C4E}"/>
+                <a16:creationId xmlns="" xmlns:a16="http://schemas.microsoft.com/office/drawing/2014/main" id="{2D72A2C9-F3CA-4216-8BAD-FA4C970C3C4E}"/>
               </a:ext>
               <a:ext uri="{C183D7F6-B498-43B3-948B-1728B52AA6E4}">
-                <adec:decorative xmlns:adec="http://schemas.microsoft.com/office/drawing/2017/decorative" xmlns="" val="1"/>
+                <adec:decorative xmlns="" xmlns:adec="http://schemas.microsoft.com/office/drawing/2017/decorative" val="1"/>
               </a:ext>
             </a:extLst>
           </p:cNvPr>
@@ -7271,7 +7356,7 @@
           <p:nvPr>
             <p:extLst>
               <p:ext uri="{386F3935-93C4-4BCD-93E2-E3B085C9AB24}">
-                <p16:designElem xmlns:p16="http://schemas.microsoft.com/office/powerpoint/2015/main" xmlns="" val="1"/>
+                <p16:designElem xmlns="" xmlns:p16="http://schemas.microsoft.com/office/powerpoint/2015/main" val="1"/>
               </p:ext>
             </p:extLst>
           </p:nvPr>
@@ -7313,7 +7398,7 @@
           <p:cNvPr id="8" name="Inhaltsplatzhalter 4">
             <a:extLst>
               <a:ext uri="{FF2B5EF4-FFF2-40B4-BE49-F238E27FC236}">
-                <a16:creationId xmlns:a16="http://schemas.microsoft.com/office/drawing/2014/main" xmlns="" id="{A8E625C4-6DB1-9D42-BFEA-DE37A6F928F3}"/>
+                <a16:creationId xmlns="" xmlns:a16="http://schemas.microsoft.com/office/drawing/2014/main" id="{A8E625C4-6DB1-9D42-BFEA-DE37A6F928F3}"/>
               </a:ext>
             </a:extLst>
           </p:cNvPr>
@@ -7408,10 +7493,10 @@
           <p:cNvPr id="8" name="Rectangle 7">
             <a:extLst>
               <a:ext uri="{FF2B5EF4-FFF2-40B4-BE49-F238E27FC236}">
-                <a16:creationId xmlns:a16="http://schemas.microsoft.com/office/drawing/2014/main" xmlns="" id="{8D70B121-56F4-4848-B38B-182089D909FA}"/>
+                <a16:creationId xmlns="" xmlns:a16="http://schemas.microsoft.com/office/drawing/2014/main" id="{8D70B121-56F4-4848-B38B-182089D909FA}"/>
               </a:ext>
               <a:ext uri="{C183D7F6-B498-43B3-948B-1728B52AA6E4}">
-                <adec:decorative xmlns:adec="http://schemas.microsoft.com/office/drawing/2017/decorative" xmlns="" val="1"/>
+                <adec:decorative xmlns="" xmlns:adec="http://schemas.microsoft.com/office/drawing/2017/decorative" val="1"/>
               </a:ext>
             </a:extLst>
           </p:cNvPr>
@@ -7421,7 +7506,7 @@
           <p:nvPr>
             <p:extLst>
               <p:ext uri="{386F3935-93C4-4BCD-93E2-E3B085C9AB24}">
-                <p16:designElem xmlns:p16="http://schemas.microsoft.com/office/powerpoint/2015/main" xmlns="" val="1"/>
+                <p16:designElem xmlns="" xmlns:p16="http://schemas.microsoft.com/office/powerpoint/2015/main" val="1"/>
               </p:ext>
             </p:extLst>
           </p:nvPr>
@@ -7473,7 +7558,7 @@
           <p:cNvPr id="2" name="Titel 1">
             <a:extLst>
               <a:ext uri="{FF2B5EF4-FFF2-40B4-BE49-F238E27FC236}">
-                <a16:creationId xmlns:a16="http://schemas.microsoft.com/office/drawing/2014/main" xmlns="" id="{0B5D0F8F-C92F-BC46-ACC4-7A21698DD272}"/>
+                <a16:creationId xmlns="" xmlns:a16="http://schemas.microsoft.com/office/drawing/2014/main" id="{0B5D0F8F-C92F-BC46-ACC4-7A21698DD272}"/>
               </a:ext>
             </a:extLst>
           </p:cNvPr>
@@ -7513,10 +7598,10 @@
           <p:cNvPr id="10" name="Straight Connector 9">
             <a:extLst>
               <a:ext uri="{FF2B5EF4-FFF2-40B4-BE49-F238E27FC236}">
-                <a16:creationId xmlns:a16="http://schemas.microsoft.com/office/drawing/2014/main" xmlns="" id="{2D72A2C9-F3CA-4216-8BAD-FA4C970C3C4E}"/>
+                <a16:creationId xmlns="" xmlns:a16="http://schemas.microsoft.com/office/drawing/2014/main" id="{2D72A2C9-F3CA-4216-8BAD-FA4C970C3C4E}"/>
               </a:ext>
               <a:ext uri="{C183D7F6-B498-43B3-948B-1728B52AA6E4}">
-                <adec:decorative xmlns:adec="http://schemas.microsoft.com/office/drawing/2017/decorative" xmlns="" val="1"/>
+                <adec:decorative xmlns="" xmlns:adec="http://schemas.microsoft.com/office/drawing/2017/decorative" val="1"/>
               </a:ext>
             </a:extLst>
           </p:cNvPr>
@@ -7526,7 +7611,7 @@
           <p:nvPr>
             <p:extLst>
               <p:ext uri="{386F3935-93C4-4BCD-93E2-E3B085C9AB24}">
-                <p16:designElem xmlns:p16="http://schemas.microsoft.com/office/powerpoint/2015/main" xmlns="" val="1"/>
+                <p16:designElem xmlns="" xmlns:p16="http://schemas.microsoft.com/office/powerpoint/2015/main" val="1"/>
               </p:ext>
             </p:extLst>
           </p:nvPr>
@@ -7568,7 +7653,7 @@
           <p:cNvPr id="3" name="Inhaltsplatzhalter 2">
             <a:extLst>
               <a:ext uri="{FF2B5EF4-FFF2-40B4-BE49-F238E27FC236}">
-                <a16:creationId xmlns:a16="http://schemas.microsoft.com/office/drawing/2014/main" xmlns="" id="{692C889E-3E0C-9E40-9512-4230892B2B42}"/>
+                <a16:creationId xmlns="" xmlns:a16="http://schemas.microsoft.com/office/drawing/2014/main" id="{692C889E-3E0C-9E40-9512-4230892B2B42}"/>
               </a:ext>
             </a:extLst>
           </p:cNvPr>
@@ -7704,10 +7789,10 @@
           <p:cNvPr id="19" name="Rectangle 18">
             <a:extLst>
               <a:ext uri="{FF2B5EF4-FFF2-40B4-BE49-F238E27FC236}">
-                <a16:creationId xmlns:a16="http://schemas.microsoft.com/office/drawing/2014/main" xmlns="" id="{8D70B121-56F4-4848-B38B-182089D909FA}"/>
+                <a16:creationId xmlns="" xmlns:a16="http://schemas.microsoft.com/office/drawing/2014/main" id="{8D70B121-56F4-4848-B38B-182089D909FA}"/>
               </a:ext>
               <a:ext uri="{C183D7F6-B498-43B3-948B-1728B52AA6E4}">
-                <adec:decorative xmlns:adec="http://schemas.microsoft.com/office/drawing/2017/decorative" xmlns="" val="1"/>
+                <adec:decorative xmlns="" xmlns:adec="http://schemas.microsoft.com/office/drawing/2017/decorative" val="1"/>
               </a:ext>
             </a:extLst>
           </p:cNvPr>
@@ -7717,7 +7802,7 @@
           <p:nvPr>
             <p:extLst>
               <p:ext uri="{386F3935-93C4-4BCD-93E2-E3B085C9AB24}">
-                <p16:designElem xmlns:p16="http://schemas.microsoft.com/office/powerpoint/2015/main" xmlns="" val="1"/>
+                <p16:designElem xmlns="" xmlns:p16="http://schemas.microsoft.com/office/powerpoint/2015/main" val="1"/>
               </p:ext>
             </p:extLst>
           </p:nvPr>
@@ -7769,7 +7854,7 @@
           <p:cNvPr id="2" name="Titel 1">
             <a:extLst>
               <a:ext uri="{FF2B5EF4-FFF2-40B4-BE49-F238E27FC236}">
-                <a16:creationId xmlns:a16="http://schemas.microsoft.com/office/drawing/2014/main" xmlns="" id="{35BFDC70-A169-E142-B051-5ABC9190E094}"/>
+                <a16:creationId xmlns="" xmlns:a16="http://schemas.microsoft.com/office/drawing/2014/main" id="{35BFDC70-A169-E142-B051-5ABC9190E094}"/>
               </a:ext>
             </a:extLst>
           </p:cNvPr>
@@ -7817,10 +7902,10 @@
           <p:cNvPr id="21" name="Straight Connector 20">
             <a:extLst>
               <a:ext uri="{FF2B5EF4-FFF2-40B4-BE49-F238E27FC236}">
-                <a16:creationId xmlns:a16="http://schemas.microsoft.com/office/drawing/2014/main" xmlns="" id="{2D72A2C9-F3CA-4216-8BAD-FA4C970C3C4E}"/>
+                <a16:creationId xmlns="" xmlns:a16="http://schemas.microsoft.com/office/drawing/2014/main" id="{2D72A2C9-F3CA-4216-8BAD-FA4C970C3C4E}"/>
               </a:ext>
               <a:ext uri="{C183D7F6-B498-43B3-948B-1728B52AA6E4}">
-                <adec:decorative xmlns:adec="http://schemas.microsoft.com/office/drawing/2017/decorative" xmlns="" val="1"/>
+                <adec:decorative xmlns="" xmlns:adec="http://schemas.microsoft.com/office/drawing/2017/decorative" val="1"/>
               </a:ext>
             </a:extLst>
           </p:cNvPr>
@@ -7830,7 +7915,7 @@
           <p:nvPr>
             <p:extLst>
               <p:ext uri="{386F3935-93C4-4BCD-93E2-E3B085C9AB24}">
-                <p16:designElem xmlns:p16="http://schemas.microsoft.com/office/powerpoint/2015/main" xmlns="" val="1"/>
+                <p16:designElem xmlns="" xmlns:p16="http://schemas.microsoft.com/office/powerpoint/2015/main" val="1"/>
               </p:ext>
             </p:extLst>
           </p:nvPr>
@@ -7872,7 +7957,7 @@
           <p:cNvPr id="8" name="Inhaltsplatzhalter 4">
             <a:extLst>
               <a:ext uri="{FF2B5EF4-FFF2-40B4-BE49-F238E27FC236}">
-                <a16:creationId xmlns:a16="http://schemas.microsoft.com/office/drawing/2014/main" xmlns="" id="{A8E625C4-6DB1-9D42-BFEA-DE37A6F928F3}"/>
+                <a16:creationId xmlns="" xmlns:a16="http://schemas.microsoft.com/office/drawing/2014/main" id="{A8E625C4-6DB1-9D42-BFEA-DE37A6F928F3}"/>
               </a:ext>
             </a:extLst>
           </p:cNvPr>
@@ -7950,7 +8035,7 @@
           <p:cNvPr id="5" name="Rechteck 4">
             <a:extLst>
               <a:ext uri="{FF2B5EF4-FFF2-40B4-BE49-F238E27FC236}">
-                <a16:creationId xmlns:a16="http://schemas.microsoft.com/office/drawing/2014/main" xmlns="" id="{6C91387F-AF56-614F-B14F-5E345367B7AF}"/>
+                <a16:creationId xmlns="" xmlns:a16="http://schemas.microsoft.com/office/drawing/2014/main" id="{6C91387F-AF56-614F-B14F-5E345367B7AF}"/>
               </a:ext>
             </a:extLst>
           </p:cNvPr>
@@ -8002,7 +8087,7 @@
           <p:cNvPr id="2" name="Titel 1">
             <a:extLst>
               <a:ext uri="{FF2B5EF4-FFF2-40B4-BE49-F238E27FC236}">
-                <a16:creationId xmlns:a16="http://schemas.microsoft.com/office/drawing/2014/main" xmlns="" id="{35BFDC70-A169-E142-B051-5ABC9190E094}"/>
+                <a16:creationId xmlns="" xmlns:a16="http://schemas.microsoft.com/office/drawing/2014/main" id="{35BFDC70-A169-E142-B051-5ABC9190E094}"/>
               </a:ext>
             </a:extLst>
           </p:cNvPr>
@@ -8082,7 +8167,7 @@
           <p:cNvPr id="6" name="Titel 1">
             <a:extLst>
               <a:ext uri="{FF2B5EF4-FFF2-40B4-BE49-F238E27FC236}">
-                <a16:creationId xmlns:a16="http://schemas.microsoft.com/office/drawing/2014/main" xmlns="" id="{E7C2CB7B-ACCE-46AA-B361-C575579F8987}"/>
+                <a16:creationId xmlns="" xmlns:a16="http://schemas.microsoft.com/office/drawing/2014/main" id="{E7C2CB7B-ACCE-46AA-B361-C575579F8987}"/>
               </a:ext>
             </a:extLst>
           </p:cNvPr>
@@ -8138,7 +8223,7 @@
           <p:cNvPr id="8" name="Grafik 7">
             <a:extLst>
               <a:ext uri="{FF2B5EF4-FFF2-40B4-BE49-F238E27FC236}">
-                <a16:creationId xmlns:a16="http://schemas.microsoft.com/office/drawing/2014/main" xmlns="" id="{C89ECDFD-2E29-4183-B4C5-57C14F623766}"/>
+                <a16:creationId xmlns="" xmlns:a16="http://schemas.microsoft.com/office/drawing/2014/main" id="{C89ECDFD-2E29-4183-B4C5-57C14F623766}"/>
               </a:ext>
             </a:extLst>
           </p:cNvPr>
@@ -8205,7 +8290,7 @@
           <p:cNvPr id="4" name="Rechteck 3">
             <a:extLst>
               <a:ext uri="{FF2B5EF4-FFF2-40B4-BE49-F238E27FC236}">
-                <a16:creationId xmlns:a16="http://schemas.microsoft.com/office/drawing/2014/main" xmlns="" id="{E4D21FBE-9E79-4438-A9C4-A86631E75D3D}"/>
+                <a16:creationId xmlns="" xmlns:a16="http://schemas.microsoft.com/office/drawing/2014/main" id="{E4D21FBE-9E79-4438-A9C4-A86631E75D3D}"/>
               </a:ext>
             </a:extLst>
           </p:cNvPr>
@@ -8257,7 +8342,7 @@
           <p:cNvPr id="2" name="Titel 1">
             <a:extLst>
               <a:ext uri="{FF2B5EF4-FFF2-40B4-BE49-F238E27FC236}">
-                <a16:creationId xmlns:a16="http://schemas.microsoft.com/office/drawing/2014/main" xmlns="" id="{5D43DF7A-1A5D-4ACC-A604-ABDFA208B266}"/>
+                <a16:creationId xmlns="" xmlns:a16="http://schemas.microsoft.com/office/drawing/2014/main" id="{5D43DF7A-1A5D-4ACC-A604-ABDFA208B266}"/>
               </a:ext>
             </a:extLst>
           </p:cNvPr>
@@ -8282,7 +8367,7 @@
           <p:cNvPr id="3" name="Inhaltsplatzhalter 2">
             <a:extLst>
               <a:ext uri="{FF2B5EF4-FFF2-40B4-BE49-F238E27FC236}">
-                <a16:creationId xmlns:a16="http://schemas.microsoft.com/office/drawing/2014/main" xmlns="" id="{C24FCB4C-0151-435F-B548-7A9594A11125}"/>
+                <a16:creationId xmlns="" xmlns:a16="http://schemas.microsoft.com/office/drawing/2014/main" id="{C24FCB4C-0151-435F-B548-7A9594A11125}"/>
               </a:ext>
             </a:extLst>
           </p:cNvPr>
@@ -8307,7 +8392,7 @@
           <p:cNvPr id="5" name="Grafik 4">
             <a:extLst>
               <a:ext uri="{FF2B5EF4-FFF2-40B4-BE49-F238E27FC236}">
-                <a16:creationId xmlns:a16="http://schemas.microsoft.com/office/drawing/2014/main" xmlns="" id="{1C4ABC61-F649-4941-9A69-5363F27C5C7A}"/>
+                <a16:creationId xmlns="" xmlns:a16="http://schemas.microsoft.com/office/drawing/2014/main" id="{1C4ABC61-F649-4941-9A69-5363F27C5C7A}"/>
               </a:ext>
             </a:extLst>
           </p:cNvPr>
@@ -8374,7 +8459,7 @@
           <p:cNvPr id="5" name="Rechteck 4">
             <a:extLst>
               <a:ext uri="{FF2B5EF4-FFF2-40B4-BE49-F238E27FC236}">
-                <a16:creationId xmlns:a16="http://schemas.microsoft.com/office/drawing/2014/main" xmlns="" id="{6C91387F-AF56-614F-B14F-5E345367B7AF}"/>
+                <a16:creationId xmlns="" xmlns:a16="http://schemas.microsoft.com/office/drawing/2014/main" id="{6C91387F-AF56-614F-B14F-5E345367B7AF}"/>
               </a:ext>
             </a:extLst>
           </p:cNvPr>
@@ -8426,7 +8511,7 @@
           <p:cNvPr id="2" name="Titel 1">
             <a:extLst>
               <a:ext uri="{FF2B5EF4-FFF2-40B4-BE49-F238E27FC236}">
-                <a16:creationId xmlns:a16="http://schemas.microsoft.com/office/drawing/2014/main" xmlns="" id="{35BFDC70-A169-E142-B051-5ABC9190E094}"/>
+                <a16:creationId xmlns="" xmlns:a16="http://schemas.microsoft.com/office/drawing/2014/main" id="{35BFDC70-A169-E142-B051-5ABC9190E094}"/>
               </a:ext>
             </a:extLst>
           </p:cNvPr>
@@ -8506,7 +8591,7 @@
           <p:cNvPr id="6" name="Titel 1">
             <a:extLst>
               <a:ext uri="{FF2B5EF4-FFF2-40B4-BE49-F238E27FC236}">
-                <a16:creationId xmlns:a16="http://schemas.microsoft.com/office/drawing/2014/main" xmlns="" id="{E7C2CB7B-ACCE-46AA-B361-C575579F8987}"/>
+                <a16:creationId xmlns="" xmlns:a16="http://schemas.microsoft.com/office/drawing/2014/main" id="{E7C2CB7B-ACCE-46AA-B361-C575579F8987}"/>
               </a:ext>
             </a:extLst>
           </p:cNvPr>
@@ -8562,7 +8647,7 @@
           <p:cNvPr id="4" name="Grafik 3">
             <a:extLst>
               <a:ext uri="{FF2B5EF4-FFF2-40B4-BE49-F238E27FC236}">
-                <a16:creationId xmlns:a16="http://schemas.microsoft.com/office/drawing/2014/main" xmlns="" id="{9CE66A13-0C75-4FD9-A123-2756CAAD340B}"/>
+                <a16:creationId xmlns="" xmlns:a16="http://schemas.microsoft.com/office/drawing/2014/main" id="{9CE66A13-0C75-4FD9-A123-2756CAAD340B}"/>
               </a:ext>
             </a:extLst>
           </p:cNvPr>
@@ -8629,7 +8714,7 @@
           <p:cNvPr id="4" name="Rechteck 3">
             <a:extLst>
               <a:ext uri="{FF2B5EF4-FFF2-40B4-BE49-F238E27FC236}">
-                <a16:creationId xmlns:a16="http://schemas.microsoft.com/office/drawing/2014/main" xmlns="" id="{E4D21FBE-9E79-4438-A9C4-A86631E75D3D}"/>
+                <a16:creationId xmlns="" xmlns:a16="http://schemas.microsoft.com/office/drawing/2014/main" id="{E4D21FBE-9E79-4438-A9C4-A86631E75D3D}"/>
               </a:ext>
             </a:extLst>
           </p:cNvPr>
@@ -8681,7 +8766,7 @@
           <p:cNvPr id="2" name="Titel 1">
             <a:extLst>
               <a:ext uri="{FF2B5EF4-FFF2-40B4-BE49-F238E27FC236}">
-                <a16:creationId xmlns:a16="http://schemas.microsoft.com/office/drawing/2014/main" xmlns="" id="{5D43DF7A-1A5D-4ACC-A604-ABDFA208B266}"/>
+                <a16:creationId xmlns="" xmlns:a16="http://schemas.microsoft.com/office/drawing/2014/main" id="{5D43DF7A-1A5D-4ACC-A604-ABDFA208B266}"/>
               </a:ext>
             </a:extLst>
           </p:cNvPr>
@@ -8706,7 +8791,7 @@
           <p:cNvPr id="3" name="Inhaltsplatzhalter 2">
             <a:extLst>
               <a:ext uri="{FF2B5EF4-FFF2-40B4-BE49-F238E27FC236}">
-                <a16:creationId xmlns:a16="http://schemas.microsoft.com/office/drawing/2014/main" xmlns="" id="{C24FCB4C-0151-435F-B548-7A9594A11125}"/>
+                <a16:creationId xmlns="" xmlns:a16="http://schemas.microsoft.com/office/drawing/2014/main" id="{C24FCB4C-0151-435F-B548-7A9594A11125}"/>
               </a:ext>
             </a:extLst>
           </p:cNvPr>
@@ -8731,7 +8816,7 @@
           <p:cNvPr id="6" name="Grafik 5">
             <a:extLst>
               <a:ext uri="{FF2B5EF4-FFF2-40B4-BE49-F238E27FC236}">
-                <a16:creationId xmlns:a16="http://schemas.microsoft.com/office/drawing/2014/main" xmlns="" id="{996B219C-4061-4FC7-A31B-3666889455F9}"/>
+                <a16:creationId xmlns="" xmlns:a16="http://schemas.microsoft.com/office/drawing/2014/main" id="{996B219C-4061-4FC7-A31B-3666889455F9}"/>
               </a:ext>
             </a:extLst>
           </p:cNvPr>
@@ -8806,10 +8891,10 @@
           <p:cNvPr id="8" name="Rectangle 7">
             <a:extLst>
               <a:ext uri="{FF2B5EF4-FFF2-40B4-BE49-F238E27FC236}">
-                <a16:creationId xmlns:a16="http://schemas.microsoft.com/office/drawing/2014/main" xmlns="" id="{8D70B121-56F4-4848-B38B-182089D909FA}"/>
+                <a16:creationId xmlns="" xmlns:a16="http://schemas.microsoft.com/office/drawing/2014/main" id="{8D70B121-56F4-4848-B38B-182089D909FA}"/>
               </a:ext>
               <a:ext uri="{C183D7F6-B498-43B3-948B-1728B52AA6E4}">
-                <adec:decorative xmlns:adec="http://schemas.microsoft.com/office/drawing/2017/decorative" xmlns="" val="1"/>
+                <adec:decorative xmlns="" xmlns:adec="http://schemas.microsoft.com/office/drawing/2017/decorative" val="1"/>
               </a:ext>
             </a:extLst>
           </p:cNvPr>
@@ -8819,7 +8904,7 @@
           <p:nvPr>
             <p:extLst>
               <p:ext uri="{386F3935-93C4-4BCD-93E2-E3B085C9AB24}">
-                <p16:designElem xmlns:p16="http://schemas.microsoft.com/office/powerpoint/2015/main" xmlns="" val="1"/>
+                <p16:designElem xmlns="" xmlns:p16="http://schemas.microsoft.com/office/powerpoint/2015/main" val="1"/>
               </p:ext>
             </p:extLst>
           </p:nvPr>
@@ -8871,7 +8956,7 @@
           <p:cNvPr id="2" name="Titel 1">
             <a:extLst>
               <a:ext uri="{FF2B5EF4-FFF2-40B4-BE49-F238E27FC236}">
-                <a16:creationId xmlns:a16="http://schemas.microsoft.com/office/drawing/2014/main" xmlns="" id="{0B5D0F8F-C92F-BC46-ACC4-7A21698DD272}"/>
+                <a16:creationId xmlns="" xmlns:a16="http://schemas.microsoft.com/office/drawing/2014/main" id="{0B5D0F8F-C92F-BC46-ACC4-7A21698DD272}"/>
               </a:ext>
             </a:extLst>
           </p:cNvPr>
@@ -8911,10 +8996,10 @@
           <p:cNvPr id="10" name="Straight Connector 9">
             <a:extLst>
               <a:ext uri="{FF2B5EF4-FFF2-40B4-BE49-F238E27FC236}">
-                <a16:creationId xmlns:a16="http://schemas.microsoft.com/office/drawing/2014/main" xmlns="" id="{2D72A2C9-F3CA-4216-8BAD-FA4C970C3C4E}"/>
+                <a16:creationId xmlns="" xmlns:a16="http://schemas.microsoft.com/office/drawing/2014/main" id="{2D72A2C9-F3CA-4216-8BAD-FA4C970C3C4E}"/>
               </a:ext>
               <a:ext uri="{C183D7F6-B498-43B3-948B-1728B52AA6E4}">
-                <adec:decorative xmlns:adec="http://schemas.microsoft.com/office/drawing/2017/decorative" xmlns="" val="1"/>
+                <adec:decorative xmlns="" xmlns:adec="http://schemas.microsoft.com/office/drawing/2017/decorative" val="1"/>
               </a:ext>
             </a:extLst>
           </p:cNvPr>
@@ -8924,7 +9009,7 @@
           <p:nvPr>
             <p:extLst>
               <p:ext uri="{386F3935-93C4-4BCD-93E2-E3B085C9AB24}">
-                <p16:designElem xmlns:p16="http://schemas.microsoft.com/office/powerpoint/2015/main" xmlns="" val="1"/>
+                <p16:designElem xmlns="" xmlns:p16="http://schemas.microsoft.com/office/powerpoint/2015/main" val="1"/>
               </p:ext>
             </p:extLst>
           </p:nvPr>
@@ -8966,7 +9051,7 @@
           <p:cNvPr id="3" name="Inhaltsplatzhalter 2">
             <a:extLst>
               <a:ext uri="{FF2B5EF4-FFF2-40B4-BE49-F238E27FC236}">
-                <a16:creationId xmlns:a16="http://schemas.microsoft.com/office/drawing/2014/main" xmlns="" id="{692C889E-3E0C-9E40-9512-4230892B2B42}"/>
+                <a16:creationId xmlns="" xmlns:a16="http://schemas.microsoft.com/office/drawing/2014/main" id="{692C889E-3E0C-9E40-9512-4230892B2B42}"/>
               </a:ext>
             </a:extLst>
           </p:cNvPr>
@@ -9091,7 +9176,7 @@
           <p:cNvPr id="5" name="Rechteck 4">
             <a:extLst>
               <a:ext uri="{FF2B5EF4-FFF2-40B4-BE49-F238E27FC236}">
-                <a16:creationId xmlns:a16="http://schemas.microsoft.com/office/drawing/2014/main" xmlns="" id="{6C91387F-AF56-614F-B14F-5E345367B7AF}"/>
+                <a16:creationId xmlns="" xmlns:a16="http://schemas.microsoft.com/office/drawing/2014/main" id="{6C91387F-AF56-614F-B14F-5E345367B7AF}"/>
               </a:ext>
             </a:extLst>
           </p:cNvPr>
@@ -9143,7 +9228,7 @@
           <p:cNvPr id="2" name="Titel 1">
             <a:extLst>
               <a:ext uri="{FF2B5EF4-FFF2-40B4-BE49-F238E27FC236}">
-                <a16:creationId xmlns:a16="http://schemas.microsoft.com/office/drawing/2014/main" xmlns="" id="{35BFDC70-A169-E142-B051-5ABC9190E094}"/>
+                <a16:creationId xmlns="" xmlns:a16="http://schemas.microsoft.com/office/drawing/2014/main" id="{35BFDC70-A169-E142-B051-5ABC9190E094}"/>
               </a:ext>
             </a:extLst>
           </p:cNvPr>
@@ -9191,7 +9276,7 @@
           <p:cNvPr id="6" name="Titel 1">
             <a:extLst>
               <a:ext uri="{FF2B5EF4-FFF2-40B4-BE49-F238E27FC236}">
-                <a16:creationId xmlns:a16="http://schemas.microsoft.com/office/drawing/2014/main" xmlns="" id="{E7C2CB7B-ACCE-46AA-B361-C575579F8987}"/>
+                <a16:creationId xmlns="" xmlns:a16="http://schemas.microsoft.com/office/drawing/2014/main" id="{E7C2CB7B-ACCE-46AA-B361-C575579F8987}"/>
               </a:ext>
             </a:extLst>
           </p:cNvPr>
@@ -9247,7 +9332,7 @@
           <p:cNvPr id="7" name="Grafik 6">
             <a:extLst>
               <a:ext uri="{FF2B5EF4-FFF2-40B4-BE49-F238E27FC236}">
-                <a16:creationId xmlns:a16="http://schemas.microsoft.com/office/drawing/2014/main" xmlns="" id="{756E846B-B403-4984-98B4-4C01CA73B356}"/>
+                <a16:creationId xmlns="" xmlns:a16="http://schemas.microsoft.com/office/drawing/2014/main" id="{756E846B-B403-4984-98B4-4C01CA73B356}"/>
               </a:ext>
             </a:extLst>
           </p:cNvPr>
@@ -9277,7 +9362,7 @@
           <p:cNvPr id="4" name="Grafik 3">
             <a:extLst>
               <a:ext uri="{FF2B5EF4-FFF2-40B4-BE49-F238E27FC236}">
-                <a16:creationId xmlns:a16="http://schemas.microsoft.com/office/drawing/2014/main" xmlns="" id="{A26447F2-DF28-4EAF-B8D1-EFC7A98F7721}"/>
+                <a16:creationId xmlns="" xmlns:a16="http://schemas.microsoft.com/office/drawing/2014/main" id="{A26447F2-DF28-4EAF-B8D1-EFC7A98F7721}"/>
               </a:ext>
             </a:extLst>
           </p:cNvPr>
@@ -9307,7 +9392,7 @@
           <p:cNvPr id="3" name="Grafik 2">
             <a:extLst>
               <a:ext uri="{FF2B5EF4-FFF2-40B4-BE49-F238E27FC236}">
-                <a16:creationId xmlns:a16="http://schemas.microsoft.com/office/drawing/2014/main" xmlns="" id="{DB99CD9C-1E94-4D53-99E7-DF6B67865684}"/>
+                <a16:creationId xmlns="" xmlns:a16="http://schemas.microsoft.com/office/drawing/2014/main" id="{DB99CD9C-1E94-4D53-99E7-DF6B67865684}"/>
               </a:ext>
             </a:extLst>
           </p:cNvPr>
@@ -9556,7 +9641,7 @@
           <p:cNvPr id="5" name="Rechteck 4">
             <a:extLst>
               <a:ext uri="{FF2B5EF4-FFF2-40B4-BE49-F238E27FC236}">
-                <a16:creationId xmlns:a16="http://schemas.microsoft.com/office/drawing/2014/main" xmlns="" id="{6C91387F-AF56-614F-B14F-5E345367B7AF}"/>
+                <a16:creationId xmlns="" xmlns:a16="http://schemas.microsoft.com/office/drawing/2014/main" id="{6C91387F-AF56-614F-B14F-5E345367B7AF}"/>
               </a:ext>
             </a:extLst>
           </p:cNvPr>
@@ -9608,7 +9693,7 @@
           <p:cNvPr id="2" name="Titel 1">
             <a:extLst>
               <a:ext uri="{FF2B5EF4-FFF2-40B4-BE49-F238E27FC236}">
-                <a16:creationId xmlns:a16="http://schemas.microsoft.com/office/drawing/2014/main" xmlns="" id="{35BFDC70-A169-E142-B051-5ABC9190E094}"/>
+                <a16:creationId xmlns="" xmlns:a16="http://schemas.microsoft.com/office/drawing/2014/main" id="{35BFDC70-A169-E142-B051-5ABC9190E094}"/>
               </a:ext>
             </a:extLst>
           </p:cNvPr>
@@ -9669,7 +9754,7 @@
           <p:cNvPr id="6" name="Titel 1">
             <a:extLst>
               <a:ext uri="{FF2B5EF4-FFF2-40B4-BE49-F238E27FC236}">
-                <a16:creationId xmlns:a16="http://schemas.microsoft.com/office/drawing/2014/main" xmlns="" id="{E7C2CB7B-ACCE-46AA-B361-C575579F8987}"/>
+                <a16:creationId xmlns="" xmlns:a16="http://schemas.microsoft.com/office/drawing/2014/main" id="{E7C2CB7B-ACCE-46AA-B361-C575579F8987}"/>
               </a:ext>
             </a:extLst>
           </p:cNvPr>
@@ -9725,7 +9810,7 @@
           <p:cNvPr id="4" name="Grafik 3">
             <a:extLst>
               <a:ext uri="{FF2B5EF4-FFF2-40B4-BE49-F238E27FC236}">
-                <a16:creationId xmlns:a16="http://schemas.microsoft.com/office/drawing/2014/main" xmlns="" id="{9CC9583D-5C73-4A70-A2FE-E33805DE3ECD}"/>
+                <a16:creationId xmlns="" xmlns:a16="http://schemas.microsoft.com/office/drawing/2014/main" id="{9CC9583D-5C73-4A70-A2FE-E33805DE3ECD}"/>
               </a:ext>
             </a:extLst>
           </p:cNvPr>
@@ -9800,10 +9885,10 @@
           <p:cNvPr id="8" name="Rectangle 7">
             <a:extLst>
               <a:ext uri="{FF2B5EF4-FFF2-40B4-BE49-F238E27FC236}">
-                <a16:creationId xmlns:a16="http://schemas.microsoft.com/office/drawing/2014/main" xmlns="" id="{8D70B121-56F4-4848-B38B-182089D909FA}"/>
+                <a16:creationId xmlns="" xmlns:a16="http://schemas.microsoft.com/office/drawing/2014/main" id="{8D70B121-56F4-4848-B38B-182089D909FA}"/>
               </a:ext>
               <a:ext uri="{C183D7F6-B498-43B3-948B-1728B52AA6E4}">
-                <adec:decorative xmlns:adec="http://schemas.microsoft.com/office/drawing/2017/decorative" xmlns="" val="1"/>
+                <adec:decorative xmlns="" xmlns:adec="http://schemas.microsoft.com/office/drawing/2017/decorative" val="1"/>
               </a:ext>
             </a:extLst>
           </p:cNvPr>
@@ -9813,7 +9898,7 @@
           <p:nvPr>
             <p:extLst>
               <p:ext uri="{386F3935-93C4-4BCD-93E2-E3B085C9AB24}">
-                <p16:designElem xmlns:p16="http://schemas.microsoft.com/office/powerpoint/2015/main" xmlns="" val="1"/>
+                <p16:designElem xmlns="" xmlns:p16="http://schemas.microsoft.com/office/powerpoint/2015/main" val="1"/>
               </p:ext>
             </p:extLst>
           </p:nvPr>
@@ -9865,7 +9950,7 @@
           <p:cNvPr id="2" name="Titel 1">
             <a:extLst>
               <a:ext uri="{FF2B5EF4-FFF2-40B4-BE49-F238E27FC236}">
-                <a16:creationId xmlns:a16="http://schemas.microsoft.com/office/drawing/2014/main" xmlns="" id="{0B5D0F8F-C92F-BC46-ACC4-7A21698DD272}"/>
+                <a16:creationId xmlns="" xmlns:a16="http://schemas.microsoft.com/office/drawing/2014/main" id="{0B5D0F8F-C92F-BC46-ACC4-7A21698DD272}"/>
               </a:ext>
             </a:extLst>
           </p:cNvPr>
@@ -9905,10 +9990,10 @@
           <p:cNvPr id="10" name="Straight Connector 9">
             <a:extLst>
               <a:ext uri="{FF2B5EF4-FFF2-40B4-BE49-F238E27FC236}">
-                <a16:creationId xmlns:a16="http://schemas.microsoft.com/office/drawing/2014/main" xmlns="" id="{2D72A2C9-F3CA-4216-8BAD-FA4C970C3C4E}"/>
+                <a16:creationId xmlns="" xmlns:a16="http://schemas.microsoft.com/office/drawing/2014/main" id="{2D72A2C9-F3CA-4216-8BAD-FA4C970C3C4E}"/>
               </a:ext>
               <a:ext uri="{C183D7F6-B498-43B3-948B-1728B52AA6E4}">
-                <adec:decorative xmlns:adec="http://schemas.microsoft.com/office/drawing/2017/decorative" xmlns="" val="1"/>
+                <adec:decorative xmlns="" xmlns:adec="http://schemas.microsoft.com/office/drawing/2017/decorative" val="1"/>
               </a:ext>
             </a:extLst>
           </p:cNvPr>
@@ -9918,7 +10003,7 @@
           <p:nvPr>
             <p:extLst>
               <p:ext uri="{386F3935-93C4-4BCD-93E2-E3B085C9AB24}">
-                <p16:designElem xmlns:p16="http://schemas.microsoft.com/office/powerpoint/2015/main" xmlns="" val="1"/>
+                <p16:designElem xmlns="" xmlns:p16="http://schemas.microsoft.com/office/powerpoint/2015/main" val="1"/>
               </p:ext>
             </p:extLst>
           </p:nvPr>
@@ -9960,7 +10045,7 @@
           <p:cNvPr id="3" name="Inhaltsplatzhalter 2">
             <a:extLst>
               <a:ext uri="{FF2B5EF4-FFF2-40B4-BE49-F238E27FC236}">
-                <a16:creationId xmlns:a16="http://schemas.microsoft.com/office/drawing/2014/main" xmlns="" id="{692C889E-3E0C-9E40-9512-4230892B2B42}"/>
+                <a16:creationId xmlns="" xmlns:a16="http://schemas.microsoft.com/office/drawing/2014/main" id="{692C889E-3E0C-9E40-9512-4230892B2B42}"/>
               </a:ext>
             </a:extLst>
           </p:cNvPr>
@@ -10105,10 +10190,10 @@
           <p:cNvPr id="19" name="Rectangle 18">
             <a:extLst>
               <a:ext uri="{FF2B5EF4-FFF2-40B4-BE49-F238E27FC236}">
-                <a16:creationId xmlns:a16="http://schemas.microsoft.com/office/drawing/2014/main" xmlns="" id="{8D70B121-56F4-4848-B38B-182089D909FA}"/>
+                <a16:creationId xmlns="" xmlns:a16="http://schemas.microsoft.com/office/drawing/2014/main" id="{8D70B121-56F4-4848-B38B-182089D909FA}"/>
               </a:ext>
               <a:ext uri="{C183D7F6-B498-43B3-948B-1728B52AA6E4}">
-                <adec:decorative xmlns:adec="http://schemas.microsoft.com/office/drawing/2017/decorative" xmlns="" val="1"/>
+                <adec:decorative xmlns="" xmlns:adec="http://schemas.microsoft.com/office/drawing/2017/decorative" val="1"/>
               </a:ext>
             </a:extLst>
           </p:cNvPr>
@@ -10118,7 +10203,7 @@
           <p:nvPr>
             <p:extLst>
               <p:ext uri="{386F3935-93C4-4BCD-93E2-E3B085C9AB24}">
-                <p16:designElem xmlns:p16="http://schemas.microsoft.com/office/powerpoint/2015/main" xmlns="" val="1"/>
+                <p16:designElem xmlns="" xmlns:p16="http://schemas.microsoft.com/office/powerpoint/2015/main" val="1"/>
               </p:ext>
             </p:extLst>
           </p:nvPr>
@@ -10170,7 +10255,7 @@
           <p:cNvPr id="2" name="Titel 1">
             <a:extLst>
               <a:ext uri="{FF2B5EF4-FFF2-40B4-BE49-F238E27FC236}">
-                <a16:creationId xmlns:a16="http://schemas.microsoft.com/office/drawing/2014/main" xmlns="" id="{35BFDC70-A169-E142-B051-5ABC9190E094}"/>
+                <a16:creationId xmlns="" xmlns:a16="http://schemas.microsoft.com/office/drawing/2014/main" id="{35BFDC70-A169-E142-B051-5ABC9190E094}"/>
               </a:ext>
             </a:extLst>
           </p:cNvPr>
@@ -10226,10 +10311,10 @@
           <p:cNvPr id="21" name="Straight Connector 20">
             <a:extLst>
               <a:ext uri="{FF2B5EF4-FFF2-40B4-BE49-F238E27FC236}">
-                <a16:creationId xmlns:a16="http://schemas.microsoft.com/office/drawing/2014/main" xmlns="" id="{2D72A2C9-F3CA-4216-8BAD-FA4C970C3C4E}"/>
+                <a16:creationId xmlns="" xmlns:a16="http://schemas.microsoft.com/office/drawing/2014/main" id="{2D72A2C9-F3CA-4216-8BAD-FA4C970C3C4E}"/>
               </a:ext>
               <a:ext uri="{C183D7F6-B498-43B3-948B-1728B52AA6E4}">
-                <adec:decorative xmlns:adec="http://schemas.microsoft.com/office/drawing/2017/decorative" xmlns="" val="1"/>
+                <adec:decorative xmlns="" xmlns:adec="http://schemas.microsoft.com/office/drawing/2017/decorative" val="1"/>
               </a:ext>
             </a:extLst>
           </p:cNvPr>
@@ -10239,7 +10324,7 @@
           <p:nvPr>
             <p:extLst>
               <p:ext uri="{386F3935-93C4-4BCD-93E2-E3B085C9AB24}">
-                <p16:designElem xmlns:p16="http://schemas.microsoft.com/office/powerpoint/2015/main" xmlns="" val="1"/>
+                <p16:designElem xmlns="" xmlns:p16="http://schemas.microsoft.com/office/powerpoint/2015/main" val="1"/>
               </p:ext>
             </p:extLst>
           </p:nvPr>
@@ -10281,7 +10366,7 @@
           <p:cNvPr id="8" name="Inhaltsplatzhalter 4">
             <a:extLst>
               <a:ext uri="{FF2B5EF4-FFF2-40B4-BE49-F238E27FC236}">
-                <a16:creationId xmlns:a16="http://schemas.microsoft.com/office/drawing/2014/main" xmlns="" id="{A8E625C4-6DB1-9D42-BFEA-DE37A6F928F3}"/>
+                <a16:creationId xmlns="" xmlns:a16="http://schemas.microsoft.com/office/drawing/2014/main" id="{A8E625C4-6DB1-9D42-BFEA-DE37A6F928F3}"/>
               </a:ext>
             </a:extLst>
           </p:cNvPr>
@@ -10377,10 +10462,10 @@
           <p:cNvPr id="19" name="Rectangle 18">
             <a:extLst>
               <a:ext uri="{FF2B5EF4-FFF2-40B4-BE49-F238E27FC236}">
-                <a16:creationId xmlns:a16="http://schemas.microsoft.com/office/drawing/2014/main" xmlns="" id="{8D70B121-56F4-4848-B38B-182089D909FA}"/>
+                <a16:creationId xmlns="" xmlns:a16="http://schemas.microsoft.com/office/drawing/2014/main" id="{8D70B121-56F4-4848-B38B-182089D909FA}"/>
               </a:ext>
               <a:ext uri="{C183D7F6-B498-43B3-948B-1728B52AA6E4}">
-                <adec:decorative xmlns:adec="http://schemas.microsoft.com/office/drawing/2017/decorative" xmlns="" val="1"/>
+                <adec:decorative xmlns="" xmlns:adec="http://schemas.microsoft.com/office/drawing/2017/decorative" val="1"/>
               </a:ext>
             </a:extLst>
           </p:cNvPr>
@@ -10390,7 +10475,7 @@
           <p:nvPr>
             <p:extLst>
               <p:ext uri="{386F3935-93C4-4BCD-93E2-E3B085C9AB24}">
-                <p16:designElem xmlns:p16="http://schemas.microsoft.com/office/powerpoint/2015/main" xmlns="" val="1"/>
+                <p16:designElem xmlns="" xmlns:p16="http://schemas.microsoft.com/office/powerpoint/2015/main" val="1"/>
               </p:ext>
             </p:extLst>
           </p:nvPr>
@@ -10442,7 +10527,7 @@
           <p:cNvPr id="2" name="Titel 1">
             <a:extLst>
               <a:ext uri="{FF2B5EF4-FFF2-40B4-BE49-F238E27FC236}">
-                <a16:creationId xmlns:a16="http://schemas.microsoft.com/office/drawing/2014/main" xmlns="" id="{35BFDC70-A169-E142-B051-5ABC9190E094}"/>
+                <a16:creationId xmlns="" xmlns:a16="http://schemas.microsoft.com/office/drawing/2014/main" id="{35BFDC70-A169-E142-B051-5ABC9190E094}"/>
               </a:ext>
             </a:extLst>
           </p:cNvPr>
@@ -10472,23 +10557,7 @@
                   <a:schemeClr val="accent1"/>
                 </a:solidFill>
               </a:rPr>
-              <a:t>Wichtige</a:t>
-            </a:r>
-            <a:r>
-              <a:rPr lang="en-US" dirty="0" smtClean="0">
-                <a:solidFill>
-                  <a:schemeClr val="accent1"/>
-                </a:solidFill>
-              </a:rPr>
-              <a:t> </a:t>
-            </a:r>
-            <a:r>
-              <a:rPr lang="en-US" dirty="0" err="1" smtClean="0">
-                <a:solidFill>
-                  <a:schemeClr val="accent1"/>
-                </a:solidFill>
-              </a:rPr>
-              <a:t>Begriffe</a:t>
+              <a:t>Inzidenzmatrix</a:t>
             </a:r>
             <a:endParaRPr lang="en-US" kern="1200" dirty="0">
               <a:solidFill>
@@ -10506,10 +10575,10 @@
           <p:cNvPr id="21" name="Straight Connector 20">
             <a:extLst>
               <a:ext uri="{FF2B5EF4-FFF2-40B4-BE49-F238E27FC236}">
-                <a16:creationId xmlns:a16="http://schemas.microsoft.com/office/drawing/2014/main" xmlns="" id="{2D72A2C9-F3CA-4216-8BAD-FA4C970C3C4E}"/>
+                <a16:creationId xmlns="" xmlns:a16="http://schemas.microsoft.com/office/drawing/2014/main" id="{2D72A2C9-F3CA-4216-8BAD-FA4C970C3C4E}"/>
               </a:ext>
               <a:ext uri="{C183D7F6-B498-43B3-948B-1728B52AA6E4}">
-                <adec:decorative xmlns:adec="http://schemas.microsoft.com/office/drawing/2017/decorative" xmlns="" val="1"/>
+                <adec:decorative xmlns="" xmlns:adec="http://schemas.microsoft.com/office/drawing/2017/decorative" val="1"/>
               </a:ext>
             </a:extLst>
           </p:cNvPr>
@@ -10519,7 +10588,7 @@
           <p:nvPr>
             <p:extLst>
               <p:ext uri="{386F3935-93C4-4BCD-93E2-E3B085C9AB24}">
-                <p16:designElem xmlns:p16="http://schemas.microsoft.com/office/powerpoint/2015/main" xmlns="" val="1"/>
+                <p16:designElem xmlns="" xmlns:p16="http://schemas.microsoft.com/office/powerpoint/2015/main" val="1"/>
               </p:ext>
             </p:extLst>
           </p:nvPr>
@@ -10556,51 +10625,233 @@
           </a:fontRef>
         </p:style>
       </p:cxnSp>
-      <p:sp>
-        <p:nvSpPr>
-          <p:cNvPr id="8" name="Inhaltsplatzhalter 4">
+      <p:pic>
+        <p:nvPicPr>
+          <p:cNvPr id="6" name="Grafik 5"/>
+          <p:cNvPicPr/>
+          <p:nvPr/>
+        </p:nvPicPr>
+        <p:blipFill>
+          <a:blip r:embed="rId3">
+            <a:extLst>
+              <a:ext uri="{28A0092B-C50C-407E-A947-70E740481C1C}">
+                <a14:useLocalDpi xmlns:a14="http://schemas.microsoft.com/office/drawing/2010/main" val="0"/>
+              </a:ext>
+            </a:extLst>
+          </a:blip>
+          <a:srcRect l="3809" t="9837" r="6059" b="7019"/>
+          <a:stretch>
+            <a:fillRect/>
+          </a:stretch>
+        </p:blipFill>
+        <p:spPr bwMode="auto">
+          <a:xfrm>
+            <a:off x="6675911" y="878865"/>
+            <a:ext cx="3172910" cy="1320638"/>
+          </a:xfrm>
+          <a:prstGeom prst="rect">
+            <a:avLst/>
+          </a:prstGeom>
+          <a:noFill/>
+        </p:spPr>
+      </p:pic>
+      <p:pic>
+        <p:nvPicPr>
+          <p:cNvPr id="9" name="Grafik 8">
             <a:extLst>
               <a:ext uri="{FF2B5EF4-FFF2-40B4-BE49-F238E27FC236}">
-                <a16:creationId xmlns:a16="http://schemas.microsoft.com/office/drawing/2014/main" xmlns="" id="{A8E625C4-6DB1-9D42-BFEA-DE37A6F928F3}"/>
+                <a16:creationId xmlns="" xmlns:a16="http://schemas.microsoft.com/office/drawing/2014/main" id="{5ACE5D07-54C6-4407-8C9E-551B71135727}"/>
               </a:ext>
             </a:extLst>
           </p:cNvPr>
-          <p:cNvSpPr>
-            <a:spLocks noGrp="1"/>
-          </p:cNvSpPr>
-          <p:nvPr>
-            <p:ph idx="1"/>
-          </p:nvPr>
-        </p:nvSpPr>
+          <p:cNvPicPr>
+            <a:picLocks noChangeAspect="1"/>
+          </p:cNvPicPr>
+          <p:nvPr/>
+        </p:nvPicPr>
+        <p:blipFill>
+          <a:blip r:embed="rId4"/>
+          <a:stretch>
+            <a:fillRect/>
+          </a:stretch>
+        </p:blipFill>
         <p:spPr>
           <a:xfrm>
-            <a:off x="5097419" y="963877"/>
-            <a:ext cx="5686424" cy="4930246"/>
+            <a:off x="5678328" y="3696570"/>
+            <a:ext cx="5168077" cy="2208060"/>
           </a:xfrm>
+          <a:prstGeom prst="rect">
+            <a:avLst/>
+          </a:prstGeom>
         </p:spPr>
-        <p:txBody>
-          <a:bodyPr anchor="ctr">
-            <a:normAutofit/>
+      </p:pic>
+      <p:cxnSp>
+        <p:nvCxnSpPr>
+          <p:cNvPr id="5" name="Gerade Verbindung mit Pfeil 4"/>
+          <p:cNvCxnSpPr/>
+          <p:nvPr/>
+        </p:nvCxnSpPr>
+        <p:spPr>
+          <a:xfrm flipH="1">
+            <a:off x="6458465" y="1079349"/>
+            <a:ext cx="502508" cy="3014856"/>
+          </a:xfrm>
+          <a:prstGeom prst="straightConnector1">
+            <a:avLst/>
+          </a:prstGeom>
+          <a:ln>
+            <a:tailEnd type="triangle"/>
+          </a:ln>
+        </p:spPr>
+        <p:style>
+          <a:lnRef idx="3">
+            <a:schemeClr val="accent1"/>
+          </a:lnRef>
+          <a:fillRef idx="0">
+            <a:schemeClr val="accent1"/>
+          </a:fillRef>
+          <a:effectRef idx="2">
+            <a:schemeClr val="accent1"/>
+          </a:effectRef>
+          <a:fontRef idx="minor">
+            <a:schemeClr val="tx1"/>
+          </a:fontRef>
+        </p:style>
+      </p:cxnSp>
+      <p:sp>
+        <p:nvSpPr>
+          <p:cNvPr id="7" name="Geschweifte Klammer rechts 6"/>
+          <p:cNvSpPr/>
+          <p:nvPr/>
+        </p:nvSpPr>
+        <p:spPr>
+          <a:xfrm rot="14587166">
+            <a:off x="6448706" y="3681924"/>
+            <a:ext cx="288325" cy="1219200"/>
+          </a:xfrm>
+          <a:prstGeom prst="rightBrace">
+            <a:avLst/>
+          </a:prstGeom>
+        </p:spPr>
+        <p:style>
+          <a:lnRef idx="3">
+            <a:schemeClr val="accent6"/>
+          </a:lnRef>
+          <a:fillRef idx="0">
+            <a:schemeClr val="accent6"/>
+          </a:fillRef>
+          <a:effectRef idx="2">
+            <a:schemeClr val="accent6"/>
+          </a:effectRef>
+          <a:fontRef idx="minor">
+            <a:schemeClr val="tx1"/>
+          </a:fontRef>
+        </p:style>
+        <p:txBody>
+          <a:bodyPr rtlCol="0" anchor="ctr"/>
+          <a:lstStyle/>
+          <a:p>
+            <a:pPr algn="ctr"/>
+            <a:endParaRPr lang="de-DE"/>
+          </a:p>
+        </p:txBody>
+      </p:sp>
+      <p:sp>
+        <p:nvSpPr>
+          <p:cNvPr id="10" name="Textfeld 9"/>
+          <p:cNvSpPr txBox="1"/>
+          <p:nvPr/>
+        </p:nvSpPr>
+        <p:spPr>
+          <a:xfrm>
+            <a:off x="4315425" y="5585750"/>
+            <a:ext cx="2573489" cy="923330"/>
+          </a:xfrm>
+          <a:prstGeom prst="rect">
+            <a:avLst/>
+          </a:prstGeom>
+        </p:spPr>
+        <p:style>
+          <a:lnRef idx="0">
+            <a:schemeClr val="accent5"/>
+          </a:lnRef>
+          <a:fillRef idx="3">
+            <a:schemeClr val="accent5"/>
+          </a:fillRef>
+          <a:effectRef idx="3">
+            <a:schemeClr val="accent5"/>
+          </a:effectRef>
+          <a:fontRef idx="minor">
+            <a:schemeClr val="lt1"/>
+          </a:fontRef>
+        </p:style>
+        <p:txBody>
+          <a:bodyPr wrap="square" rtlCol="0">
+            <a:spAutoFit/>
           </a:bodyPr>
           <a:lstStyle/>
           <a:p>
-            <a:pPr>
-              <a:buFont typeface="Wingdings" panose="05000000000000000000" pitchFamily="2" charset="2"/>
-              <a:buChar char="à"/>
-            </a:pPr>
-            <a:r>
-              <a:rPr lang="de-DE" smtClean="0">
-                <a:sym typeface="Wingdings" pitchFamily="2" charset="2"/>
-              </a:rPr>
-              <a:t>Inzidenzmatrix</a:t>
-            </a:r>
-          </a:p>
-          <a:p>
-            <a:pPr>
-              <a:buFont typeface="Wingdings" panose="05000000000000000000" pitchFamily="2" charset="2"/>
-              <a:buChar char="à"/>
-            </a:pPr>
+            <a:r>
+              <a:rPr lang="de-DE" dirty="0" smtClean="0"/>
+              <a:t>-1 = von B nach A</a:t>
+            </a:r>
+          </a:p>
+          <a:p>
+            <a:r>
+              <a:rPr lang="de-DE" dirty="0" smtClean="0"/>
+              <a:t>1 = von A nach B</a:t>
+            </a:r>
+          </a:p>
+          <a:p>
+            <a:r>
+              <a:rPr lang="de-DE" dirty="0" smtClean="0"/>
+              <a:t>0 = Keine Verbindung</a:t>
+            </a:r>
             <a:endParaRPr lang="de-DE" dirty="0"/>
+          </a:p>
+        </p:txBody>
+      </p:sp>
+      <p:sp>
+        <p:nvSpPr>
+          <p:cNvPr id="12" name="Ellipse 11"/>
+          <p:cNvSpPr/>
+          <p:nvPr/>
+        </p:nvSpPr>
+        <p:spPr>
+          <a:xfrm>
+            <a:off x="6780201" y="849985"/>
+            <a:ext cx="353767" cy="295074"/>
+          </a:xfrm>
+          <a:prstGeom prst="ellipse">
+            <a:avLst/>
+          </a:prstGeom>
+          <a:noFill/>
+          <a:ln w="19050">
+            <a:solidFill>
+              <a:srgbClr val="FF0000"/>
+            </a:solidFill>
+          </a:ln>
+        </p:spPr>
+        <p:style>
+          <a:lnRef idx="1">
+            <a:schemeClr val="accent4"/>
+          </a:lnRef>
+          <a:fillRef idx="2">
+            <a:schemeClr val="accent4"/>
+          </a:fillRef>
+          <a:effectRef idx="1">
+            <a:schemeClr val="accent4"/>
+          </a:effectRef>
+          <a:fontRef idx="minor">
+            <a:schemeClr val="dk1"/>
+          </a:fontRef>
+        </p:style>
+        <p:txBody>
+          <a:bodyPr rtlCol="0" anchor="ctr"/>
+          <a:lstStyle/>
+          <a:p>
+            <a:pPr algn="ctr"/>
+            <a:endParaRPr lang="de-DE"/>
           </a:p>
         </p:txBody>
       </p:sp>
@@ -10654,10 +10905,10 @@
           <p:cNvPr id="19" name="Rectangle 18">
             <a:extLst>
               <a:ext uri="{FF2B5EF4-FFF2-40B4-BE49-F238E27FC236}">
-                <a16:creationId xmlns:a16="http://schemas.microsoft.com/office/drawing/2014/main" xmlns="" id="{8D70B121-56F4-4848-B38B-182089D909FA}"/>
+                <a16:creationId xmlns="" xmlns:a16="http://schemas.microsoft.com/office/drawing/2014/main" id="{8D70B121-56F4-4848-B38B-182089D909FA}"/>
               </a:ext>
               <a:ext uri="{C183D7F6-B498-43B3-948B-1728B52AA6E4}">
-                <adec:decorative xmlns:adec="http://schemas.microsoft.com/office/drawing/2017/decorative" xmlns="" val="1"/>
+                <adec:decorative xmlns="" xmlns:adec="http://schemas.microsoft.com/office/drawing/2017/decorative" val="1"/>
               </a:ext>
             </a:extLst>
           </p:cNvPr>
@@ -10667,7 +10918,7 @@
           <p:nvPr>
             <p:extLst>
               <p:ext uri="{386F3935-93C4-4BCD-93E2-E3B085C9AB24}">
-                <p16:designElem xmlns:p16="http://schemas.microsoft.com/office/powerpoint/2015/main" xmlns="" val="1"/>
+                <p16:designElem xmlns="" xmlns:p16="http://schemas.microsoft.com/office/powerpoint/2015/main" val="1"/>
               </p:ext>
             </p:extLst>
           </p:nvPr>
@@ -10719,7 +10970,7 @@
           <p:cNvPr id="2" name="Titel 1">
             <a:extLst>
               <a:ext uri="{FF2B5EF4-FFF2-40B4-BE49-F238E27FC236}">
-                <a16:creationId xmlns:a16="http://schemas.microsoft.com/office/drawing/2014/main" xmlns="" id="{35BFDC70-A169-E142-B051-5ABC9190E094}"/>
+                <a16:creationId xmlns="" xmlns:a16="http://schemas.microsoft.com/office/drawing/2014/main" id="{35BFDC70-A169-E142-B051-5ABC9190E094}"/>
               </a:ext>
             </a:extLst>
           </p:cNvPr>
@@ -10749,7 +11000,39 @@
                   <a:schemeClr val="accent1"/>
                 </a:solidFill>
               </a:rPr>
-              <a:t>Der Code</a:t>
+              <a:t>Was </a:t>
+            </a:r>
+            <a:r>
+              <a:rPr lang="en-US" dirty="0" err="1" smtClean="0">
+                <a:solidFill>
+                  <a:schemeClr val="accent1"/>
+                </a:solidFill>
+              </a:rPr>
+              <a:t>brauchen</a:t>
+            </a:r>
+            <a:r>
+              <a:rPr lang="en-US" dirty="0" smtClean="0">
+                <a:solidFill>
+                  <a:schemeClr val="accent1"/>
+                </a:solidFill>
+              </a:rPr>
+              <a:t> </a:t>
+            </a:r>
+            <a:r>
+              <a:rPr lang="en-US" dirty="0" err="1" smtClean="0">
+                <a:solidFill>
+                  <a:schemeClr val="accent1"/>
+                </a:solidFill>
+              </a:rPr>
+              <a:t>wir</a:t>
+            </a:r>
+            <a:r>
+              <a:rPr lang="en-US" dirty="0" smtClean="0">
+                <a:solidFill>
+                  <a:schemeClr val="accent1"/>
+                </a:solidFill>
+              </a:rPr>
+              <a:t>?</a:t>
             </a:r>
             <a:endParaRPr lang="en-US" kern="1200" dirty="0">
               <a:solidFill>
@@ -10767,10 +11050,10 @@
           <p:cNvPr id="21" name="Straight Connector 20">
             <a:extLst>
               <a:ext uri="{FF2B5EF4-FFF2-40B4-BE49-F238E27FC236}">
-                <a16:creationId xmlns:a16="http://schemas.microsoft.com/office/drawing/2014/main" xmlns="" id="{2D72A2C9-F3CA-4216-8BAD-FA4C970C3C4E}"/>
+                <a16:creationId xmlns="" xmlns:a16="http://schemas.microsoft.com/office/drawing/2014/main" id="{2D72A2C9-F3CA-4216-8BAD-FA4C970C3C4E}"/>
               </a:ext>
               <a:ext uri="{C183D7F6-B498-43B3-948B-1728B52AA6E4}">
-                <adec:decorative xmlns:adec="http://schemas.microsoft.com/office/drawing/2017/decorative" xmlns="" val="1"/>
+                <adec:decorative xmlns="" xmlns:adec="http://schemas.microsoft.com/office/drawing/2017/decorative" val="1"/>
               </a:ext>
             </a:extLst>
           </p:cNvPr>
@@ -10780,7 +11063,7 @@
           <p:nvPr>
             <p:extLst>
               <p:ext uri="{386F3935-93C4-4BCD-93E2-E3B085C9AB24}">
-                <p16:designElem xmlns:p16="http://schemas.microsoft.com/office/powerpoint/2015/main" xmlns="" val="1"/>
+                <p16:designElem xmlns="" xmlns:p16="http://schemas.microsoft.com/office/powerpoint/2015/main" val="1"/>
               </p:ext>
             </p:extLst>
           </p:nvPr>
@@ -10817,39 +11100,134 @@
           </a:fontRef>
         </p:style>
       </p:cxnSp>
-      <p:pic>
-        <p:nvPicPr>
-          <p:cNvPr id="4" name="Inhaltsplatzhalter 3"/>
-          <p:cNvPicPr>
-            <a:picLocks noGrp="1" noChangeAspect="1"/>
-          </p:cNvPicPr>
-          <p:nvPr>
-            <p:ph idx="1"/>
-          </p:nvPr>
-        </p:nvPicPr>
-        <p:blipFill>
-          <a:blip r:embed="rId3">
-            <a:extLst>
-              <a:ext uri="{28A0092B-C50C-407E-A947-70E740481C1C}">
-                <a14:useLocalDpi xmlns:a14="http://schemas.microsoft.com/office/drawing/2010/main" val="0"/>
-              </a:ext>
-            </a:extLst>
-          </a:blip>
-          <a:stretch>
-            <a:fillRect/>
-          </a:stretch>
-        </p:blipFill>
+      <p:sp>
+        <p:nvSpPr>
+          <p:cNvPr id="3" name="Textfeld 2"/>
+          <p:cNvSpPr txBox="1"/>
+          <p:nvPr/>
+        </p:nvSpPr>
         <p:spPr>
           <a:xfrm>
-            <a:off x="7301071" y="2467704"/>
-            <a:ext cx="1922591" cy="1922591"/>
+            <a:off x="5123750" y="2553780"/>
+            <a:ext cx="6277233" cy="2308324"/>
           </a:xfrm>
+          <a:prstGeom prst="rect">
+            <a:avLst/>
+          </a:prstGeom>
+          <a:noFill/>
         </p:spPr>
-      </p:pic>
+        <p:txBody>
+          <a:bodyPr wrap="square" rtlCol="0">
+            <a:spAutoFit/>
+          </a:bodyPr>
+          <a:lstStyle/>
+          <a:p>
+            <a:pPr marL="342900" indent="-342900">
+              <a:buAutoNum type="arabicPeriod"/>
+            </a:pPr>
+            <a:r>
+              <a:rPr lang="de-DE" dirty="0" smtClean="0"/>
+              <a:t>Anzahl der Kanten</a:t>
+            </a:r>
+          </a:p>
+          <a:p>
+            <a:pPr marL="342900" indent="-342900">
+              <a:buAutoNum type="arabicPeriod"/>
+            </a:pPr>
+            <a:r>
+              <a:rPr lang="de-DE" dirty="0" smtClean="0"/>
+              <a:t>Anzahl der Knoten</a:t>
+            </a:r>
+          </a:p>
+          <a:p>
+            <a:pPr marL="342900" indent="-342900">
+              <a:buAutoNum type="arabicPeriod"/>
+            </a:pPr>
+            <a:r>
+              <a:rPr lang="de-DE" dirty="0" smtClean="0"/>
+              <a:t>Eine Inzidenz Matrix</a:t>
+            </a:r>
+          </a:p>
+          <a:p>
+            <a:pPr marL="342900" indent="-342900">
+              <a:buAutoNum type="arabicPeriod"/>
+            </a:pPr>
+            <a:r>
+              <a:rPr lang="de-DE" dirty="0" smtClean="0"/>
+              <a:t>Einen Vektor gegen den wir optimieren ( c )</a:t>
+            </a:r>
+          </a:p>
+          <a:p>
+            <a:pPr marL="342900" indent="-342900">
+              <a:buAutoNum type="arabicPeriod"/>
+            </a:pPr>
+            <a:r>
+              <a:rPr lang="de-DE" dirty="0" smtClean="0"/>
+              <a:t>Eine Vektor zur Überprüfung ( b ) </a:t>
+            </a:r>
+          </a:p>
+          <a:p>
+            <a:pPr marL="342900" indent="-342900">
+              <a:buAutoNum type="arabicPeriod"/>
+            </a:pPr>
+            <a:r>
+              <a:rPr lang="de-DE" dirty="0" err="1" smtClean="0"/>
+              <a:t>Lower</a:t>
+            </a:r>
+            <a:r>
+              <a:rPr lang="de-DE" dirty="0" smtClean="0"/>
+              <a:t>- und </a:t>
+            </a:r>
+            <a:r>
+              <a:rPr lang="de-DE" dirty="0" err="1" smtClean="0"/>
+              <a:t>Upper-Bound</a:t>
+            </a:r>
+            <a:r>
+              <a:rPr lang="de-DE" dirty="0" smtClean="0"/>
+              <a:t> ( </a:t>
+            </a:r>
+            <a:r>
+              <a:rPr lang="de-DE" dirty="0" err="1" smtClean="0"/>
+              <a:t>lb</a:t>
+            </a:r>
+            <a:r>
+              <a:rPr lang="de-DE" dirty="0" smtClean="0"/>
+              <a:t>, </a:t>
+            </a:r>
+            <a:r>
+              <a:rPr lang="de-DE" dirty="0" err="1" smtClean="0"/>
+              <a:t>ub</a:t>
+            </a:r>
+            <a:r>
+              <a:rPr lang="de-DE" dirty="0" smtClean="0"/>
+              <a:t> )</a:t>
+            </a:r>
+          </a:p>
+          <a:p>
+            <a:pPr marL="342900" indent="-342900">
+              <a:buAutoNum type="arabicPeriod"/>
+            </a:pPr>
+            <a:r>
+              <a:rPr lang="de-DE" dirty="0" err="1" smtClean="0"/>
+              <a:t>Ax</a:t>
+            </a:r>
+            <a:r>
+              <a:rPr lang="de-DE" dirty="0" smtClean="0"/>
+              <a:t> = b </a:t>
+            </a:r>
+          </a:p>
+          <a:p>
+            <a:pPr marL="342900" indent="-342900">
+              <a:buAutoNum type="arabicPeriod"/>
+            </a:pPr>
+            <a:endParaRPr lang="de-DE" dirty="0"/>
+          </a:p>
+        </p:txBody>
+      </p:sp>
     </p:spTree>
     <p:extLst>
       <p:ext uri="{BB962C8B-B14F-4D97-AF65-F5344CB8AC3E}">
-        <p14:creationId xmlns:p14="http://schemas.microsoft.com/office/powerpoint/2010/main" val="1172390065"/>
+        <p14:creationId xmlns:p14="http://schemas.microsoft.com/office/powerpoint/2010/main" val="101354344"/>
       </p:ext>
     </p:extLst>
   </p:cSld>
@@ -10893,13 +11271,13 @@
       </p:grpSpPr>
       <p:sp>
         <p:nvSpPr>
-          <p:cNvPr id="8" name="Rectangle 7">
+          <p:cNvPr id="19" name="Rectangle 18">
             <a:extLst>
               <a:ext uri="{FF2B5EF4-FFF2-40B4-BE49-F238E27FC236}">
-                <a16:creationId xmlns:a16="http://schemas.microsoft.com/office/drawing/2014/main" xmlns="" id="{8D70B121-56F4-4848-B38B-182089D909FA}"/>
+                <a16:creationId xmlns="" xmlns:a16="http://schemas.microsoft.com/office/drawing/2014/main" id="{8D70B121-56F4-4848-B38B-182089D909FA}"/>
               </a:ext>
               <a:ext uri="{C183D7F6-B498-43B3-948B-1728B52AA6E4}">
-                <adec:decorative xmlns:adec="http://schemas.microsoft.com/office/drawing/2017/decorative" xmlns="" val="1"/>
+                <adec:decorative xmlns="" xmlns:adec="http://schemas.microsoft.com/office/drawing/2017/decorative" val="1"/>
               </a:ext>
             </a:extLst>
           </p:cNvPr>
@@ -10909,7 +11287,7 @@
           <p:nvPr>
             <p:extLst>
               <p:ext uri="{386F3935-93C4-4BCD-93E2-E3B085C9AB24}">
-                <p16:designElem xmlns:p16="http://schemas.microsoft.com/office/powerpoint/2015/main" xmlns="" val="1"/>
+                <p16:designElem xmlns="" xmlns:p16="http://schemas.microsoft.com/office/powerpoint/2015/main" val="1"/>
               </p:ext>
             </p:extLst>
           </p:nvPr>
@@ -10961,7 +11339,7 @@
           <p:cNvPr id="2" name="Titel 1">
             <a:extLst>
               <a:ext uri="{FF2B5EF4-FFF2-40B4-BE49-F238E27FC236}">
-                <a16:creationId xmlns:a16="http://schemas.microsoft.com/office/drawing/2014/main" xmlns="" id="{0B5D0F8F-C92F-BC46-ACC4-7A21698DD272}"/>
+                <a16:creationId xmlns="" xmlns:a16="http://schemas.microsoft.com/office/drawing/2014/main" id="{35BFDC70-A169-E142-B051-5ABC9190E094}"/>
               </a:ext>
             </a:extLst>
           </p:cNvPr>
@@ -10974,37 +11352,45 @@
         </p:nvSpPr>
         <p:spPr>
           <a:xfrm>
-            <a:off x="838200" y="963877"/>
-            <a:ext cx="3494362" cy="4930246"/>
+            <a:off x="861390" y="963877"/>
+            <a:ext cx="3471171" cy="4930246"/>
           </a:xfrm>
         </p:spPr>
         <p:txBody>
-          <a:bodyPr>
+          <a:bodyPr vert="horz" lIns="91440" tIns="45720" rIns="91440" bIns="45720" rtlCol="0">
             <a:normAutofit/>
           </a:bodyPr>
           <a:lstStyle/>
           <a:p>
-            <a:pPr algn="r"/>
-            <a:r>
-              <a:rPr lang="de-DE" dirty="0">
+            <a:pPr algn="ctr"/>
+            <a:r>
+              <a:rPr lang="en-US" dirty="0" smtClean="0">
                 <a:solidFill>
                   <a:schemeClr val="accent1"/>
                 </a:solidFill>
               </a:rPr>
-              <a:t>Gliederung	</a:t>
-            </a:r>
+              <a:t>Der Code</a:t>
+            </a:r>
+            <a:endParaRPr lang="en-US" kern="1200" dirty="0">
+              <a:solidFill>
+                <a:schemeClr val="accent1"/>
+              </a:solidFill>
+              <a:latin typeface="+mj-lt"/>
+              <a:ea typeface="+mj-ea"/>
+              <a:cs typeface="+mj-cs"/>
+            </a:endParaRPr>
           </a:p>
         </p:txBody>
       </p:sp>
       <p:cxnSp>
         <p:nvCxnSpPr>
-          <p:cNvPr id="10" name="Straight Connector 9">
+          <p:cNvPr id="21" name="Straight Connector 20">
             <a:extLst>
               <a:ext uri="{FF2B5EF4-FFF2-40B4-BE49-F238E27FC236}">
-                <a16:creationId xmlns:a16="http://schemas.microsoft.com/office/drawing/2014/main" xmlns="" id="{2D72A2C9-F3CA-4216-8BAD-FA4C970C3C4E}"/>
+                <a16:creationId xmlns="" xmlns:a16="http://schemas.microsoft.com/office/drawing/2014/main" id="{2D72A2C9-F3CA-4216-8BAD-FA4C970C3C4E}"/>
               </a:ext>
               <a:ext uri="{C183D7F6-B498-43B3-948B-1728B52AA6E4}">
-                <adec:decorative xmlns:adec="http://schemas.microsoft.com/office/drawing/2017/decorative" xmlns="" val="1"/>
+                <adec:decorative xmlns="" xmlns:adec="http://schemas.microsoft.com/office/drawing/2017/decorative" val="1"/>
               </a:ext>
             </a:extLst>
           </p:cNvPr>
@@ -11014,7 +11400,7 @@
           <p:nvPr>
             <p:extLst>
               <p:ext uri="{386F3935-93C4-4BCD-93E2-E3B085C9AB24}">
-                <p16:designElem xmlns:p16="http://schemas.microsoft.com/office/powerpoint/2015/main" xmlns="" val="1"/>
+                <p16:designElem xmlns="" xmlns:p16="http://schemas.microsoft.com/office/powerpoint/2015/main" val="1"/>
               </p:ext>
             </p:extLst>
           </p:nvPr>
@@ -11051,106 +11437,39 @@
           </a:fontRef>
         </p:style>
       </p:cxnSp>
-      <p:sp>
-        <p:nvSpPr>
-          <p:cNvPr id="3" name="Inhaltsplatzhalter 2">
+      <p:pic>
+        <p:nvPicPr>
+          <p:cNvPr id="4" name="Inhaltsplatzhalter 3"/>
+          <p:cNvPicPr>
+            <a:picLocks noGrp="1" noChangeAspect="1"/>
+          </p:cNvPicPr>
+          <p:nvPr>
+            <p:ph idx="1"/>
+          </p:nvPr>
+        </p:nvPicPr>
+        <p:blipFill>
+          <a:blip r:embed="rId3">
             <a:extLst>
-              <a:ext uri="{FF2B5EF4-FFF2-40B4-BE49-F238E27FC236}">
-                <a16:creationId xmlns:a16="http://schemas.microsoft.com/office/drawing/2014/main" xmlns="" id="{692C889E-3E0C-9E40-9512-4230892B2B42}"/>
+              <a:ext uri="{28A0092B-C50C-407E-A947-70E740481C1C}">
+                <a14:useLocalDpi xmlns:a14="http://schemas.microsoft.com/office/drawing/2010/main" val="0"/>
               </a:ext>
             </a:extLst>
-          </p:cNvPr>
-          <p:cNvSpPr>
-            <a:spLocks noGrp="1"/>
-          </p:cNvSpPr>
-          <p:nvPr>
-            <p:ph idx="1"/>
-          </p:nvPr>
-        </p:nvSpPr>
+          </a:blip>
+          <a:stretch>
+            <a:fillRect/>
+          </a:stretch>
+        </p:blipFill>
         <p:spPr>
           <a:xfrm>
-            <a:off x="4976031" y="963877"/>
-            <a:ext cx="6377769" cy="4930246"/>
+            <a:off x="7301071" y="2467704"/>
+            <a:ext cx="1922591" cy="1922591"/>
           </a:xfrm>
         </p:spPr>
-        <p:txBody>
-          <a:bodyPr anchor="ctr">
-            <a:normAutofit/>
-          </a:bodyPr>
-          <a:lstStyle/>
-          <a:p>
-            <a:r>
-              <a:rPr lang="de-DE" sz="2400" dirty="0"/>
-              <a:t>Einführung in das Thema</a:t>
-            </a:r>
-          </a:p>
-          <a:p>
-            <a:r>
-              <a:rPr lang="de-DE" sz="2400" dirty="0"/>
-              <a:t>Theoretische Grundlagen</a:t>
-            </a:r>
-          </a:p>
-          <a:p>
-            <a:pPr lvl="1"/>
-            <a:r>
-              <a:rPr lang="de-DE" sz="2000" dirty="0"/>
-              <a:t>Anwendungen</a:t>
-            </a:r>
-          </a:p>
-          <a:p>
-            <a:r>
-              <a:rPr lang="de-DE" sz="2400" dirty="0"/>
-              <a:t>Aufgabenstellung</a:t>
-            </a:r>
-          </a:p>
-          <a:p>
-            <a:r>
-              <a:rPr lang="de-DE" sz="2400" dirty="0"/>
-              <a:t>Implementierung</a:t>
-            </a:r>
-          </a:p>
-          <a:p>
-            <a:pPr lvl="1"/>
-            <a:r>
-              <a:rPr lang="de-DE" sz="2000" dirty="0"/>
-              <a:t>Herangehensweise </a:t>
-            </a:r>
-          </a:p>
-          <a:p>
-            <a:pPr lvl="1"/>
-            <a:r>
-              <a:rPr lang="de-DE" sz="2000" dirty="0"/>
-              <a:t>Einführung in den </a:t>
-            </a:r>
-            <a:r>
-              <a:rPr lang="de-DE" sz="2000" dirty="0" smtClean="0"/>
-              <a:t>Code</a:t>
-            </a:r>
-          </a:p>
-          <a:p>
-            <a:pPr lvl="1"/>
-            <a:r>
-              <a:rPr lang="de-DE" sz="2000" dirty="0" smtClean="0">
-                <a:solidFill>
-                  <a:srgbClr val="0070C0"/>
-                </a:solidFill>
-              </a:rPr>
-              <a:t>Präsentation des Ergebnisses</a:t>
-            </a:r>
-          </a:p>
-          <a:p>
-            <a:r>
-              <a:rPr lang="de-DE" sz="2400" dirty="0" smtClean="0"/>
-              <a:t>Fazit </a:t>
-            </a:r>
-            <a:endParaRPr lang="de-DE" sz="2400" dirty="0"/>
-          </a:p>
-        </p:txBody>
-      </p:sp>
+      </p:pic>
     </p:spTree>
     <p:extLst>
       <p:ext uri="{BB962C8B-B14F-4D97-AF65-F5344CB8AC3E}">
-        <p14:creationId xmlns:p14="http://schemas.microsoft.com/office/powerpoint/2010/main" val="3478974392"/>
+        <p14:creationId xmlns:p14="http://schemas.microsoft.com/office/powerpoint/2010/main" val="1172390065"/>
       </p:ext>
     </p:extLst>
   </p:cSld>
@@ -11197,10 +11516,10 @@
           <p:cNvPr id="8" name="Rectangle 7">
             <a:extLst>
               <a:ext uri="{FF2B5EF4-FFF2-40B4-BE49-F238E27FC236}">
-                <a16:creationId xmlns:a16="http://schemas.microsoft.com/office/drawing/2014/main" xmlns="" id="{8D70B121-56F4-4848-B38B-182089D909FA}"/>
+                <a16:creationId xmlns="" xmlns:a16="http://schemas.microsoft.com/office/drawing/2014/main" id="{8D70B121-56F4-4848-B38B-182089D909FA}"/>
               </a:ext>
               <a:ext uri="{C183D7F6-B498-43B3-948B-1728B52AA6E4}">
-                <adec:decorative xmlns:adec="http://schemas.microsoft.com/office/drawing/2017/decorative" xmlns="" val="1"/>
+                <adec:decorative xmlns="" xmlns:adec="http://schemas.microsoft.com/office/drawing/2017/decorative" val="1"/>
               </a:ext>
             </a:extLst>
           </p:cNvPr>
@@ -11210,7 +11529,7 @@
           <p:nvPr>
             <p:extLst>
               <p:ext uri="{386F3935-93C4-4BCD-93E2-E3B085C9AB24}">
-                <p16:designElem xmlns:p16="http://schemas.microsoft.com/office/powerpoint/2015/main" xmlns="" val="1"/>
+                <p16:designElem xmlns="" xmlns:p16="http://schemas.microsoft.com/office/powerpoint/2015/main" val="1"/>
               </p:ext>
             </p:extLst>
           </p:nvPr>
@@ -11259,6 +11578,307 @@
       </p:sp>
       <p:sp>
         <p:nvSpPr>
+          <p:cNvPr id="2" name="Titel 1">
+            <a:extLst>
+              <a:ext uri="{FF2B5EF4-FFF2-40B4-BE49-F238E27FC236}">
+                <a16:creationId xmlns="" xmlns:a16="http://schemas.microsoft.com/office/drawing/2014/main" id="{0B5D0F8F-C92F-BC46-ACC4-7A21698DD272}"/>
+              </a:ext>
+            </a:extLst>
+          </p:cNvPr>
+          <p:cNvSpPr>
+            <a:spLocks noGrp="1"/>
+          </p:cNvSpPr>
+          <p:nvPr>
+            <p:ph type="title"/>
+          </p:nvPr>
+        </p:nvSpPr>
+        <p:spPr>
+          <a:xfrm>
+            <a:off x="838200" y="963877"/>
+            <a:ext cx="3494362" cy="4930246"/>
+          </a:xfrm>
+        </p:spPr>
+        <p:txBody>
+          <a:bodyPr>
+            <a:normAutofit/>
+          </a:bodyPr>
+          <a:lstStyle/>
+          <a:p>
+            <a:pPr algn="r"/>
+            <a:r>
+              <a:rPr lang="de-DE" dirty="0">
+                <a:solidFill>
+                  <a:schemeClr val="accent1"/>
+                </a:solidFill>
+              </a:rPr>
+              <a:t>Gliederung	</a:t>
+            </a:r>
+          </a:p>
+        </p:txBody>
+      </p:sp>
+      <p:cxnSp>
+        <p:nvCxnSpPr>
+          <p:cNvPr id="10" name="Straight Connector 9">
+            <a:extLst>
+              <a:ext uri="{FF2B5EF4-FFF2-40B4-BE49-F238E27FC236}">
+                <a16:creationId xmlns="" xmlns:a16="http://schemas.microsoft.com/office/drawing/2014/main" id="{2D72A2C9-F3CA-4216-8BAD-FA4C970C3C4E}"/>
+              </a:ext>
+              <a:ext uri="{C183D7F6-B498-43B3-948B-1728B52AA6E4}">
+                <adec:decorative xmlns="" xmlns:adec="http://schemas.microsoft.com/office/drawing/2017/decorative" val="1"/>
+              </a:ext>
+            </a:extLst>
+          </p:cNvPr>
+          <p:cNvCxnSpPr>
+            <a:cxnSpLocks noGrp="1" noRot="1" noChangeAspect="1" noMove="1" noResize="1" noEditPoints="1" noAdjustHandles="1" noChangeArrowheads="1" noChangeShapeType="1"/>
+          </p:cNvCxnSpPr>
+          <p:nvPr>
+            <p:extLst>
+              <p:ext uri="{386F3935-93C4-4BCD-93E2-E3B085C9AB24}">
+                <p16:designElem xmlns="" xmlns:p16="http://schemas.microsoft.com/office/powerpoint/2015/main" val="1"/>
+              </p:ext>
+            </p:extLst>
+          </p:nvPr>
+        </p:nvCxnSpPr>
+        <p:spPr>
+          <a:xfrm>
+            <a:off x="4654296" y="2057400"/>
+            <a:ext cx="0" cy="2743200"/>
+          </a:xfrm>
+          <a:prstGeom prst="line">
+            <a:avLst/>
+          </a:prstGeom>
+          <a:ln w="19050">
+            <a:solidFill>
+              <a:schemeClr val="tx1">
+                <a:lumMod val="85000"/>
+                <a:lumOff val="15000"/>
+              </a:schemeClr>
+            </a:solidFill>
+          </a:ln>
+        </p:spPr>
+        <p:style>
+          <a:lnRef idx="1">
+            <a:schemeClr val="accent1"/>
+          </a:lnRef>
+          <a:fillRef idx="0">
+            <a:schemeClr val="accent1"/>
+          </a:fillRef>
+          <a:effectRef idx="0">
+            <a:schemeClr val="accent1"/>
+          </a:effectRef>
+          <a:fontRef idx="minor">
+            <a:schemeClr val="tx1"/>
+          </a:fontRef>
+        </p:style>
+      </p:cxnSp>
+      <p:sp>
+        <p:nvSpPr>
+          <p:cNvPr id="3" name="Inhaltsplatzhalter 2">
+            <a:extLst>
+              <a:ext uri="{FF2B5EF4-FFF2-40B4-BE49-F238E27FC236}">
+                <a16:creationId xmlns="" xmlns:a16="http://schemas.microsoft.com/office/drawing/2014/main" id="{692C889E-3E0C-9E40-9512-4230892B2B42}"/>
+              </a:ext>
+            </a:extLst>
+          </p:cNvPr>
+          <p:cNvSpPr>
+            <a:spLocks noGrp="1"/>
+          </p:cNvSpPr>
+          <p:nvPr>
+            <p:ph idx="1"/>
+          </p:nvPr>
+        </p:nvSpPr>
+        <p:spPr>
+          <a:xfrm>
+            <a:off x="4976031" y="963877"/>
+            <a:ext cx="6377769" cy="4930246"/>
+          </a:xfrm>
+        </p:spPr>
+        <p:txBody>
+          <a:bodyPr anchor="ctr">
+            <a:normAutofit/>
+          </a:bodyPr>
+          <a:lstStyle/>
+          <a:p>
+            <a:r>
+              <a:rPr lang="de-DE" sz="2400" dirty="0"/>
+              <a:t>Einführung in das Thema</a:t>
+            </a:r>
+          </a:p>
+          <a:p>
+            <a:r>
+              <a:rPr lang="de-DE" sz="2400" dirty="0"/>
+              <a:t>Theoretische Grundlagen</a:t>
+            </a:r>
+          </a:p>
+          <a:p>
+            <a:pPr lvl="1"/>
+            <a:r>
+              <a:rPr lang="de-DE" sz="2000" dirty="0"/>
+              <a:t>Anwendungen</a:t>
+            </a:r>
+          </a:p>
+          <a:p>
+            <a:r>
+              <a:rPr lang="de-DE" sz="2400" dirty="0"/>
+              <a:t>Aufgabenstellung</a:t>
+            </a:r>
+          </a:p>
+          <a:p>
+            <a:r>
+              <a:rPr lang="de-DE" sz="2400" dirty="0"/>
+              <a:t>Implementierung</a:t>
+            </a:r>
+          </a:p>
+          <a:p>
+            <a:pPr lvl="1"/>
+            <a:r>
+              <a:rPr lang="de-DE" sz="2000" dirty="0"/>
+              <a:t>Herangehensweise </a:t>
+            </a:r>
+          </a:p>
+          <a:p>
+            <a:pPr lvl="1"/>
+            <a:r>
+              <a:rPr lang="de-DE" sz="2000" dirty="0"/>
+              <a:t>Einführung in den </a:t>
+            </a:r>
+            <a:r>
+              <a:rPr lang="de-DE" sz="2000" dirty="0" smtClean="0"/>
+              <a:t>Code</a:t>
+            </a:r>
+          </a:p>
+          <a:p>
+            <a:pPr lvl="1"/>
+            <a:r>
+              <a:rPr lang="de-DE" sz="2000" dirty="0" smtClean="0">
+                <a:solidFill>
+                  <a:srgbClr val="0070C0"/>
+                </a:solidFill>
+              </a:rPr>
+              <a:t>Präsentation des Ergebnisses</a:t>
+            </a:r>
+          </a:p>
+          <a:p>
+            <a:r>
+              <a:rPr lang="de-DE" sz="2400" dirty="0" smtClean="0"/>
+              <a:t>Fazit </a:t>
+            </a:r>
+            <a:endParaRPr lang="de-DE" sz="2400" dirty="0"/>
+          </a:p>
+        </p:txBody>
+      </p:sp>
+    </p:spTree>
+    <p:extLst>
+      <p:ext uri="{BB962C8B-B14F-4D97-AF65-F5344CB8AC3E}">
+        <p14:creationId xmlns:p14="http://schemas.microsoft.com/office/powerpoint/2010/main" val="3478974392"/>
+      </p:ext>
+    </p:extLst>
+  </p:cSld>
+  <p:clrMapOvr>
+    <a:masterClrMapping/>
+  </p:clrMapOvr>
+  <p:timing>
+    <p:tnLst>
+      <p:par>
+        <p:cTn id="1" dur="indefinite" restart="never" nodeType="tmRoot"/>
+      </p:par>
+    </p:tnLst>
+  </p:timing>
+</p:sld>
+</file>
+
+<file path=ppt/slides/slide28.xml><?xml version="1.0" encoding="utf-8"?>
+<p:sld xmlns:a="http://schemas.openxmlformats.org/drawingml/2006/main" xmlns:r="http://schemas.openxmlformats.org/officeDocument/2006/relationships" xmlns:p="http://schemas.openxmlformats.org/presentationml/2006/main">
+  <p:cSld>
+    <p:bg>
+      <p:bgPr>
+        <a:solidFill>
+          <a:schemeClr val="bg1"/>
+        </a:solidFill>
+        <a:effectLst/>
+      </p:bgPr>
+    </p:bg>
+    <p:spTree>
+      <p:nvGrpSpPr>
+        <p:cNvPr id="1" name=""/>
+        <p:cNvGrpSpPr/>
+        <p:nvPr/>
+      </p:nvGrpSpPr>
+      <p:grpSpPr>
+        <a:xfrm>
+          <a:off x="0" y="0"/>
+          <a:ext cx="0" cy="0"/>
+          <a:chOff x="0" y="0"/>
+          <a:chExt cx="0" cy="0"/>
+        </a:xfrm>
+      </p:grpSpPr>
+      <p:sp>
+        <p:nvSpPr>
+          <p:cNvPr id="8" name="Rectangle 7">
+            <a:extLst>
+              <a:ext uri="{FF2B5EF4-FFF2-40B4-BE49-F238E27FC236}">
+                <a16:creationId xmlns="" xmlns:a16="http://schemas.microsoft.com/office/drawing/2014/main" id="{8D70B121-56F4-4848-B38B-182089D909FA}"/>
+              </a:ext>
+              <a:ext uri="{C183D7F6-B498-43B3-948B-1728B52AA6E4}">
+                <adec:decorative xmlns="" xmlns:adec="http://schemas.microsoft.com/office/drawing/2017/decorative" val="1"/>
+              </a:ext>
+            </a:extLst>
+          </p:cNvPr>
+          <p:cNvSpPr>
+            <a:spLocks noGrp="1" noRot="1" noChangeAspect="1" noMove="1" noResize="1" noEditPoints="1" noAdjustHandles="1" noChangeArrowheads="1" noChangeShapeType="1" noTextEdit="1"/>
+          </p:cNvSpPr>
+          <p:nvPr>
+            <p:extLst>
+              <p:ext uri="{386F3935-93C4-4BCD-93E2-E3B085C9AB24}">
+                <p16:designElem xmlns="" xmlns:p16="http://schemas.microsoft.com/office/powerpoint/2015/main" val="1"/>
+              </p:ext>
+            </p:extLst>
+          </p:nvPr>
+        </p:nvSpPr>
+        <p:spPr bwMode="ltGray">
+          <a:xfrm>
+            <a:off x="321564" y="320040"/>
+            <a:ext cx="11548872" cy="6217920"/>
+          </a:xfrm>
+          <a:prstGeom prst="rect">
+            <a:avLst/>
+          </a:prstGeom>
+          <a:solidFill>
+            <a:schemeClr val="tx1">
+              <a:alpha val="8000"/>
+            </a:schemeClr>
+          </a:solidFill>
+          <a:ln w="127000" cap="sq" cmpd="thinThick">
+            <a:noFill/>
+          </a:ln>
+        </p:spPr>
+        <p:style>
+          <a:lnRef idx="2">
+            <a:schemeClr val="accent1">
+              <a:shade val="50000"/>
+            </a:schemeClr>
+          </a:lnRef>
+          <a:fillRef idx="1">
+            <a:schemeClr val="accent1"/>
+          </a:fillRef>
+          <a:effectRef idx="0">
+            <a:schemeClr val="accent1"/>
+          </a:effectRef>
+          <a:fontRef idx="minor">
+            <a:schemeClr val="lt1"/>
+          </a:fontRef>
+        </p:style>
+        <p:txBody>
+          <a:bodyPr rtlCol="0" anchor="ctr"/>
+          <a:lstStyle/>
+          <a:p>
+            <a:pPr algn="ctr"/>
+            <a:endParaRPr lang="en-US"/>
+          </a:p>
+        </p:txBody>
+      </p:sp>
+      <p:sp>
+        <p:nvSpPr>
           <p:cNvPr id="6" name="Textfeld 5"/>
           <p:cNvSpPr txBox="1"/>
           <p:nvPr/>
@@ -11314,7 +11934,7 @@
           <p:cNvPr id="9" name="Gruppieren 8">
             <a:extLst>
               <a:ext uri="{FF2B5EF4-FFF2-40B4-BE49-F238E27FC236}">
-                <a16:creationId xmlns:a16="http://schemas.microsoft.com/office/drawing/2014/main" xmlns="" id="{50ECC846-FE00-5642-8853-EEE6E8A01659}"/>
+                <a16:creationId xmlns="" xmlns:a16="http://schemas.microsoft.com/office/drawing/2014/main" id="{50ECC846-FE00-5642-8853-EEE6E8A01659}"/>
               </a:ext>
             </a:extLst>
           </p:cNvPr>
@@ -11334,7 +11954,7 @@
             <p:cNvPr id="12" name="Dreieck 22">
               <a:extLst>
                 <a:ext uri="{FF2B5EF4-FFF2-40B4-BE49-F238E27FC236}">
-                  <a16:creationId xmlns:a16="http://schemas.microsoft.com/office/drawing/2014/main" xmlns="" id="{C58FCFF5-FFE5-1240-AE4D-8FE755FB7696}"/>
+                  <a16:creationId xmlns="" xmlns:a16="http://schemas.microsoft.com/office/drawing/2014/main" id="{C58FCFF5-FFE5-1240-AE4D-8FE755FB7696}"/>
                 </a:ext>
               </a:extLst>
             </p:cNvPr>
@@ -11380,7 +12000,7 @@
             <p:cNvPr id="11" name="Grafik 10">
               <a:extLst>
                 <a:ext uri="{FF2B5EF4-FFF2-40B4-BE49-F238E27FC236}">
-                  <a16:creationId xmlns:a16="http://schemas.microsoft.com/office/drawing/2014/main" xmlns="" id="{4E6774A5-9359-5A4C-9D07-47945BA0A9B3}"/>
+                  <a16:creationId xmlns="" xmlns:a16="http://schemas.microsoft.com/office/drawing/2014/main" id="{4E6774A5-9359-5A4C-9D07-47945BA0A9B3}"/>
                 </a:ext>
               </a:extLst>
             </p:cNvPr>
@@ -11410,7 +12030,7 @@
             <p:cNvPr id="13" name="Dreieck 23">
               <a:extLst>
                 <a:ext uri="{FF2B5EF4-FFF2-40B4-BE49-F238E27FC236}">
-                  <a16:creationId xmlns:a16="http://schemas.microsoft.com/office/drawing/2014/main" xmlns="" id="{45F58FCA-1036-9842-AC1B-581E8445154F}"/>
+                  <a16:creationId xmlns="" xmlns:a16="http://schemas.microsoft.com/office/drawing/2014/main" id="{45F58FCA-1036-9842-AC1B-581E8445154F}"/>
                 </a:ext>
               </a:extLst>
             </p:cNvPr>
@@ -11456,7 +12076,7 @@
             <p:cNvPr id="14" name="Dreieck 24">
               <a:extLst>
                 <a:ext uri="{FF2B5EF4-FFF2-40B4-BE49-F238E27FC236}">
-                  <a16:creationId xmlns:a16="http://schemas.microsoft.com/office/drawing/2014/main" xmlns="" id="{F32A8848-A721-984F-933E-9E9622B747AD}"/>
+                  <a16:creationId xmlns="" xmlns:a16="http://schemas.microsoft.com/office/drawing/2014/main" id="{F32A8848-A721-984F-933E-9E9622B747AD}"/>
                 </a:ext>
               </a:extLst>
             </p:cNvPr>
@@ -11502,7 +12122,7 @@
             <p:cNvPr id="15" name="Dreieck 25">
               <a:extLst>
                 <a:ext uri="{FF2B5EF4-FFF2-40B4-BE49-F238E27FC236}">
-                  <a16:creationId xmlns:a16="http://schemas.microsoft.com/office/drawing/2014/main" xmlns="" id="{80771BCA-609E-164A-B463-F6A1D4A2CEAE}"/>
+                  <a16:creationId xmlns="" xmlns:a16="http://schemas.microsoft.com/office/drawing/2014/main" id="{80771BCA-609E-164A-B463-F6A1D4A2CEAE}"/>
                 </a:ext>
               </a:extLst>
             </p:cNvPr>
@@ -11548,7 +12168,7 @@
             <p:cNvPr id="16" name="Dreieck 26">
               <a:extLst>
                 <a:ext uri="{FF2B5EF4-FFF2-40B4-BE49-F238E27FC236}">
-                  <a16:creationId xmlns:a16="http://schemas.microsoft.com/office/drawing/2014/main" xmlns="" id="{D74FB55B-722F-AF4E-B788-08B063B85B99}"/>
+                  <a16:creationId xmlns="" xmlns:a16="http://schemas.microsoft.com/office/drawing/2014/main" id="{D74FB55B-722F-AF4E-B788-08B063B85B99}"/>
                 </a:ext>
               </a:extLst>
             </p:cNvPr>
@@ -11594,7 +12214,7 @@
             <p:cNvPr id="17" name="Dreieck 27">
               <a:extLst>
                 <a:ext uri="{FF2B5EF4-FFF2-40B4-BE49-F238E27FC236}">
-                  <a16:creationId xmlns:a16="http://schemas.microsoft.com/office/drawing/2014/main" xmlns="" id="{E28615C0-4C02-CA41-ABCF-97C87E10A370}"/>
+                  <a16:creationId xmlns="" xmlns:a16="http://schemas.microsoft.com/office/drawing/2014/main" id="{E28615C0-4C02-CA41-ABCF-97C87E10A370}"/>
                 </a:ext>
               </a:extLst>
             </p:cNvPr>
@@ -11640,7 +12260,7 @@
             <p:cNvPr id="18" name="Dreieck 28">
               <a:extLst>
                 <a:ext uri="{FF2B5EF4-FFF2-40B4-BE49-F238E27FC236}">
-                  <a16:creationId xmlns:a16="http://schemas.microsoft.com/office/drawing/2014/main" xmlns="" id="{FBA1CE75-BDA7-5541-B332-841CA5A0F3D8}"/>
+                  <a16:creationId xmlns="" xmlns:a16="http://schemas.microsoft.com/office/drawing/2014/main" id="{FBA1CE75-BDA7-5541-B332-841CA5A0F3D8}"/>
                 </a:ext>
               </a:extLst>
             </p:cNvPr>
@@ -11686,7 +12306,7 @@
             <p:cNvPr id="19" name="Dreieck 29">
               <a:extLst>
                 <a:ext uri="{FF2B5EF4-FFF2-40B4-BE49-F238E27FC236}">
-                  <a16:creationId xmlns:a16="http://schemas.microsoft.com/office/drawing/2014/main" xmlns="" id="{54C42A26-F415-894B-B37F-08315630F5A1}"/>
+                  <a16:creationId xmlns="" xmlns:a16="http://schemas.microsoft.com/office/drawing/2014/main" id="{54C42A26-F415-894B-B37F-08315630F5A1}"/>
                 </a:ext>
               </a:extLst>
             </p:cNvPr>
@@ -11804,7 +12424,7 @@
           <p:cNvPr id="21" name="Grafik 20">
             <a:extLst>
               <a:ext uri="{FF2B5EF4-FFF2-40B4-BE49-F238E27FC236}">
-                <a16:creationId xmlns:a16="http://schemas.microsoft.com/office/drawing/2014/main" xmlns="" id="{D878A5C2-A8AA-4358-9003-B99120CDFE3F}"/>
+                <a16:creationId xmlns="" xmlns:a16="http://schemas.microsoft.com/office/drawing/2014/main" id="{D878A5C2-A8AA-4358-9003-B99120CDFE3F}"/>
               </a:ext>
             </a:extLst>
           </p:cNvPr>
@@ -12113,7 +12733,7 @@
 </p:sld>
 </file>
 
-<file path=ppt/slides/slide28.xml><?xml version="1.0" encoding="utf-8"?>
+<file path=ppt/slides/slide29.xml><?xml version="1.0" encoding="utf-8"?>
 <p:sld xmlns:a="http://schemas.openxmlformats.org/drawingml/2006/main" xmlns:r="http://schemas.openxmlformats.org/officeDocument/2006/relationships" xmlns:p="http://schemas.openxmlformats.org/presentationml/2006/main">
   <p:cSld>
     <p:bg>
@@ -12143,10 +12763,10 @@
           <p:cNvPr id="19" name="Rectangle 18">
             <a:extLst>
               <a:ext uri="{FF2B5EF4-FFF2-40B4-BE49-F238E27FC236}">
-                <a16:creationId xmlns:a16="http://schemas.microsoft.com/office/drawing/2014/main" xmlns="" id="{8D70B121-56F4-4848-B38B-182089D909FA}"/>
+                <a16:creationId xmlns="" xmlns:a16="http://schemas.microsoft.com/office/drawing/2014/main" id="{8D70B121-56F4-4848-B38B-182089D909FA}"/>
               </a:ext>
               <a:ext uri="{C183D7F6-B498-43B3-948B-1728B52AA6E4}">
-                <adec:decorative xmlns:adec="http://schemas.microsoft.com/office/drawing/2017/decorative" xmlns="" val="1"/>
+                <adec:decorative xmlns="" xmlns:adec="http://schemas.microsoft.com/office/drawing/2017/decorative" val="1"/>
               </a:ext>
             </a:extLst>
           </p:cNvPr>
@@ -12156,7 +12776,7 @@
           <p:nvPr>
             <p:extLst>
               <p:ext uri="{386F3935-93C4-4BCD-93E2-E3B085C9AB24}">
-                <p16:designElem xmlns:p16="http://schemas.microsoft.com/office/powerpoint/2015/main" xmlns="" val="1"/>
+                <p16:designElem xmlns="" xmlns:p16="http://schemas.microsoft.com/office/powerpoint/2015/main" val="1"/>
               </p:ext>
             </p:extLst>
           </p:nvPr>
@@ -12208,7 +12828,7 @@
           <p:cNvPr id="2" name="Titel 1">
             <a:extLst>
               <a:ext uri="{FF2B5EF4-FFF2-40B4-BE49-F238E27FC236}">
-                <a16:creationId xmlns:a16="http://schemas.microsoft.com/office/drawing/2014/main" xmlns="" id="{35BFDC70-A169-E142-B051-5ABC9190E094}"/>
+                <a16:creationId xmlns="" xmlns:a16="http://schemas.microsoft.com/office/drawing/2014/main" id="{35BFDC70-A169-E142-B051-5ABC9190E094}"/>
               </a:ext>
             </a:extLst>
           </p:cNvPr>
@@ -12256,7 +12876,7 @@
           <p:cNvPr id="8" name="Inhaltsplatzhalter 4">
             <a:extLst>
               <a:ext uri="{FF2B5EF4-FFF2-40B4-BE49-F238E27FC236}">
-                <a16:creationId xmlns:a16="http://schemas.microsoft.com/office/drawing/2014/main" xmlns="" id="{A8E625C4-6DB1-9D42-BFEA-DE37A6F928F3}"/>
+                <a16:creationId xmlns="" xmlns:a16="http://schemas.microsoft.com/office/drawing/2014/main" id="{A8E625C4-6DB1-9D42-BFEA-DE37A6F928F3}"/>
               </a:ext>
             </a:extLst>
           </p:cNvPr>
@@ -14119,7 +14739,7 @@
 </p:sld>
 </file>
 
-<file path=ppt/slides/slide29.xml><?xml version="1.0" encoding="utf-8"?>
+<file path=ppt/slides/slide3.xml><?xml version="1.0" encoding="utf-8"?>
 <p:sld xmlns:a="http://schemas.openxmlformats.org/drawingml/2006/main" xmlns:r="http://schemas.openxmlformats.org/officeDocument/2006/relationships" xmlns:p="http://schemas.openxmlformats.org/presentationml/2006/main">
   <p:cSld>
     <p:bg>
@@ -14146,13 +14766,311 @@
       </p:grpSpPr>
       <p:sp>
         <p:nvSpPr>
+          <p:cNvPr id="8" name="Rectangle 7">
+            <a:extLst>
+              <a:ext uri="{FF2B5EF4-FFF2-40B4-BE49-F238E27FC236}">
+                <a16:creationId xmlns="" xmlns:a16="http://schemas.microsoft.com/office/drawing/2014/main" id="{8D70B121-56F4-4848-B38B-182089D909FA}"/>
+              </a:ext>
+              <a:ext uri="{C183D7F6-B498-43B3-948B-1728B52AA6E4}">
+                <adec:decorative xmlns="" xmlns:adec="http://schemas.microsoft.com/office/drawing/2017/decorative" val="1"/>
+              </a:ext>
+            </a:extLst>
+          </p:cNvPr>
+          <p:cNvSpPr>
+            <a:spLocks noGrp="1" noRot="1" noChangeAspect="1" noMove="1" noResize="1" noEditPoints="1" noAdjustHandles="1" noChangeArrowheads="1" noChangeShapeType="1" noTextEdit="1"/>
+          </p:cNvSpPr>
+          <p:nvPr>
+            <p:extLst>
+              <p:ext uri="{386F3935-93C4-4BCD-93E2-E3B085C9AB24}">
+                <p16:designElem xmlns="" xmlns:p16="http://schemas.microsoft.com/office/powerpoint/2015/main" val="1"/>
+              </p:ext>
+            </p:extLst>
+          </p:nvPr>
+        </p:nvSpPr>
+        <p:spPr bwMode="ltGray">
+          <a:xfrm>
+            <a:off x="321564" y="320040"/>
+            <a:ext cx="11548872" cy="6217920"/>
+          </a:xfrm>
+          <a:prstGeom prst="rect">
+            <a:avLst/>
+          </a:prstGeom>
+          <a:solidFill>
+            <a:schemeClr val="tx1">
+              <a:alpha val="8000"/>
+            </a:schemeClr>
+          </a:solidFill>
+          <a:ln w="127000" cap="sq" cmpd="thinThick">
+            <a:noFill/>
+          </a:ln>
+        </p:spPr>
+        <p:style>
+          <a:lnRef idx="2">
+            <a:schemeClr val="accent1">
+              <a:shade val="50000"/>
+            </a:schemeClr>
+          </a:lnRef>
+          <a:fillRef idx="1">
+            <a:schemeClr val="accent1"/>
+          </a:fillRef>
+          <a:effectRef idx="0">
+            <a:schemeClr val="accent1"/>
+          </a:effectRef>
+          <a:fontRef idx="minor">
+            <a:schemeClr val="lt1"/>
+          </a:fontRef>
+        </p:style>
+        <p:txBody>
+          <a:bodyPr rtlCol="0" anchor="ctr"/>
+          <a:lstStyle/>
+          <a:p>
+            <a:pPr algn="ctr"/>
+            <a:endParaRPr lang="en-US"/>
+          </a:p>
+        </p:txBody>
+      </p:sp>
+      <p:sp>
+        <p:nvSpPr>
+          <p:cNvPr id="2" name="Titel 1">
+            <a:extLst>
+              <a:ext uri="{FF2B5EF4-FFF2-40B4-BE49-F238E27FC236}">
+                <a16:creationId xmlns="" xmlns:a16="http://schemas.microsoft.com/office/drawing/2014/main" id="{0B5D0F8F-C92F-BC46-ACC4-7A21698DD272}"/>
+              </a:ext>
+            </a:extLst>
+          </p:cNvPr>
+          <p:cNvSpPr>
+            <a:spLocks noGrp="1"/>
+          </p:cNvSpPr>
+          <p:nvPr>
+            <p:ph type="title"/>
+          </p:nvPr>
+        </p:nvSpPr>
+        <p:spPr>
+          <a:xfrm>
+            <a:off x="838200" y="963877"/>
+            <a:ext cx="3494362" cy="4930246"/>
+          </a:xfrm>
+        </p:spPr>
+        <p:txBody>
+          <a:bodyPr>
+            <a:normAutofit/>
+          </a:bodyPr>
+          <a:lstStyle/>
+          <a:p>
+            <a:pPr algn="r"/>
+            <a:r>
+              <a:rPr lang="de-DE" dirty="0">
+                <a:solidFill>
+                  <a:schemeClr val="accent1"/>
+                </a:solidFill>
+              </a:rPr>
+              <a:t>Gliederung	</a:t>
+            </a:r>
+          </a:p>
+        </p:txBody>
+      </p:sp>
+      <p:cxnSp>
+        <p:nvCxnSpPr>
+          <p:cNvPr id="10" name="Straight Connector 9">
+            <a:extLst>
+              <a:ext uri="{FF2B5EF4-FFF2-40B4-BE49-F238E27FC236}">
+                <a16:creationId xmlns="" xmlns:a16="http://schemas.microsoft.com/office/drawing/2014/main" id="{2D72A2C9-F3CA-4216-8BAD-FA4C970C3C4E}"/>
+              </a:ext>
+              <a:ext uri="{C183D7F6-B498-43B3-948B-1728B52AA6E4}">
+                <adec:decorative xmlns="" xmlns:adec="http://schemas.microsoft.com/office/drawing/2017/decorative" val="1"/>
+              </a:ext>
+            </a:extLst>
+          </p:cNvPr>
+          <p:cNvCxnSpPr>
+            <a:cxnSpLocks noGrp="1" noRot="1" noChangeAspect="1" noMove="1" noResize="1" noEditPoints="1" noAdjustHandles="1" noChangeArrowheads="1" noChangeShapeType="1"/>
+          </p:cNvCxnSpPr>
+          <p:nvPr>
+            <p:extLst>
+              <p:ext uri="{386F3935-93C4-4BCD-93E2-E3B085C9AB24}">
+                <p16:designElem xmlns="" xmlns:p16="http://schemas.microsoft.com/office/powerpoint/2015/main" val="1"/>
+              </p:ext>
+            </p:extLst>
+          </p:nvPr>
+        </p:nvCxnSpPr>
+        <p:spPr>
+          <a:xfrm>
+            <a:off x="4654296" y="2057400"/>
+            <a:ext cx="0" cy="2743200"/>
+          </a:xfrm>
+          <a:prstGeom prst="line">
+            <a:avLst/>
+          </a:prstGeom>
+          <a:ln w="19050">
+            <a:solidFill>
+              <a:schemeClr val="tx1">
+                <a:lumMod val="85000"/>
+                <a:lumOff val="15000"/>
+              </a:schemeClr>
+            </a:solidFill>
+          </a:ln>
+        </p:spPr>
+        <p:style>
+          <a:lnRef idx="1">
+            <a:schemeClr val="accent1"/>
+          </a:lnRef>
+          <a:fillRef idx="0">
+            <a:schemeClr val="accent1"/>
+          </a:fillRef>
+          <a:effectRef idx="0">
+            <a:schemeClr val="accent1"/>
+          </a:effectRef>
+          <a:fontRef idx="minor">
+            <a:schemeClr val="tx1"/>
+          </a:fontRef>
+        </p:style>
+      </p:cxnSp>
+      <p:sp>
+        <p:nvSpPr>
+          <p:cNvPr id="3" name="Inhaltsplatzhalter 2">
+            <a:extLst>
+              <a:ext uri="{FF2B5EF4-FFF2-40B4-BE49-F238E27FC236}">
+                <a16:creationId xmlns="" xmlns:a16="http://schemas.microsoft.com/office/drawing/2014/main" id="{692C889E-3E0C-9E40-9512-4230892B2B42}"/>
+              </a:ext>
+            </a:extLst>
+          </p:cNvPr>
+          <p:cNvSpPr>
+            <a:spLocks noGrp="1"/>
+          </p:cNvSpPr>
+          <p:nvPr>
+            <p:ph idx="1"/>
+          </p:nvPr>
+        </p:nvSpPr>
+        <p:spPr>
+          <a:xfrm>
+            <a:off x="4976031" y="963877"/>
+            <a:ext cx="6377769" cy="4930246"/>
+          </a:xfrm>
+        </p:spPr>
+        <p:txBody>
+          <a:bodyPr anchor="ctr">
+            <a:normAutofit/>
+          </a:bodyPr>
+          <a:lstStyle/>
+          <a:p>
+            <a:r>
+              <a:rPr lang="de-DE" sz="2400" dirty="0">
+                <a:solidFill>
+                  <a:schemeClr val="accent1"/>
+                </a:solidFill>
+              </a:rPr>
+              <a:t>Einführung in das Thema</a:t>
+            </a:r>
+          </a:p>
+          <a:p>
+            <a:r>
+              <a:rPr lang="de-DE" sz="2400" dirty="0"/>
+              <a:t>Theoretische Grundlagen</a:t>
+            </a:r>
+            <a:endParaRPr lang="de-DE" sz="2000" dirty="0"/>
+          </a:p>
+          <a:p>
+            <a:pPr lvl="1"/>
+            <a:r>
+              <a:rPr lang="de-DE" sz="2000" dirty="0"/>
+              <a:t>Anwendungen</a:t>
+            </a:r>
+          </a:p>
+          <a:p>
+            <a:r>
+              <a:rPr lang="de-DE" sz="2400" dirty="0"/>
+              <a:t>Aufgabenstellung</a:t>
+            </a:r>
+          </a:p>
+          <a:p>
+            <a:r>
+              <a:rPr lang="de-DE" sz="2400" dirty="0"/>
+              <a:t>Implementierung</a:t>
+            </a:r>
+          </a:p>
+          <a:p>
+            <a:pPr lvl="1"/>
+            <a:r>
+              <a:rPr lang="de-DE" sz="2000" dirty="0"/>
+              <a:t>Herangehensweise </a:t>
+            </a:r>
+          </a:p>
+          <a:p>
+            <a:pPr lvl="1"/>
+            <a:r>
+              <a:rPr lang="de-DE" sz="2000" dirty="0"/>
+              <a:t>Einführung in den Code</a:t>
+            </a:r>
+          </a:p>
+          <a:p>
+            <a:pPr lvl="1"/>
+            <a:r>
+              <a:rPr lang="de-DE" sz="2000" dirty="0" smtClean="0"/>
+              <a:t>Präsentation des Ergebnisses</a:t>
+            </a:r>
+          </a:p>
+          <a:p>
+            <a:r>
+              <a:rPr lang="de-DE" sz="2400" dirty="0" smtClean="0"/>
+              <a:t>Fazit </a:t>
+            </a:r>
+            <a:endParaRPr lang="de-DE" sz="2400" dirty="0"/>
+          </a:p>
+        </p:txBody>
+      </p:sp>
+    </p:spTree>
+    <p:extLst>
+      <p:ext uri="{BB962C8B-B14F-4D97-AF65-F5344CB8AC3E}">
+        <p14:creationId xmlns:p14="http://schemas.microsoft.com/office/powerpoint/2010/main" val="3758769095"/>
+      </p:ext>
+    </p:extLst>
+  </p:cSld>
+  <p:clrMapOvr>
+    <a:masterClrMapping/>
+  </p:clrMapOvr>
+  <p:timing>
+    <p:tnLst>
+      <p:par>
+        <p:cTn id="1" dur="indefinite" restart="never" nodeType="tmRoot"/>
+      </p:par>
+    </p:tnLst>
+  </p:timing>
+</p:sld>
+</file>
+
+<file path=ppt/slides/slide30.xml><?xml version="1.0" encoding="utf-8"?>
+<p:sld xmlns:a="http://schemas.openxmlformats.org/drawingml/2006/main" xmlns:r="http://schemas.openxmlformats.org/officeDocument/2006/relationships" xmlns:p="http://schemas.openxmlformats.org/presentationml/2006/main">
+  <p:cSld>
+    <p:bg>
+      <p:bgPr>
+        <a:solidFill>
+          <a:schemeClr val="bg1"/>
+        </a:solidFill>
+        <a:effectLst/>
+      </p:bgPr>
+    </p:bg>
+    <p:spTree>
+      <p:nvGrpSpPr>
+        <p:cNvPr id="1" name=""/>
+        <p:cNvGrpSpPr/>
+        <p:nvPr/>
+      </p:nvGrpSpPr>
+      <p:grpSpPr>
+        <a:xfrm>
+          <a:off x="0" y="0"/>
+          <a:ext cx="0" cy="0"/>
+          <a:chOff x="0" y="0"/>
+          <a:chExt cx="0" cy="0"/>
+        </a:xfrm>
+      </p:grpSpPr>
+      <p:sp>
+        <p:nvSpPr>
           <p:cNvPr id="19" name="Rectangle 18">
             <a:extLst>
               <a:ext uri="{FF2B5EF4-FFF2-40B4-BE49-F238E27FC236}">
-                <a16:creationId xmlns:a16="http://schemas.microsoft.com/office/drawing/2014/main" xmlns="" id="{8D70B121-56F4-4848-B38B-182089D909FA}"/>
+                <a16:creationId xmlns="" xmlns:a16="http://schemas.microsoft.com/office/drawing/2014/main" id="{8D70B121-56F4-4848-B38B-182089D909FA}"/>
               </a:ext>
               <a:ext uri="{C183D7F6-B498-43B3-948B-1728B52AA6E4}">
-                <adec:decorative xmlns:adec="http://schemas.microsoft.com/office/drawing/2017/decorative" xmlns="" val="1"/>
+                <adec:decorative xmlns="" xmlns:adec="http://schemas.microsoft.com/office/drawing/2017/decorative" val="1"/>
               </a:ext>
             </a:extLst>
           </p:cNvPr>
@@ -14162,7 +15080,7 @@
           <p:nvPr>
             <p:extLst>
               <p:ext uri="{386F3935-93C4-4BCD-93E2-E3B085C9AB24}">
-                <p16:designElem xmlns:p16="http://schemas.microsoft.com/office/powerpoint/2015/main" xmlns="" val="1"/>
+                <p16:designElem xmlns="" xmlns:p16="http://schemas.microsoft.com/office/powerpoint/2015/main" val="1"/>
               </p:ext>
             </p:extLst>
           </p:nvPr>
@@ -14591,7 +15509,7 @@
           <p:cNvPr id="28" name="Gruppieren 27">
             <a:extLst>
               <a:ext uri="{FF2B5EF4-FFF2-40B4-BE49-F238E27FC236}">
-                <a16:creationId xmlns:a16="http://schemas.microsoft.com/office/drawing/2014/main" xmlns="" id="{50ECC846-FE00-5642-8853-EEE6E8A01659}"/>
+                <a16:creationId xmlns="" xmlns:a16="http://schemas.microsoft.com/office/drawing/2014/main" id="{50ECC846-FE00-5642-8853-EEE6E8A01659}"/>
               </a:ext>
             </a:extLst>
           </p:cNvPr>
@@ -14611,7 +15529,7 @@
             <p:cNvPr id="29" name="Dreieck 22">
               <a:extLst>
                 <a:ext uri="{FF2B5EF4-FFF2-40B4-BE49-F238E27FC236}">
-                  <a16:creationId xmlns:a16="http://schemas.microsoft.com/office/drawing/2014/main" xmlns="" id="{C58FCFF5-FFE5-1240-AE4D-8FE755FB7696}"/>
+                  <a16:creationId xmlns="" xmlns:a16="http://schemas.microsoft.com/office/drawing/2014/main" id="{C58FCFF5-FFE5-1240-AE4D-8FE755FB7696}"/>
                 </a:ext>
               </a:extLst>
             </p:cNvPr>
@@ -14657,7 +15575,7 @@
             <p:cNvPr id="30" name="Grafik 29">
               <a:extLst>
                 <a:ext uri="{FF2B5EF4-FFF2-40B4-BE49-F238E27FC236}">
-                  <a16:creationId xmlns:a16="http://schemas.microsoft.com/office/drawing/2014/main" xmlns="" id="{4E6774A5-9359-5A4C-9D07-47945BA0A9B3}"/>
+                  <a16:creationId xmlns="" xmlns:a16="http://schemas.microsoft.com/office/drawing/2014/main" id="{4E6774A5-9359-5A4C-9D07-47945BA0A9B3}"/>
                 </a:ext>
               </a:extLst>
             </p:cNvPr>
@@ -14687,7 +15605,7 @@
             <p:cNvPr id="31" name="Dreieck 23">
               <a:extLst>
                 <a:ext uri="{FF2B5EF4-FFF2-40B4-BE49-F238E27FC236}">
-                  <a16:creationId xmlns:a16="http://schemas.microsoft.com/office/drawing/2014/main" xmlns="" id="{45F58FCA-1036-9842-AC1B-581E8445154F}"/>
+                  <a16:creationId xmlns="" xmlns:a16="http://schemas.microsoft.com/office/drawing/2014/main" id="{45F58FCA-1036-9842-AC1B-581E8445154F}"/>
                 </a:ext>
               </a:extLst>
             </p:cNvPr>
@@ -14733,7 +15651,7 @@
             <p:cNvPr id="32" name="Dreieck 24">
               <a:extLst>
                 <a:ext uri="{FF2B5EF4-FFF2-40B4-BE49-F238E27FC236}">
-                  <a16:creationId xmlns:a16="http://schemas.microsoft.com/office/drawing/2014/main" xmlns="" id="{F32A8848-A721-984F-933E-9E9622B747AD}"/>
+                  <a16:creationId xmlns="" xmlns:a16="http://schemas.microsoft.com/office/drawing/2014/main" id="{F32A8848-A721-984F-933E-9E9622B747AD}"/>
                 </a:ext>
               </a:extLst>
             </p:cNvPr>
@@ -14779,7 +15697,7 @@
             <p:cNvPr id="33" name="Dreieck 25">
               <a:extLst>
                 <a:ext uri="{FF2B5EF4-FFF2-40B4-BE49-F238E27FC236}">
-                  <a16:creationId xmlns:a16="http://schemas.microsoft.com/office/drawing/2014/main" xmlns="" id="{80771BCA-609E-164A-B463-F6A1D4A2CEAE}"/>
+                  <a16:creationId xmlns="" xmlns:a16="http://schemas.microsoft.com/office/drawing/2014/main" id="{80771BCA-609E-164A-B463-F6A1D4A2CEAE}"/>
                 </a:ext>
               </a:extLst>
             </p:cNvPr>
@@ -14825,7 +15743,7 @@
             <p:cNvPr id="34" name="Dreieck 26">
               <a:extLst>
                 <a:ext uri="{FF2B5EF4-FFF2-40B4-BE49-F238E27FC236}">
-                  <a16:creationId xmlns:a16="http://schemas.microsoft.com/office/drawing/2014/main" xmlns="" id="{D74FB55B-722F-AF4E-B788-08B063B85B99}"/>
+                  <a16:creationId xmlns="" xmlns:a16="http://schemas.microsoft.com/office/drawing/2014/main" id="{D74FB55B-722F-AF4E-B788-08B063B85B99}"/>
                 </a:ext>
               </a:extLst>
             </p:cNvPr>
@@ -14871,7 +15789,7 @@
             <p:cNvPr id="35" name="Dreieck 27">
               <a:extLst>
                 <a:ext uri="{FF2B5EF4-FFF2-40B4-BE49-F238E27FC236}">
-                  <a16:creationId xmlns:a16="http://schemas.microsoft.com/office/drawing/2014/main" xmlns="" id="{E28615C0-4C02-CA41-ABCF-97C87E10A370}"/>
+                  <a16:creationId xmlns="" xmlns:a16="http://schemas.microsoft.com/office/drawing/2014/main" id="{E28615C0-4C02-CA41-ABCF-97C87E10A370}"/>
                 </a:ext>
               </a:extLst>
             </p:cNvPr>
@@ -14917,7 +15835,7 @@
             <p:cNvPr id="36" name="Dreieck 28">
               <a:extLst>
                 <a:ext uri="{FF2B5EF4-FFF2-40B4-BE49-F238E27FC236}">
-                  <a16:creationId xmlns:a16="http://schemas.microsoft.com/office/drawing/2014/main" xmlns="" id="{FBA1CE75-BDA7-5541-B332-841CA5A0F3D8}"/>
+                  <a16:creationId xmlns="" xmlns:a16="http://schemas.microsoft.com/office/drawing/2014/main" id="{FBA1CE75-BDA7-5541-B332-841CA5A0F3D8}"/>
                 </a:ext>
               </a:extLst>
             </p:cNvPr>
@@ -14963,7 +15881,7 @@
             <p:cNvPr id="37" name="Dreieck 29">
               <a:extLst>
                 <a:ext uri="{FF2B5EF4-FFF2-40B4-BE49-F238E27FC236}">
-                  <a16:creationId xmlns:a16="http://schemas.microsoft.com/office/drawing/2014/main" xmlns="" id="{54C42A26-F415-894B-B37F-08315630F5A1}"/>
+                  <a16:creationId xmlns="" xmlns:a16="http://schemas.microsoft.com/office/drawing/2014/main" id="{54C42A26-F415-894B-B37F-08315630F5A1}"/>
                 </a:ext>
               </a:extLst>
             </p:cNvPr>
@@ -15865,7 +16783,7 @@
 </p:sld>
 </file>
 
-<file path=ppt/slides/slide3.xml><?xml version="1.0" encoding="utf-8"?>
+<file path=ppt/slides/slide31.xml><?xml version="1.0" encoding="utf-8"?>
 <p:sld xmlns:a="http://schemas.openxmlformats.org/drawingml/2006/main" xmlns:r="http://schemas.openxmlformats.org/officeDocument/2006/relationships" xmlns:p="http://schemas.openxmlformats.org/presentationml/2006/main">
   <p:cSld>
     <p:bg>
@@ -15892,13 +16810,13 @@
       </p:grpSpPr>
       <p:sp>
         <p:nvSpPr>
-          <p:cNvPr id="8" name="Rectangle 7">
+          <p:cNvPr id="19" name="Rectangle 18">
             <a:extLst>
               <a:ext uri="{FF2B5EF4-FFF2-40B4-BE49-F238E27FC236}">
-                <a16:creationId xmlns:a16="http://schemas.microsoft.com/office/drawing/2014/main" xmlns="" id="{8D70B121-56F4-4848-B38B-182089D909FA}"/>
+                <a16:creationId xmlns="" xmlns:a16="http://schemas.microsoft.com/office/drawing/2014/main" id="{8D70B121-56F4-4848-B38B-182089D909FA}"/>
               </a:ext>
               <a:ext uri="{C183D7F6-B498-43B3-948B-1728B52AA6E4}">
-                <adec:decorative xmlns:adec="http://schemas.microsoft.com/office/drawing/2017/decorative" xmlns="" val="1"/>
+                <adec:decorative xmlns="" xmlns:adec="http://schemas.microsoft.com/office/drawing/2017/decorative" val="1"/>
               </a:ext>
             </a:extLst>
           </p:cNvPr>
@@ -15908,7 +16826,7 @@
           <p:nvPr>
             <p:extLst>
               <p:ext uri="{386F3935-93C4-4BCD-93E2-E3B085C9AB24}">
-                <p16:designElem xmlns:p16="http://schemas.microsoft.com/office/powerpoint/2015/main" xmlns="" val="1"/>
+                <p16:designElem xmlns="" xmlns:p16="http://schemas.microsoft.com/office/powerpoint/2015/main" val="1"/>
               </p:ext>
             </p:extLst>
           </p:nvPr>
@@ -15960,7 +16878,7 @@
           <p:cNvPr id="2" name="Titel 1">
             <a:extLst>
               <a:ext uri="{FF2B5EF4-FFF2-40B4-BE49-F238E27FC236}">
-                <a16:creationId xmlns:a16="http://schemas.microsoft.com/office/drawing/2014/main" xmlns="" id="{0B5D0F8F-C92F-BC46-ACC4-7A21698DD272}"/>
+                <a16:creationId xmlns="" xmlns:a16="http://schemas.microsoft.com/office/drawing/2014/main" id="{35BFDC70-A169-E142-B051-5ABC9190E094}"/>
               </a:ext>
             </a:extLst>
           </p:cNvPr>
@@ -15973,37 +16891,59 @@
         </p:nvSpPr>
         <p:spPr>
           <a:xfrm>
-            <a:off x="838200" y="963877"/>
-            <a:ext cx="3494362" cy="4930246"/>
+            <a:off x="861390" y="963877"/>
+            <a:ext cx="3471171" cy="4930246"/>
           </a:xfrm>
         </p:spPr>
         <p:txBody>
-          <a:bodyPr>
+          <a:bodyPr vert="horz" lIns="91440" tIns="45720" rIns="91440" bIns="45720" rtlCol="0">
             <a:normAutofit/>
           </a:bodyPr>
           <a:lstStyle/>
           <a:p>
-            <a:pPr algn="r"/>
-            <a:r>
-              <a:rPr lang="de-DE" dirty="0">
+            <a:pPr algn="ctr"/>
+            <a:r>
+              <a:rPr lang="de-DE" kern="1200" dirty="0" smtClean="0">
                 <a:solidFill>
                   <a:schemeClr val="accent1"/>
                 </a:solidFill>
+                <a:latin typeface="+mj-lt"/>
+                <a:ea typeface="+mj-ea"/>
+                <a:cs typeface="+mj-cs"/>
               </a:rPr>
-              <a:t>Gliederung	</a:t>
-            </a:r>
+              <a:t>Fazit</a:t>
+            </a:r>
+            <a:r>
+              <a:rPr lang="en-US" kern="1200" dirty="0" smtClean="0">
+                <a:solidFill>
+                  <a:schemeClr val="accent1"/>
+                </a:solidFill>
+                <a:latin typeface="+mj-lt"/>
+                <a:ea typeface="+mj-ea"/>
+                <a:cs typeface="+mj-cs"/>
+              </a:rPr>
+              <a:t> </a:t>
+            </a:r>
+            <a:endParaRPr lang="en-US" kern="1200" dirty="0">
+              <a:solidFill>
+                <a:schemeClr val="accent1"/>
+              </a:solidFill>
+              <a:latin typeface="+mj-lt"/>
+              <a:ea typeface="+mj-ea"/>
+              <a:cs typeface="+mj-cs"/>
+            </a:endParaRPr>
           </a:p>
         </p:txBody>
       </p:sp>
       <p:cxnSp>
         <p:nvCxnSpPr>
-          <p:cNvPr id="10" name="Straight Connector 9">
+          <p:cNvPr id="21" name="Straight Connector 20">
             <a:extLst>
               <a:ext uri="{FF2B5EF4-FFF2-40B4-BE49-F238E27FC236}">
-                <a16:creationId xmlns:a16="http://schemas.microsoft.com/office/drawing/2014/main" xmlns="" id="{2D72A2C9-F3CA-4216-8BAD-FA4C970C3C4E}"/>
+                <a16:creationId xmlns="" xmlns:a16="http://schemas.microsoft.com/office/drawing/2014/main" id="{2D72A2C9-F3CA-4216-8BAD-FA4C970C3C4E}"/>
               </a:ext>
               <a:ext uri="{C183D7F6-B498-43B3-948B-1728B52AA6E4}">
-                <adec:decorative xmlns:adec="http://schemas.microsoft.com/office/drawing/2017/decorative" xmlns="" val="1"/>
+                <adec:decorative xmlns="" xmlns:adec="http://schemas.microsoft.com/office/drawing/2017/decorative" val="1"/>
               </a:ext>
             </a:extLst>
           </p:cNvPr>
@@ -16013,7 +16953,7 @@
           <p:nvPr>
             <p:extLst>
               <p:ext uri="{386F3935-93C4-4BCD-93E2-E3B085C9AB24}">
-                <p16:designElem xmlns:p16="http://schemas.microsoft.com/office/powerpoint/2015/main" xmlns="" val="1"/>
+                <p16:designElem xmlns="" xmlns:p16="http://schemas.microsoft.com/office/powerpoint/2015/main" val="1"/>
               </p:ext>
             </p:extLst>
           </p:nvPr>
@@ -16052,10 +16992,10 @@
       </p:cxnSp>
       <p:sp>
         <p:nvSpPr>
-          <p:cNvPr id="3" name="Inhaltsplatzhalter 2">
+          <p:cNvPr id="8" name="Inhaltsplatzhalter 4">
             <a:extLst>
               <a:ext uri="{FF2B5EF4-FFF2-40B4-BE49-F238E27FC236}">
-                <a16:creationId xmlns:a16="http://schemas.microsoft.com/office/drawing/2014/main" xmlns="" id="{692C889E-3E0C-9E40-9512-4230892B2B42}"/>
+                <a16:creationId xmlns="" xmlns:a16="http://schemas.microsoft.com/office/drawing/2014/main" id="{A8E625C4-6DB1-9D42-BFEA-DE37A6F928F3}"/>
               </a:ext>
             </a:extLst>
           </p:cNvPr>
@@ -16068,8 +17008,8 @@
         </p:nvSpPr>
         <p:spPr>
           <a:xfrm>
-            <a:off x="4976031" y="963877"/>
-            <a:ext cx="6377769" cy="4930246"/>
+            <a:off x="5097419" y="963877"/>
+            <a:ext cx="5686424" cy="4930246"/>
           </a:xfrm>
         </p:spPr>
         <p:txBody>
@@ -16078,75 +17018,58 @@
           </a:bodyPr>
           <a:lstStyle/>
           <a:p>
-            <a:r>
-              <a:rPr lang="de-DE" sz="2400" dirty="0">
-                <a:solidFill>
-                  <a:schemeClr val="accent1"/>
-                </a:solidFill>
-              </a:rPr>
-              <a:t>Einführung in das Thema</a:t>
-            </a:r>
-          </a:p>
-          <a:p>
-            <a:r>
-              <a:rPr lang="de-DE" sz="2400" dirty="0"/>
-              <a:t>Theoretische Grundlagen</a:t>
-            </a:r>
-            <a:endParaRPr lang="de-DE" sz="2000" dirty="0"/>
-          </a:p>
-          <a:p>
-            <a:pPr lvl="1"/>
-            <a:r>
-              <a:rPr lang="de-DE" sz="2000" dirty="0"/>
-              <a:t>Anwendungen</a:t>
-            </a:r>
-          </a:p>
-          <a:p>
-            <a:r>
-              <a:rPr lang="de-DE" sz="2400" dirty="0"/>
-              <a:t>Aufgabenstellung</a:t>
-            </a:r>
-          </a:p>
-          <a:p>
-            <a:r>
-              <a:rPr lang="de-DE" sz="2400" dirty="0"/>
-              <a:t>Implementierung</a:t>
-            </a:r>
-          </a:p>
-          <a:p>
-            <a:pPr lvl="1"/>
-            <a:r>
-              <a:rPr lang="de-DE" sz="2000" dirty="0"/>
-              <a:t>Herangehensweise </a:t>
-            </a:r>
-          </a:p>
-          <a:p>
-            <a:pPr lvl="1"/>
-            <a:r>
-              <a:rPr lang="de-DE" sz="2000" dirty="0"/>
-              <a:t>Einführung in den Code</a:t>
-            </a:r>
-          </a:p>
-          <a:p>
-            <a:pPr lvl="1"/>
-            <a:r>
-              <a:rPr lang="de-DE" sz="2000" dirty="0" smtClean="0"/>
-              <a:t>Präsentation des Ergebnisses</a:t>
-            </a:r>
-          </a:p>
-          <a:p>
-            <a:r>
-              <a:rPr lang="de-DE" sz="2400" dirty="0" smtClean="0"/>
-              <a:t>Fazit </a:t>
-            </a:r>
-            <a:endParaRPr lang="de-DE" sz="2400" dirty="0"/>
+            <a:pPr>
+              <a:buFontTx/>
+              <a:buChar char="-"/>
+            </a:pPr>
+            <a:r>
+              <a:rPr lang="de-DE" dirty="0" smtClean="0"/>
+              <a:t>Ist ein Problem mit realem Bezug</a:t>
+            </a:r>
+          </a:p>
+          <a:p>
+            <a:pPr>
+              <a:buFontTx/>
+              <a:buChar char="-"/>
+            </a:pPr>
+            <a:r>
+              <a:rPr lang="de-DE" dirty="0" smtClean="0"/>
+              <a:t>Ein echtes Alltagsproblem</a:t>
+            </a:r>
+          </a:p>
+          <a:p>
+            <a:pPr>
+              <a:buFontTx/>
+              <a:buChar char="-"/>
+            </a:pPr>
+            <a:r>
+              <a:rPr lang="de-DE" dirty="0" smtClean="0"/>
+              <a:t>Wird herangezogen um andere Probleme zu lösen </a:t>
+            </a:r>
+          </a:p>
+          <a:p>
+            <a:pPr>
+              <a:buFontTx/>
+              <a:buChar char="-"/>
+            </a:pPr>
+            <a:r>
+              <a:rPr lang="de-DE" dirty="0" smtClean="0"/>
+              <a:t>Verbindet viele interessante Teilgebiete der Mathematik (Lineare Algebra, Operation Research, ..)</a:t>
+            </a:r>
+          </a:p>
+          <a:p>
+            <a:pPr>
+              <a:buFontTx/>
+              <a:buChar char="-"/>
+            </a:pPr>
+            <a:endParaRPr lang="de-DE" dirty="0"/>
           </a:p>
         </p:txBody>
       </p:sp>
     </p:spTree>
     <p:extLst>
       <p:ext uri="{BB962C8B-B14F-4D97-AF65-F5344CB8AC3E}">
-        <p14:creationId xmlns:p14="http://schemas.microsoft.com/office/powerpoint/2010/main" val="3758769095"/>
+        <p14:creationId xmlns:p14="http://schemas.microsoft.com/office/powerpoint/2010/main" val="1240399206"/>
       </p:ext>
     </p:extLst>
   </p:cSld>
@@ -16163,7 +17086,7 @@
 </p:sld>
 </file>
 
-<file path=ppt/slides/slide30.xml><?xml version="1.0" encoding="utf-8"?>
+<file path=ppt/slides/slide32.xml><?xml version="1.0" encoding="utf-8"?>
 <p:sld xmlns:a="http://schemas.openxmlformats.org/drawingml/2006/main" xmlns:r="http://schemas.openxmlformats.org/officeDocument/2006/relationships" xmlns:p="http://schemas.openxmlformats.org/presentationml/2006/main">
   <p:cSld>
     <p:bg>
@@ -16193,10 +17116,10 @@
           <p:cNvPr id="19" name="Rectangle 18">
             <a:extLst>
               <a:ext uri="{FF2B5EF4-FFF2-40B4-BE49-F238E27FC236}">
-                <a16:creationId xmlns:a16="http://schemas.microsoft.com/office/drawing/2014/main" xmlns="" id="{8D70B121-56F4-4848-B38B-182089D909FA}"/>
+                <a16:creationId xmlns="" xmlns:a16="http://schemas.microsoft.com/office/drawing/2014/main" id="{8D70B121-56F4-4848-B38B-182089D909FA}"/>
               </a:ext>
               <a:ext uri="{C183D7F6-B498-43B3-948B-1728B52AA6E4}">
-                <adec:decorative xmlns:adec="http://schemas.microsoft.com/office/drawing/2017/decorative" xmlns="" val="1"/>
+                <adec:decorative xmlns="" xmlns:adec="http://schemas.microsoft.com/office/drawing/2017/decorative" val="1"/>
               </a:ext>
             </a:extLst>
           </p:cNvPr>
@@ -16206,7 +17129,7 @@
           <p:nvPr>
             <p:extLst>
               <p:ext uri="{386F3935-93C4-4BCD-93E2-E3B085C9AB24}">
-                <p16:designElem xmlns:p16="http://schemas.microsoft.com/office/powerpoint/2015/main" xmlns="" val="1"/>
+                <p16:designElem xmlns="" xmlns:p16="http://schemas.microsoft.com/office/powerpoint/2015/main" val="1"/>
               </p:ext>
             </p:extLst>
           </p:nvPr>
@@ -16249,7 +17172,7 @@
           <a:lstStyle/>
           <a:p>
             <a:pPr algn="ctr"/>
-            <a:endParaRPr lang="en-US"/>
+            <a:endParaRPr lang="en-US" dirty="0"/>
           </a:p>
         </p:txBody>
       </p:sp>
@@ -16258,7 +17181,7 @@
           <p:cNvPr id="2" name="Titel 1">
             <a:extLst>
               <a:ext uri="{FF2B5EF4-FFF2-40B4-BE49-F238E27FC236}">
-                <a16:creationId xmlns:a16="http://schemas.microsoft.com/office/drawing/2014/main" xmlns="" id="{35BFDC70-A169-E142-B051-5ABC9190E094}"/>
+                <a16:creationId xmlns="" xmlns:a16="http://schemas.microsoft.com/office/drawing/2014/main" id="{35BFDC70-A169-E142-B051-5ABC9190E094}"/>
               </a:ext>
             </a:extLst>
           </p:cNvPr>
@@ -16291,7 +17214,7 @@
                 <a:ea typeface="+mj-ea"/>
                 <a:cs typeface="+mj-cs"/>
               </a:rPr>
-              <a:t>Fazit</a:t>
+              <a:t>Zeit für Fragen</a:t>
             </a:r>
             <a:r>
               <a:rPr lang="en-US" kern="1200" dirty="0" smtClean="0">
@@ -16320,10 +17243,10 @@
           <p:cNvPr id="21" name="Straight Connector 20">
             <a:extLst>
               <a:ext uri="{FF2B5EF4-FFF2-40B4-BE49-F238E27FC236}">
-                <a16:creationId xmlns:a16="http://schemas.microsoft.com/office/drawing/2014/main" xmlns="" id="{2D72A2C9-F3CA-4216-8BAD-FA4C970C3C4E}"/>
+                <a16:creationId xmlns="" xmlns:a16="http://schemas.microsoft.com/office/drawing/2014/main" id="{2D72A2C9-F3CA-4216-8BAD-FA4C970C3C4E}"/>
               </a:ext>
               <a:ext uri="{C183D7F6-B498-43B3-948B-1728B52AA6E4}">
-                <adec:decorative xmlns:adec="http://schemas.microsoft.com/office/drawing/2017/decorative" xmlns="" val="1"/>
+                <adec:decorative xmlns="" xmlns:adec="http://schemas.microsoft.com/office/drawing/2017/decorative" val="1"/>
               </a:ext>
             </a:extLst>
           </p:cNvPr>
@@ -16333,310 +17256,7 @@
           <p:nvPr>
             <p:extLst>
               <p:ext uri="{386F3935-93C4-4BCD-93E2-E3B085C9AB24}">
-                <p16:designElem xmlns:p16="http://schemas.microsoft.com/office/powerpoint/2015/main" xmlns="" val="1"/>
-              </p:ext>
-            </p:extLst>
-          </p:nvPr>
-        </p:nvCxnSpPr>
-        <p:spPr>
-          <a:xfrm>
-            <a:off x="4654296" y="2057400"/>
-            <a:ext cx="0" cy="2743200"/>
-          </a:xfrm>
-          <a:prstGeom prst="line">
-            <a:avLst/>
-          </a:prstGeom>
-          <a:ln w="19050">
-            <a:solidFill>
-              <a:schemeClr val="tx1">
-                <a:lumMod val="85000"/>
-                <a:lumOff val="15000"/>
-              </a:schemeClr>
-            </a:solidFill>
-          </a:ln>
-        </p:spPr>
-        <p:style>
-          <a:lnRef idx="1">
-            <a:schemeClr val="accent1"/>
-          </a:lnRef>
-          <a:fillRef idx="0">
-            <a:schemeClr val="accent1"/>
-          </a:fillRef>
-          <a:effectRef idx="0">
-            <a:schemeClr val="accent1"/>
-          </a:effectRef>
-          <a:fontRef idx="minor">
-            <a:schemeClr val="tx1"/>
-          </a:fontRef>
-        </p:style>
-      </p:cxnSp>
-      <p:sp>
-        <p:nvSpPr>
-          <p:cNvPr id="8" name="Inhaltsplatzhalter 4">
-            <a:extLst>
-              <a:ext uri="{FF2B5EF4-FFF2-40B4-BE49-F238E27FC236}">
-                <a16:creationId xmlns:a16="http://schemas.microsoft.com/office/drawing/2014/main" xmlns="" id="{A8E625C4-6DB1-9D42-BFEA-DE37A6F928F3}"/>
-              </a:ext>
-            </a:extLst>
-          </p:cNvPr>
-          <p:cNvSpPr>
-            <a:spLocks noGrp="1"/>
-          </p:cNvSpPr>
-          <p:nvPr>
-            <p:ph idx="1"/>
-          </p:nvPr>
-        </p:nvSpPr>
-        <p:spPr>
-          <a:xfrm>
-            <a:off x="5097419" y="963877"/>
-            <a:ext cx="5686424" cy="4930246"/>
-          </a:xfrm>
-        </p:spPr>
-        <p:txBody>
-          <a:bodyPr anchor="ctr">
-            <a:normAutofit/>
-          </a:bodyPr>
-          <a:lstStyle/>
-          <a:p>
-            <a:pPr>
-              <a:buFontTx/>
-              <a:buChar char="-"/>
-            </a:pPr>
-            <a:r>
-              <a:rPr lang="de-DE" dirty="0" smtClean="0"/>
-              <a:t>Ist ein Problem mit realem Bezug</a:t>
-            </a:r>
-          </a:p>
-          <a:p>
-            <a:pPr>
-              <a:buFontTx/>
-              <a:buChar char="-"/>
-            </a:pPr>
-            <a:r>
-              <a:rPr lang="de-DE" dirty="0" smtClean="0"/>
-              <a:t>Ein echtes Alltagsproblem</a:t>
-            </a:r>
-          </a:p>
-          <a:p>
-            <a:pPr>
-              <a:buFontTx/>
-              <a:buChar char="-"/>
-            </a:pPr>
-            <a:r>
-              <a:rPr lang="de-DE" dirty="0" smtClean="0"/>
-              <a:t>Wird herangezogen um andere Probleme zu lösen </a:t>
-            </a:r>
-          </a:p>
-          <a:p>
-            <a:pPr>
-              <a:buFontTx/>
-              <a:buChar char="-"/>
-            </a:pPr>
-            <a:r>
-              <a:rPr lang="de-DE" dirty="0" smtClean="0"/>
-              <a:t>Verbindet viele interessante Teilgebiete der Mathematik (Lineare Algebra, Operation Research, ..)</a:t>
-            </a:r>
-          </a:p>
-          <a:p>
-            <a:pPr>
-              <a:buFontTx/>
-              <a:buChar char="-"/>
-            </a:pPr>
-            <a:endParaRPr lang="de-DE" dirty="0"/>
-          </a:p>
-        </p:txBody>
-      </p:sp>
-    </p:spTree>
-    <p:extLst>
-      <p:ext uri="{BB962C8B-B14F-4D97-AF65-F5344CB8AC3E}">
-        <p14:creationId xmlns:p14="http://schemas.microsoft.com/office/powerpoint/2010/main" val="1240399206"/>
-      </p:ext>
-    </p:extLst>
-  </p:cSld>
-  <p:clrMapOvr>
-    <a:masterClrMapping/>
-  </p:clrMapOvr>
-  <p:timing>
-    <p:tnLst>
-      <p:par>
-        <p:cTn id="1" dur="indefinite" restart="never" nodeType="tmRoot"/>
-      </p:par>
-    </p:tnLst>
-  </p:timing>
-</p:sld>
-</file>
-
-<file path=ppt/slides/slide31.xml><?xml version="1.0" encoding="utf-8"?>
-<p:sld xmlns:a="http://schemas.openxmlformats.org/drawingml/2006/main" xmlns:r="http://schemas.openxmlformats.org/officeDocument/2006/relationships" xmlns:p="http://schemas.openxmlformats.org/presentationml/2006/main">
-  <p:cSld>
-    <p:bg>
-      <p:bgPr>
-        <a:solidFill>
-          <a:schemeClr val="bg1"/>
-        </a:solidFill>
-        <a:effectLst/>
-      </p:bgPr>
-    </p:bg>
-    <p:spTree>
-      <p:nvGrpSpPr>
-        <p:cNvPr id="1" name=""/>
-        <p:cNvGrpSpPr/>
-        <p:nvPr/>
-      </p:nvGrpSpPr>
-      <p:grpSpPr>
-        <a:xfrm>
-          <a:off x="0" y="0"/>
-          <a:ext cx="0" cy="0"/>
-          <a:chOff x="0" y="0"/>
-          <a:chExt cx="0" cy="0"/>
-        </a:xfrm>
-      </p:grpSpPr>
-      <p:sp>
-        <p:nvSpPr>
-          <p:cNvPr id="19" name="Rectangle 18">
-            <a:extLst>
-              <a:ext uri="{FF2B5EF4-FFF2-40B4-BE49-F238E27FC236}">
-                <a16:creationId xmlns:a16="http://schemas.microsoft.com/office/drawing/2014/main" xmlns="" id="{8D70B121-56F4-4848-B38B-182089D909FA}"/>
-              </a:ext>
-              <a:ext uri="{C183D7F6-B498-43B3-948B-1728B52AA6E4}">
-                <adec:decorative xmlns:adec="http://schemas.microsoft.com/office/drawing/2017/decorative" xmlns="" val="1"/>
-              </a:ext>
-            </a:extLst>
-          </p:cNvPr>
-          <p:cNvSpPr>
-            <a:spLocks noGrp="1" noRot="1" noChangeAspect="1" noMove="1" noResize="1" noEditPoints="1" noAdjustHandles="1" noChangeArrowheads="1" noChangeShapeType="1" noTextEdit="1"/>
-          </p:cNvSpPr>
-          <p:nvPr>
-            <p:extLst>
-              <p:ext uri="{386F3935-93C4-4BCD-93E2-E3B085C9AB24}">
-                <p16:designElem xmlns:p16="http://schemas.microsoft.com/office/powerpoint/2015/main" xmlns="" val="1"/>
-              </p:ext>
-            </p:extLst>
-          </p:nvPr>
-        </p:nvSpPr>
-        <p:spPr bwMode="ltGray">
-          <a:xfrm>
-            <a:off x="321564" y="320040"/>
-            <a:ext cx="11548872" cy="6217920"/>
-          </a:xfrm>
-          <a:prstGeom prst="rect">
-            <a:avLst/>
-          </a:prstGeom>
-          <a:solidFill>
-            <a:schemeClr val="tx1">
-              <a:alpha val="8000"/>
-            </a:schemeClr>
-          </a:solidFill>
-          <a:ln w="127000" cap="sq" cmpd="thinThick">
-            <a:noFill/>
-          </a:ln>
-        </p:spPr>
-        <p:style>
-          <a:lnRef idx="2">
-            <a:schemeClr val="accent1">
-              <a:shade val="50000"/>
-            </a:schemeClr>
-          </a:lnRef>
-          <a:fillRef idx="1">
-            <a:schemeClr val="accent1"/>
-          </a:fillRef>
-          <a:effectRef idx="0">
-            <a:schemeClr val="accent1"/>
-          </a:effectRef>
-          <a:fontRef idx="minor">
-            <a:schemeClr val="lt1"/>
-          </a:fontRef>
-        </p:style>
-        <p:txBody>
-          <a:bodyPr rtlCol="0" anchor="ctr"/>
-          <a:lstStyle/>
-          <a:p>
-            <a:pPr algn="ctr"/>
-            <a:endParaRPr lang="en-US" dirty="0"/>
-          </a:p>
-        </p:txBody>
-      </p:sp>
-      <p:sp>
-        <p:nvSpPr>
-          <p:cNvPr id="2" name="Titel 1">
-            <a:extLst>
-              <a:ext uri="{FF2B5EF4-FFF2-40B4-BE49-F238E27FC236}">
-                <a16:creationId xmlns:a16="http://schemas.microsoft.com/office/drawing/2014/main" xmlns="" id="{35BFDC70-A169-E142-B051-5ABC9190E094}"/>
-              </a:ext>
-            </a:extLst>
-          </p:cNvPr>
-          <p:cNvSpPr>
-            <a:spLocks noGrp="1"/>
-          </p:cNvSpPr>
-          <p:nvPr>
-            <p:ph type="title"/>
-          </p:nvPr>
-        </p:nvSpPr>
-        <p:spPr>
-          <a:xfrm>
-            <a:off x="861390" y="963877"/>
-            <a:ext cx="3471171" cy="4930246"/>
-          </a:xfrm>
-        </p:spPr>
-        <p:txBody>
-          <a:bodyPr vert="horz" lIns="91440" tIns="45720" rIns="91440" bIns="45720" rtlCol="0">
-            <a:normAutofit/>
-          </a:bodyPr>
-          <a:lstStyle/>
-          <a:p>
-            <a:pPr algn="ctr"/>
-            <a:r>
-              <a:rPr lang="de-DE" kern="1200" dirty="0" smtClean="0">
-                <a:solidFill>
-                  <a:schemeClr val="accent1"/>
-                </a:solidFill>
-                <a:latin typeface="+mj-lt"/>
-                <a:ea typeface="+mj-ea"/>
-                <a:cs typeface="+mj-cs"/>
-              </a:rPr>
-              <a:t>Zeit für Fragen</a:t>
-            </a:r>
-            <a:r>
-              <a:rPr lang="en-US" kern="1200" dirty="0" smtClean="0">
-                <a:solidFill>
-                  <a:schemeClr val="accent1"/>
-                </a:solidFill>
-                <a:latin typeface="+mj-lt"/>
-                <a:ea typeface="+mj-ea"/>
-                <a:cs typeface="+mj-cs"/>
-              </a:rPr>
-              <a:t> </a:t>
-            </a:r>
-            <a:endParaRPr lang="en-US" kern="1200" dirty="0">
-              <a:solidFill>
-                <a:schemeClr val="accent1"/>
-              </a:solidFill>
-              <a:latin typeface="+mj-lt"/>
-              <a:ea typeface="+mj-ea"/>
-              <a:cs typeface="+mj-cs"/>
-            </a:endParaRPr>
-          </a:p>
-        </p:txBody>
-      </p:sp>
-      <p:cxnSp>
-        <p:nvCxnSpPr>
-          <p:cNvPr id="21" name="Straight Connector 20">
-            <a:extLst>
-              <a:ext uri="{FF2B5EF4-FFF2-40B4-BE49-F238E27FC236}">
-                <a16:creationId xmlns:a16="http://schemas.microsoft.com/office/drawing/2014/main" xmlns="" id="{2D72A2C9-F3CA-4216-8BAD-FA4C970C3C4E}"/>
-              </a:ext>
-              <a:ext uri="{C183D7F6-B498-43B3-948B-1728B52AA6E4}">
-                <adec:decorative xmlns:adec="http://schemas.microsoft.com/office/drawing/2017/decorative" xmlns="" val="1"/>
-              </a:ext>
-            </a:extLst>
-          </p:cNvPr>
-          <p:cNvCxnSpPr>
-            <a:cxnSpLocks noGrp="1" noRot="1" noChangeAspect="1" noMove="1" noResize="1" noEditPoints="1" noAdjustHandles="1" noChangeArrowheads="1" noChangeShapeType="1"/>
-          </p:cNvCxnSpPr>
-          <p:nvPr>
-            <p:extLst>
-              <p:ext uri="{386F3935-93C4-4BCD-93E2-E3B085C9AB24}">
-                <p16:designElem xmlns:p16="http://schemas.microsoft.com/office/powerpoint/2015/main" xmlns="" val="1"/>
+                <p16:designElem xmlns="" xmlns:p16="http://schemas.microsoft.com/office/powerpoint/2015/main" val="1"/>
               </p:ext>
             </p:extLst>
           </p:nvPr>
@@ -16723,7 +17343,7 @@
 </p:sld>
 </file>
 
-<file path=ppt/slides/slide32.xml><?xml version="1.0" encoding="utf-8"?>
+<file path=ppt/slides/slide33.xml><?xml version="1.0" encoding="utf-8"?>
 <p:sld xmlns:a="http://schemas.openxmlformats.org/drawingml/2006/main" xmlns:r="http://schemas.openxmlformats.org/officeDocument/2006/relationships" xmlns:p="http://schemas.openxmlformats.org/presentationml/2006/main">
   <p:cSld>
     <p:bg>
@@ -16753,10 +17373,10 @@
           <p:cNvPr id="19" name="Rectangle 18">
             <a:extLst>
               <a:ext uri="{FF2B5EF4-FFF2-40B4-BE49-F238E27FC236}">
-                <a16:creationId xmlns:a16="http://schemas.microsoft.com/office/drawing/2014/main" xmlns="" id="{8D70B121-56F4-4848-B38B-182089D909FA}"/>
+                <a16:creationId xmlns="" xmlns:a16="http://schemas.microsoft.com/office/drawing/2014/main" id="{8D70B121-56F4-4848-B38B-182089D909FA}"/>
               </a:ext>
               <a:ext uri="{C183D7F6-B498-43B3-948B-1728B52AA6E4}">
-                <adec:decorative xmlns:adec="http://schemas.microsoft.com/office/drawing/2017/decorative" xmlns="" val="1"/>
+                <adec:decorative xmlns="" xmlns:adec="http://schemas.microsoft.com/office/drawing/2017/decorative" val="1"/>
               </a:ext>
             </a:extLst>
           </p:cNvPr>
@@ -16766,7 +17386,7 @@
           <p:nvPr>
             <p:extLst>
               <p:ext uri="{386F3935-93C4-4BCD-93E2-E3B085C9AB24}">
-                <p16:designElem xmlns:p16="http://schemas.microsoft.com/office/powerpoint/2015/main" xmlns="" val="1"/>
+                <p16:designElem xmlns="" xmlns:p16="http://schemas.microsoft.com/office/powerpoint/2015/main" val="1"/>
               </p:ext>
             </p:extLst>
           </p:nvPr>
@@ -16818,7 +17438,7 @@
           <p:cNvPr id="2" name="Titel 1">
             <a:extLst>
               <a:ext uri="{FF2B5EF4-FFF2-40B4-BE49-F238E27FC236}">
-                <a16:creationId xmlns:a16="http://schemas.microsoft.com/office/drawing/2014/main" xmlns="" id="{35BFDC70-A169-E142-B051-5ABC9190E094}"/>
+                <a16:creationId xmlns="" xmlns:a16="http://schemas.microsoft.com/office/drawing/2014/main" id="{35BFDC70-A169-E142-B051-5ABC9190E094}"/>
               </a:ext>
             </a:extLst>
           </p:cNvPr>
@@ -16869,10 +17489,10 @@
           <p:cNvPr id="21" name="Straight Connector 20">
             <a:extLst>
               <a:ext uri="{FF2B5EF4-FFF2-40B4-BE49-F238E27FC236}">
-                <a16:creationId xmlns:a16="http://schemas.microsoft.com/office/drawing/2014/main" xmlns="" id="{2D72A2C9-F3CA-4216-8BAD-FA4C970C3C4E}"/>
+                <a16:creationId xmlns="" xmlns:a16="http://schemas.microsoft.com/office/drawing/2014/main" id="{2D72A2C9-F3CA-4216-8BAD-FA4C970C3C4E}"/>
               </a:ext>
               <a:ext uri="{C183D7F6-B498-43B3-948B-1728B52AA6E4}">
-                <adec:decorative xmlns:adec="http://schemas.microsoft.com/office/drawing/2017/decorative" xmlns="" val="1"/>
+                <adec:decorative xmlns="" xmlns:adec="http://schemas.microsoft.com/office/drawing/2017/decorative" val="1"/>
               </a:ext>
             </a:extLst>
           </p:cNvPr>
@@ -16882,7 +17502,7 @@
           <p:nvPr>
             <p:extLst>
               <p:ext uri="{386F3935-93C4-4BCD-93E2-E3B085C9AB24}">
-                <p16:designElem xmlns:p16="http://schemas.microsoft.com/office/powerpoint/2015/main" xmlns="" val="1"/>
+                <p16:designElem xmlns="" xmlns:p16="http://schemas.microsoft.com/office/powerpoint/2015/main" val="1"/>
               </p:ext>
             </p:extLst>
           </p:nvPr>
@@ -16924,7 +17544,7 @@
           <p:cNvPr id="8" name="Inhaltsplatzhalter 4">
             <a:extLst>
               <a:ext uri="{FF2B5EF4-FFF2-40B4-BE49-F238E27FC236}">
-                <a16:creationId xmlns:a16="http://schemas.microsoft.com/office/drawing/2014/main" xmlns="" id="{C28895E4-2A18-3F46-B985-F6164DBE329F}"/>
+                <a16:creationId xmlns="" xmlns:a16="http://schemas.microsoft.com/office/drawing/2014/main" id="{C28895E4-2A18-3F46-B985-F6164DBE329F}"/>
               </a:ext>
             </a:extLst>
           </p:cNvPr>
@@ -17052,7 +17672,7 @@
 </p:sld>
 </file>
 
-<file path=ppt/slides/slide33.xml><?xml version="1.0" encoding="utf-8"?>
+<file path=ppt/slides/slide34.xml><?xml version="1.0" encoding="utf-8"?>
 <p:sld xmlns:a="http://schemas.openxmlformats.org/drawingml/2006/main" xmlns:r="http://schemas.openxmlformats.org/officeDocument/2006/relationships" xmlns:p="http://schemas.openxmlformats.org/presentationml/2006/main">
   <p:cSld>
     <p:bg>
@@ -17082,10 +17702,10 @@
           <p:cNvPr id="7" name="Rectangle 6">
             <a:extLst>
               <a:ext uri="{FF2B5EF4-FFF2-40B4-BE49-F238E27FC236}">
-                <a16:creationId xmlns:a16="http://schemas.microsoft.com/office/drawing/2014/main" xmlns="" id="{6F9EB9F2-07E2-4D64-BBD8-BB5B217F1218}"/>
+                <a16:creationId xmlns="" xmlns:a16="http://schemas.microsoft.com/office/drawing/2014/main" id="{6F9EB9F2-07E2-4D64-BBD8-BB5B217F1218}"/>
               </a:ext>
               <a:ext uri="{C183D7F6-B498-43B3-948B-1728B52AA6E4}">
-                <adec:decorative xmlns:adec="http://schemas.microsoft.com/office/drawing/2017/decorative" xmlns="" val="1"/>
+                <adec:decorative xmlns="" xmlns:adec="http://schemas.microsoft.com/office/drawing/2017/decorative" val="1"/>
               </a:ext>
             </a:extLst>
           </p:cNvPr>
@@ -17095,7 +17715,7 @@
           <p:nvPr>
             <p:extLst>
               <p:ext uri="{386F3935-93C4-4BCD-93E2-E3B085C9AB24}">
-                <p16:designElem xmlns:p16="http://schemas.microsoft.com/office/powerpoint/2015/main" xmlns="" val="1"/>
+                <p16:designElem xmlns="" xmlns:p16="http://schemas.microsoft.com/office/powerpoint/2015/main" val="1"/>
               </p:ext>
             </p:extLst>
           </p:nvPr>
@@ -17147,7 +17767,7 @@
           <p:cNvPr id="2" name="Titel 1">
             <a:extLst>
               <a:ext uri="{FF2B5EF4-FFF2-40B4-BE49-F238E27FC236}">
-                <a16:creationId xmlns:a16="http://schemas.microsoft.com/office/drawing/2014/main" xmlns="" id="{8CCF408F-A9A7-BB42-8132-EB1552B49212}"/>
+                <a16:creationId xmlns="" xmlns:a16="http://schemas.microsoft.com/office/drawing/2014/main" id="{8CCF408F-A9A7-BB42-8132-EB1552B49212}"/>
               </a:ext>
             </a:extLst>
           </p:cNvPr>
@@ -17242,10 +17862,10 @@
           <p:cNvPr id="9" name="Straight Connector 8">
             <a:extLst>
               <a:ext uri="{FF2B5EF4-FFF2-40B4-BE49-F238E27FC236}">
-                <a16:creationId xmlns:a16="http://schemas.microsoft.com/office/drawing/2014/main" xmlns="" id="{F0C57C7C-DFE9-4A1E-B7A9-DF40E63366BB}"/>
+                <a16:creationId xmlns="" xmlns:a16="http://schemas.microsoft.com/office/drawing/2014/main" id="{F0C57C7C-DFE9-4A1E-B7A9-DF40E63366BB}"/>
               </a:ext>
               <a:ext uri="{C183D7F6-B498-43B3-948B-1728B52AA6E4}">
-                <adec:decorative xmlns:adec="http://schemas.microsoft.com/office/drawing/2017/decorative" xmlns="" val="1"/>
+                <adec:decorative xmlns="" xmlns:adec="http://schemas.microsoft.com/office/drawing/2017/decorative" val="1"/>
               </a:ext>
             </a:extLst>
           </p:cNvPr>
@@ -17255,7 +17875,7 @@
           <p:nvPr>
             <p:extLst>
               <p:ext uri="{386F3935-93C4-4BCD-93E2-E3B085C9AB24}">
-                <p16:designElem xmlns:p16="http://schemas.microsoft.com/office/powerpoint/2015/main" xmlns="" val="1"/>
+                <p16:designElem xmlns="" xmlns:p16="http://schemas.microsoft.com/office/powerpoint/2015/main" val="1"/>
               </p:ext>
             </p:extLst>
           </p:nvPr>
@@ -17342,10 +17962,10 @@
           <p:cNvPr id="19" name="Rectangle 18">
             <a:extLst>
               <a:ext uri="{FF2B5EF4-FFF2-40B4-BE49-F238E27FC236}">
-                <a16:creationId xmlns:a16="http://schemas.microsoft.com/office/drawing/2014/main" xmlns="" id="{8D70B121-56F4-4848-B38B-182089D909FA}"/>
+                <a16:creationId xmlns="" xmlns:a16="http://schemas.microsoft.com/office/drawing/2014/main" id="{8D70B121-56F4-4848-B38B-182089D909FA}"/>
               </a:ext>
               <a:ext uri="{C183D7F6-B498-43B3-948B-1728B52AA6E4}">
-                <adec:decorative xmlns:adec="http://schemas.microsoft.com/office/drawing/2017/decorative" xmlns="" val="1"/>
+                <adec:decorative xmlns="" xmlns:adec="http://schemas.microsoft.com/office/drawing/2017/decorative" val="1"/>
               </a:ext>
             </a:extLst>
           </p:cNvPr>
@@ -17355,7 +17975,7 @@
           <p:nvPr>
             <p:extLst>
               <p:ext uri="{386F3935-93C4-4BCD-93E2-E3B085C9AB24}">
-                <p16:designElem xmlns:p16="http://schemas.microsoft.com/office/powerpoint/2015/main" xmlns="" val="1"/>
+                <p16:designElem xmlns="" xmlns:p16="http://schemas.microsoft.com/office/powerpoint/2015/main" val="1"/>
               </p:ext>
             </p:extLst>
           </p:nvPr>
@@ -17436,10 +18056,10 @@
           <p:cNvPr id="21" name="Straight Connector 20">
             <a:extLst>
               <a:ext uri="{FF2B5EF4-FFF2-40B4-BE49-F238E27FC236}">
-                <a16:creationId xmlns:a16="http://schemas.microsoft.com/office/drawing/2014/main" xmlns="" id="{2D72A2C9-F3CA-4216-8BAD-FA4C970C3C4E}"/>
+                <a16:creationId xmlns="" xmlns:a16="http://schemas.microsoft.com/office/drawing/2014/main" id="{2D72A2C9-F3CA-4216-8BAD-FA4C970C3C4E}"/>
               </a:ext>
               <a:ext uri="{C183D7F6-B498-43B3-948B-1728B52AA6E4}">
-                <adec:decorative xmlns:adec="http://schemas.microsoft.com/office/drawing/2017/decorative" xmlns="" val="1"/>
+                <adec:decorative xmlns="" xmlns:adec="http://schemas.microsoft.com/office/drawing/2017/decorative" val="1"/>
               </a:ext>
             </a:extLst>
           </p:cNvPr>
@@ -17449,7 +18069,7 @@
           <p:nvPr>
             <p:extLst>
               <p:ext uri="{386F3935-93C4-4BCD-93E2-E3B085C9AB24}">
-                <p16:designElem xmlns:p16="http://schemas.microsoft.com/office/powerpoint/2015/main" xmlns="" val="1"/>
+                <p16:designElem xmlns="" xmlns:p16="http://schemas.microsoft.com/office/powerpoint/2015/main" val="1"/>
               </p:ext>
             </p:extLst>
           </p:nvPr>
@@ -17491,7 +18111,7 @@
           <p:cNvPr id="5" name="Rechteck 4">
             <a:extLst>
               <a:ext uri="{FF2B5EF4-FFF2-40B4-BE49-F238E27FC236}">
-                <a16:creationId xmlns:a16="http://schemas.microsoft.com/office/drawing/2014/main" xmlns="" id="{6C91387F-AF56-614F-B14F-5E345367B7AF}"/>
+                <a16:creationId xmlns="" xmlns:a16="http://schemas.microsoft.com/office/drawing/2014/main" id="{6C91387F-AF56-614F-B14F-5E345367B7AF}"/>
               </a:ext>
             </a:extLst>
           </p:cNvPr>
@@ -17572,7 +18192,7 @@
           <p:cNvPr id="2" name="Titel 1">
             <a:extLst>
               <a:ext uri="{FF2B5EF4-FFF2-40B4-BE49-F238E27FC236}">
-                <a16:creationId xmlns:a16="http://schemas.microsoft.com/office/drawing/2014/main" xmlns="" id="{35BFDC70-A169-E142-B051-5ABC9190E094}"/>
+                <a16:creationId xmlns="" xmlns:a16="http://schemas.microsoft.com/office/drawing/2014/main" id="{35BFDC70-A169-E142-B051-5ABC9190E094}"/>
               </a:ext>
             </a:extLst>
           </p:cNvPr>
@@ -17612,7 +18232,7 @@
           <p:cNvPr id="6" name="Rechteck 5">
             <a:extLst>
               <a:ext uri="{FF2B5EF4-FFF2-40B4-BE49-F238E27FC236}">
-                <a16:creationId xmlns:a16="http://schemas.microsoft.com/office/drawing/2014/main" xmlns="" id="{B21205B6-3884-4AD1-996C-39D66F295553}"/>
+                <a16:creationId xmlns="" xmlns:a16="http://schemas.microsoft.com/office/drawing/2014/main" id="{B21205B6-3884-4AD1-996C-39D66F295553}"/>
               </a:ext>
             </a:extLst>
           </p:cNvPr>
@@ -17693,7 +18313,7 @@
           <p:cNvPr id="7" name="Grafik 6">
             <a:extLst>
               <a:ext uri="{FF2B5EF4-FFF2-40B4-BE49-F238E27FC236}">
-                <a16:creationId xmlns:a16="http://schemas.microsoft.com/office/drawing/2014/main" xmlns="" id="{D878A5C2-A8AA-4358-9003-B99120CDFE3F}"/>
+                <a16:creationId xmlns="" xmlns:a16="http://schemas.microsoft.com/office/drawing/2014/main" id="{D878A5C2-A8AA-4358-9003-B99120CDFE3F}"/>
               </a:ext>
             </a:extLst>
           </p:cNvPr>
@@ -17768,10 +18388,10 @@
           <p:cNvPr id="8" name="Rectangle 7">
             <a:extLst>
               <a:ext uri="{FF2B5EF4-FFF2-40B4-BE49-F238E27FC236}">
-                <a16:creationId xmlns:a16="http://schemas.microsoft.com/office/drawing/2014/main" xmlns="" id="{8D70B121-56F4-4848-B38B-182089D909FA}"/>
+                <a16:creationId xmlns="" xmlns:a16="http://schemas.microsoft.com/office/drawing/2014/main" id="{8D70B121-56F4-4848-B38B-182089D909FA}"/>
               </a:ext>
               <a:ext uri="{C183D7F6-B498-43B3-948B-1728B52AA6E4}">
-                <adec:decorative xmlns:adec="http://schemas.microsoft.com/office/drawing/2017/decorative" xmlns="" val="1"/>
+                <adec:decorative xmlns="" xmlns:adec="http://schemas.microsoft.com/office/drawing/2017/decorative" val="1"/>
               </a:ext>
             </a:extLst>
           </p:cNvPr>
@@ -17781,7 +18401,7 @@
           <p:nvPr>
             <p:extLst>
               <p:ext uri="{386F3935-93C4-4BCD-93E2-E3B085C9AB24}">
-                <p16:designElem xmlns:p16="http://schemas.microsoft.com/office/powerpoint/2015/main" xmlns="" val="1"/>
+                <p16:designElem xmlns="" xmlns:p16="http://schemas.microsoft.com/office/powerpoint/2015/main" val="1"/>
               </p:ext>
             </p:extLst>
           </p:nvPr>
@@ -17833,7 +18453,7 @@
           <p:cNvPr id="2" name="Titel 1">
             <a:extLst>
               <a:ext uri="{FF2B5EF4-FFF2-40B4-BE49-F238E27FC236}">
-                <a16:creationId xmlns:a16="http://schemas.microsoft.com/office/drawing/2014/main" xmlns="" id="{0B5D0F8F-C92F-BC46-ACC4-7A21698DD272}"/>
+                <a16:creationId xmlns="" xmlns:a16="http://schemas.microsoft.com/office/drawing/2014/main" id="{0B5D0F8F-C92F-BC46-ACC4-7A21698DD272}"/>
               </a:ext>
             </a:extLst>
           </p:cNvPr>
@@ -17873,10 +18493,10 @@
           <p:cNvPr id="10" name="Straight Connector 9">
             <a:extLst>
               <a:ext uri="{FF2B5EF4-FFF2-40B4-BE49-F238E27FC236}">
-                <a16:creationId xmlns:a16="http://schemas.microsoft.com/office/drawing/2014/main" xmlns="" id="{2D72A2C9-F3CA-4216-8BAD-FA4C970C3C4E}"/>
+                <a16:creationId xmlns="" xmlns:a16="http://schemas.microsoft.com/office/drawing/2014/main" id="{2D72A2C9-F3CA-4216-8BAD-FA4C970C3C4E}"/>
               </a:ext>
               <a:ext uri="{C183D7F6-B498-43B3-948B-1728B52AA6E4}">
-                <adec:decorative xmlns:adec="http://schemas.microsoft.com/office/drawing/2017/decorative" xmlns="" val="1"/>
+                <adec:decorative xmlns="" xmlns:adec="http://schemas.microsoft.com/office/drawing/2017/decorative" val="1"/>
               </a:ext>
             </a:extLst>
           </p:cNvPr>
@@ -17886,7 +18506,7 @@
           <p:nvPr>
             <p:extLst>
               <p:ext uri="{386F3935-93C4-4BCD-93E2-E3B085C9AB24}">
-                <p16:designElem xmlns:p16="http://schemas.microsoft.com/office/powerpoint/2015/main" xmlns="" val="1"/>
+                <p16:designElem xmlns="" xmlns:p16="http://schemas.microsoft.com/office/powerpoint/2015/main" val="1"/>
               </p:ext>
             </p:extLst>
           </p:nvPr>
@@ -17924,7 +18544,7 @@
         </p:style>
       </p:cxnSp>
       <mc:AlternateContent xmlns:mc="http://schemas.openxmlformats.org/markup-compatibility/2006">
-        <mc:Choice xmlns:pslz="http://schemas.microsoft.com/office/powerpoint/2016/slidezoom" xmlns="" Requires="pslz">
+        <mc:Choice xmlns="" xmlns:pslz="http://schemas.microsoft.com/office/powerpoint/2016/slidezoom" Requires="pslz">
           <p:graphicFrame>
             <p:nvGraphicFramePr>
               <p:cNvPr id="7" name="Folienzoom 6">
@@ -17988,7 +18608,7 @@
                 <a:hlinkClick r:id="rId4" action="ppaction://hlinksldjump"/>
                 <a:extLst>
                   <a:ext uri="{FF2B5EF4-FFF2-40B4-BE49-F238E27FC236}">
-                    <a16:creationId xmlns:a16="http://schemas.microsoft.com/office/drawing/2014/main" xmlns="" xmlns:pslz="http://schemas.microsoft.com/office/powerpoint/2016/slidezoom" id="{6938BB69-754F-2F4B-94EF-34BD069095AD}"/>
+                    <a16:creationId xmlns:pslz="http://schemas.microsoft.com/office/powerpoint/2016/slidezoom" xmlns="" xmlns:a16="http://schemas.microsoft.com/office/drawing/2014/main" id="{6938BB69-754F-2F4B-94EF-34BD069095AD}"/>
                   </a:ext>
                 </a:extLst>
               </p:cNvPr>
@@ -18070,10 +18690,10 @@
           <p:cNvPr id="8" name="Rectangle 7">
             <a:extLst>
               <a:ext uri="{FF2B5EF4-FFF2-40B4-BE49-F238E27FC236}">
-                <a16:creationId xmlns:a16="http://schemas.microsoft.com/office/drawing/2014/main" xmlns="" id="{8D70B121-56F4-4848-B38B-182089D909FA}"/>
+                <a16:creationId xmlns="" xmlns:a16="http://schemas.microsoft.com/office/drawing/2014/main" id="{8D70B121-56F4-4848-B38B-182089D909FA}"/>
               </a:ext>
               <a:ext uri="{C183D7F6-B498-43B3-948B-1728B52AA6E4}">
-                <adec:decorative xmlns:adec="http://schemas.microsoft.com/office/drawing/2017/decorative" xmlns="" val="1"/>
+                <adec:decorative xmlns="" xmlns:adec="http://schemas.microsoft.com/office/drawing/2017/decorative" val="1"/>
               </a:ext>
             </a:extLst>
           </p:cNvPr>
@@ -18083,7 +18703,7 @@
           <p:nvPr>
             <p:extLst>
               <p:ext uri="{386F3935-93C4-4BCD-93E2-E3B085C9AB24}">
-                <p16:designElem xmlns:p16="http://schemas.microsoft.com/office/powerpoint/2015/main" xmlns="" val="1"/>
+                <p16:designElem xmlns="" xmlns:p16="http://schemas.microsoft.com/office/powerpoint/2015/main" val="1"/>
               </p:ext>
             </p:extLst>
           </p:nvPr>
@@ -18135,10 +18755,10 @@
           <p:cNvPr id="10" name="Straight Connector 9">
             <a:extLst>
               <a:ext uri="{FF2B5EF4-FFF2-40B4-BE49-F238E27FC236}">
-                <a16:creationId xmlns:a16="http://schemas.microsoft.com/office/drawing/2014/main" xmlns="" id="{2D72A2C9-F3CA-4216-8BAD-FA4C970C3C4E}"/>
+                <a16:creationId xmlns="" xmlns:a16="http://schemas.microsoft.com/office/drawing/2014/main" id="{2D72A2C9-F3CA-4216-8BAD-FA4C970C3C4E}"/>
               </a:ext>
               <a:ext uri="{C183D7F6-B498-43B3-948B-1728B52AA6E4}">
-                <adec:decorative xmlns:adec="http://schemas.microsoft.com/office/drawing/2017/decorative" xmlns="" val="1"/>
+                <adec:decorative xmlns="" xmlns:adec="http://schemas.microsoft.com/office/drawing/2017/decorative" val="1"/>
               </a:ext>
             </a:extLst>
           </p:cNvPr>
@@ -18148,7 +18768,7 @@
           <p:nvPr>
             <p:extLst>
               <p:ext uri="{386F3935-93C4-4BCD-93E2-E3B085C9AB24}">
-                <p16:designElem xmlns:p16="http://schemas.microsoft.com/office/powerpoint/2015/main" xmlns="" val="1"/>
+                <p16:designElem xmlns="" xmlns:p16="http://schemas.microsoft.com/office/powerpoint/2015/main" val="1"/>
               </p:ext>
             </p:extLst>
           </p:nvPr>
@@ -18190,7 +18810,7 @@
           <p:cNvPr id="20" name="Textfeld 19">
             <a:extLst>
               <a:ext uri="{FF2B5EF4-FFF2-40B4-BE49-F238E27FC236}">
-                <a16:creationId xmlns:a16="http://schemas.microsoft.com/office/drawing/2014/main" xmlns="" id="{22318D91-F3FB-1D4F-8CA1-574E5C5A021C}"/>
+                <a16:creationId xmlns="" xmlns:a16="http://schemas.microsoft.com/office/drawing/2014/main" id="{22318D91-F3FB-1D4F-8CA1-574E5C5A021C}"/>
               </a:ext>
             </a:extLst>
           </p:cNvPr>
@@ -18242,7 +18862,7 @@
           <p:cNvPr id="21" name="Grafik 20">
             <a:extLst>
               <a:ext uri="{FF2B5EF4-FFF2-40B4-BE49-F238E27FC236}">
-                <a16:creationId xmlns:a16="http://schemas.microsoft.com/office/drawing/2014/main" xmlns="" id="{5ACE5D07-54C6-4407-8C9E-551B71135727}"/>
+                <a16:creationId xmlns="" xmlns:a16="http://schemas.microsoft.com/office/drawing/2014/main" id="{5ACE5D07-54C6-4407-8C9E-551B71135727}"/>
               </a:ext>
             </a:extLst>
           </p:cNvPr>
@@ -18317,10 +18937,10 @@
           <p:cNvPr id="19" name="Rectangle 18">
             <a:extLst>
               <a:ext uri="{FF2B5EF4-FFF2-40B4-BE49-F238E27FC236}">
-                <a16:creationId xmlns:a16="http://schemas.microsoft.com/office/drawing/2014/main" xmlns="" id="{8D70B121-56F4-4848-B38B-182089D909FA}"/>
+                <a16:creationId xmlns="" xmlns:a16="http://schemas.microsoft.com/office/drawing/2014/main" id="{8D70B121-56F4-4848-B38B-182089D909FA}"/>
               </a:ext>
               <a:ext uri="{C183D7F6-B498-43B3-948B-1728B52AA6E4}">
-                <adec:decorative xmlns:adec="http://schemas.microsoft.com/office/drawing/2017/decorative" xmlns="" val="1"/>
+                <adec:decorative xmlns="" xmlns:adec="http://schemas.microsoft.com/office/drawing/2017/decorative" val="1"/>
               </a:ext>
             </a:extLst>
           </p:cNvPr>
@@ -18330,7 +18950,7 @@
           <p:nvPr>
             <p:extLst>
               <p:ext uri="{386F3935-93C4-4BCD-93E2-E3B085C9AB24}">
-                <p16:designElem xmlns:p16="http://schemas.microsoft.com/office/powerpoint/2015/main" xmlns="" val="1"/>
+                <p16:designElem xmlns="" xmlns:p16="http://schemas.microsoft.com/office/powerpoint/2015/main" val="1"/>
               </p:ext>
             </p:extLst>
           </p:nvPr>
@@ -18382,7 +19002,7 @@
           <p:cNvPr id="2" name="Titel 1">
             <a:extLst>
               <a:ext uri="{FF2B5EF4-FFF2-40B4-BE49-F238E27FC236}">
-                <a16:creationId xmlns:a16="http://schemas.microsoft.com/office/drawing/2014/main" xmlns="" id="{35BFDC70-A169-E142-B051-5ABC9190E094}"/>
+                <a16:creationId xmlns="" xmlns:a16="http://schemas.microsoft.com/office/drawing/2014/main" id="{35BFDC70-A169-E142-B051-5ABC9190E094}"/>
               </a:ext>
             </a:extLst>
           </p:cNvPr>
@@ -18472,10 +19092,10 @@
           <p:cNvPr id="21" name="Straight Connector 20">
             <a:extLst>
               <a:ext uri="{FF2B5EF4-FFF2-40B4-BE49-F238E27FC236}">
-                <a16:creationId xmlns:a16="http://schemas.microsoft.com/office/drawing/2014/main" xmlns="" id="{2D72A2C9-F3CA-4216-8BAD-FA4C970C3C4E}"/>
+                <a16:creationId xmlns="" xmlns:a16="http://schemas.microsoft.com/office/drawing/2014/main" id="{2D72A2C9-F3CA-4216-8BAD-FA4C970C3C4E}"/>
               </a:ext>
               <a:ext uri="{C183D7F6-B498-43B3-948B-1728B52AA6E4}">
-                <adec:decorative xmlns:adec="http://schemas.microsoft.com/office/drawing/2017/decorative" xmlns="" val="1"/>
+                <adec:decorative xmlns="" xmlns:adec="http://schemas.microsoft.com/office/drawing/2017/decorative" val="1"/>
               </a:ext>
             </a:extLst>
           </p:cNvPr>
@@ -18485,7 +19105,7 @@
           <p:nvPr>
             <p:extLst>
               <p:ext uri="{386F3935-93C4-4BCD-93E2-E3B085C9AB24}">
-                <p16:designElem xmlns:p16="http://schemas.microsoft.com/office/powerpoint/2015/main" xmlns="" val="1"/>
+                <p16:designElem xmlns="" xmlns:p16="http://schemas.microsoft.com/office/powerpoint/2015/main" val="1"/>
               </p:ext>
             </p:extLst>
           </p:nvPr>
@@ -18527,7 +19147,7 @@
           <p:cNvPr id="14" name="Inhaltsplatzhalter 2">
             <a:extLst>
               <a:ext uri="{FF2B5EF4-FFF2-40B4-BE49-F238E27FC236}">
-                <a16:creationId xmlns:a16="http://schemas.microsoft.com/office/drawing/2014/main" xmlns="" id="{53B37B3D-655D-0342-AF1C-93DFDD28CF29}"/>
+                <a16:creationId xmlns="" xmlns:a16="http://schemas.microsoft.com/office/drawing/2014/main" id="{53B37B3D-655D-0342-AF1C-93DFDD28CF29}"/>
               </a:ext>
             </a:extLst>
           </p:cNvPr>
@@ -18658,10 +19278,10 @@
           <p:cNvPr id="19" name="Rectangle 18">
             <a:extLst>
               <a:ext uri="{FF2B5EF4-FFF2-40B4-BE49-F238E27FC236}">
-                <a16:creationId xmlns:a16="http://schemas.microsoft.com/office/drawing/2014/main" xmlns="" id="{8D70B121-56F4-4848-B38B-182089D909FA}"/>
+                <a16:creationId xmlns="" xmlns:a16="http://schemas.microsoft.com/office/drawing/2014/main" id="{8D70B121-56F4-4848-B38B-182089D909FA}"/>
               </a:ext>
               <a:ext uri="{C183D7F6-B498-43B3-948B-1728B52AA6E4}">
-                <adec:decorative xmlns:adec="http://schemas.microsoft.com/office/drawing/2017/decorative" xmlns="" val="1"/>
+                <adec:decorative xmlns="" xmlns:adec="http://schemas.microsoft.com/office/drawing/2017/decorative" val="1"/>
               </a:ext>
             </a:extLst>
           </p:cNvPr>
@@ -18671,7 +19291,7 @@
           <p:nvPr>
             <p:extLst>
               <p:ext uri="{386F3935-93C4-4BCD-93E2-E3B085C9AB24}">
-                <p16:designElem xmlns:p16="http://schemas.microsoft.com/office/powerpoint/2015/main" xmlns="" val="1"/>
+                <p16:designElem xmlns="" xmlns:p16="http://schemas.microsoft.com/office/powerpoint/2015/main" val="1"/>
               </p:ext>
             </p:extLst>
           </p:nvPr>
@@ -18723,10 +19343,10 @@
           <p:cNvPr id="21" name="Straight Connector 20">
             <a:extLst>
               <a:ext uri="{FF2B5EF4-FFF2-40B4-BE49-F238E27FC236}">
-                <a16:creationId xmlns:a16="http://schemas.microsoft.com/office/drawing/2014/main" xmlns="" id="{2D72A2C9-F3CA-4216-8BAD-FA4C970C3C4E}"/>
+                <a16:creationId xmlns="" xmlns:a16="http://schemas.microsoft.com/office/drawing/2014/main" id="{2D72A2C9-F3CA-4216-8BAD-FA4C970C3C4E}"/>
               </a:ext>
               <a:ext uri="{C183D7F6-B498-43B3-948B-1728B52AA6E4}">
-                <adec:decorative xmlns:adec="http://schemas.microsoft.com/office/drawing/2017/decorative" xmlns="" val="1"/>
+                <adec:decorative xmlns="" xmlns:adec="http://schemas.microsoft.com/office/drawing/2017/decorative" val="1"/>
               </a:ext>
             </a:extLst>
           </p:cNvPr>
@@ -18736,7 +19356,7 @@
           <p:nvPr>
             <p:extLst>
               <p:ext uri="{386F3935-93C4-4BCD-93E2-E3B085C9AB24}">
-                <p16:designElem xmlns:p16="http://schemas.microsoft.com/office/powerpoint/2015/main" xmlns="" val="1"/>
+                <p16:designElem xmlns="" xmlns:p16="http://schemas.microsoft.com/office/powerpoint/2015/main" val="1"/>
               </p:ext>
             </p:extLst>
           </p:nvPr>
@@ -18778,7 +19398,7 @@
           <p:cNvPr id="14" name="Inhaltsplatzhalter 2">
             <a:extLst>
               <a:ext uri="{FF2B5EF4-FFF2-40B4-BE49-F238E27FC236}">
-                <a16:creationId xmlns:a16="http://schemas.microsoft.com/office/drawing/2014/main" xmlns="" id="{53B37B3D-655D-0342-AF1C-93DFDD28CF29}"/>
+                <a16:creationId xmlns="" xmlns:a16="http://schemas.microsoft.com/office/drawing/2014/main" id="{53B37B3D-655D-0342-AF1C-93DFDD28CF29}"/>
               </a:ext>
             </a:extLst>
           </p:cNvPr>
@@ -18992,7 +19612,7 @@
           <p:cNvPr id="20" name="Gruppieren 19">
             <a:extLst>
               <a:ext uri="{FF2B5EF4-FFF2-40B4-BE49-F238E27FC236}">
-                <a16:creationId xmlns:a16="http://schemas.microsoft.com/office/drawing/2014/main" xmlns="" id="{50ECC846-FE00-5642-8853-EEE6E8A01659}"/>
+                <a16:creationId xmlns="" xmlns:a16="http://schemas.microsoft.com/office/drawing/2014/main" id="{50ECC846-FE00-5642-8853-EEE6E8A01659}"/>
               </a:ext>
             </a:extLst>
           </p:cNvPr>
@@ -19012,7 +19632,7 @@
             <p:cNvPr id="22" name="Grafik 21">
               <a:extLst>
                 <a:ext uri="{FF2B5EF4-FFF2-40B4-BE49-F238E27FC236}">
-                  <a16:creationId xmlns:a16="http://schemas.microsoft.com/office/drawing/2014/main" xmlns="" id="{4E6774A5-9359-5A4C-9D07-47945BA0A9B3}"/>
+                  <a16:creationId xmlns="" xmlns:a16="http://schemas.microsoft.com/office/drawing/2014/main" id="{4E6774A5-9359-5A4C-9D07-47945BA0A9B3}"/>
                 </a:ext>
               </a:extLst>
             </p:cNvPr>
@@ -19042,7 +19662,7 @@
             <p:cNvPr id="23" name="Dreieck 22">
               <a:extLst>
                 <a:ext uri="{FF2B5EF4-FFF2-40B4-BE49-F238E27FC236}">
-                  <a16:creationId xmlns:a16="http://schemas.microsoft.com/office/drawing/2014/main" xmlns="" id="{C58FCFF5-FFE5-1240-AE4D-8FE755FB7696}"/>
+                  <a16:creationId xmlns="" xmlns:a16="http://schemas.microsoft.com/office/drawing/2014/main" id="{C58FCFF5-FFE5-1240-AE4D-8FE755FB7696}"/>
                 </a:ext>
               </a:extLst>
             </p:cNvPr>
@@ -19088,7 +19708,7 @@
             <p:cNvPr id="24" name="Dreieck 23">
               <a:extLst>
                 <a:ext uri="{FF2B5EF4-FFF2-40B4-BE49-F238E27FC236}">
-                  <a16:creationId xmlns:a16="http://schemas.microsoft.com/office/drawing/2014/main" xmlns="" id="{45F58FCA-1036-9842-AC1B-581E8445154F}"/>
+                  <a16:creationId xmlns="" xmlns:a16="http://schemas.microsoft.com/office/drawing/2014/main" id="{45F58FCA-1036-9842-AC1B-581E8445154F}"/>
                 </a:ext>
               </a:extLst>
             </p:cNvPr>
@@ -19134,7 +19754,7 @@
             <p:cNvPr id="25" name="Dreieck 24">
               <a:extLst>
                 <a:ext uri="{FF2B5EF4-FFF2-40B4-BE49-F238E27FC236}">
-                  <a16:creationId xmlns:a16="http://schemas.microsoft.com/office/drawing/2014/main" xmlns="" id="{F32A8848-A721-984F-933E-9E9622B747AD}"/>
+                  <a16:creationId xmlns="" xmlns:a16="http://schemas.microsoft.com/office/drawing/2014/main" id="{F32A8848-A721-984F-933E-9E9622B747AD}"/>
                 </a:ext>
               </a:extLst>
             </p:cNvPr>
@@ -19180,7 +19800,7 @@
             <p:cNvPr id="26" name="Dreieck 25">
               <a:extLst>
                 <a:ext uri="{FF2B5EF4-FFF2-40B4-BE49-F238E27FC236}">
-                  <a16:creationId xmlns:a16="http://schemas.microsoft.com/office/drawing/2014/main" xmlns="" id="{80771BCA-609E-164A-B463-F6A1D4A2CEAE}"/>
+                  <a16:creationId xmlns="" xmlns:a16="http://schemas.microsoft.com/office/drawing/2014/main" id="{80771BCA-609E-164A-B463-F6A1D4A2CEAE}"/>
                 </a:ext>
               </a:extLst>
             </p:cNvPr>
@@ -19226,7 +19846,7 @@
             <p:cNvPr id="27" name="Dreieck 26">
               <a:extLst>
                 <a:ext uri="{FF2B5EF4-FFF2-40B4-BE49-F238E27FC236}">
-                  <a16:creationId xmlns:a16="http://schemas.microsoft.com/office/drawing/2014/main" xmlns="" id="{D74FB55B-722F-AF4E-B788-08B063B85B99}"/>
+                  <a16:creationId xmlns="" xmlns:a16="http://schemas.microsoft.com/office/drawing/2014/main" id="{D74FB55B-722F-AF4E-B788-08B063B85B99}"/>
                 </a:ext>
               </a:extLst>
             </p:cNvPr>
@@ -19272,7 +19892,7 @@
             <p:cNvPr id="28" name="Dreieck 27">
               <a:extLst>
                 <a:ext uri="{FF2B5EF4-FFF2-40B4-BE49-F238E27FC236}">
-                  <a16:creationId xmlns:a16="http://schemas.microsoft.com/office/drawing/2014/main" xmlns="" id="{E28615C0-4C02-CA41-ABCF-97C87E10A370}"/>
+                  <a16:creationId xmlns="" xmlns:a16="http://schemas.microsoft.com/office/drawing/2014/main" id="{E28615C0-4C02-CA41-ABCF-97C87E10A370}"/>
                 </a:ext>
               </a:extLst>
             </p:cNvPr>
@@ -19318,7 +19938,7 @@
             <p:cNvPr id="29" name="Dreieck 28">
               <a:extLst>
                 <a:ext uri="{FF2B5EF4-FFF2-40B4-BE49-F238E27FC236}">
-                  <a16:creationId xmlns:a16="http://schemas.microsoft.com/office/drawing/2014/main" xmlns="" id="{FBA1CE75-BDA7-5541-B332-841CA5A0F3D8}"/>
+                  <a16:creationId xmlns="" xmlns:a16="http://schemas.microsoft.com/office/drawing/2014/main" id="{FBA1CE75-BDA7-5541-B332-841CA5A0F3D8}"/>
                 </a:ext>
               </a:extLst>
             </p:cNvPr>
@@ -19364,7 +19984,7 @@
             <p:cNvPr id="30" name="Dreieck 29">
               <a:extLst>
                 <a:ext uri="{FF2B5EF4-FFF2-40B4-BE49-F238E27FC236}">
-                  <a16:creationId xmlns:a16="http://schemas.microsoft.com/office/drawing/2014/main" xmlns="" id="{54C42A26-F415-894B-B37F-08315630F5A1}"/>
+                  <a16:creationId xmlns="" xmlns:a16="http://schemas.microsoft.com/office/drawing/2014/main" id="{54C42A26-F415-894B-B37F-08315630F5A1}"/>
                 </a:ext>
               </a:extLst>
             </p:cNvPr>
@@ -19456,10 +20076,10 @@
           <p:cNvPr id="8" name="Rectangle 7">
             <a:extLst>
               <a:ext uri="{FF2B5EF4-FFF2-40B4-BE49-F238E27FC236}">
-                <a16:creationId xmlns:a16="http://schemas.microsoft.com/office/drawing/2014/main" xmlns="" id="{8D70B121-56F4-4848-B38B-182089D909FA}"/>
+                <a16:creationId xmlns="" xmlns:a16="http://schemas.microsoft.com/office/drawing/2014/main" id="{8D70B121-56F4-4848-B38B-182089D909FA}"/>
               </a:ext>
               <a:ext uri="{C183D7F6-B498-43B3-948B-1728B52AA6E4}">
-                <adec:decorative xmlns:adec="http://schemas.microsoft.com/office/drawing/2017/decorative" xmlns="" val="1"/>
+                <adec:decorative xmlns="" xmlns:adec="http://schemas.microsoft.com/office/drawing/2017/decorative" val="1"/>
               </a:ext>
             </a:extLst>
           </p:cNvPr>
@@ -19469,7 +20089,7 @@
           <p:nvPr>
             <p:extLst>
               <p:ext uri="{386F3935-93C4-4BCD-93E2-E3B085C9AB24}">
-                <p16:designElem xmlns:p16="http://schemas.microsoft.com/office/powerpoint/2015/main" xmlns="" val="1"/>
+                <p16:designElem xmlns="" xmlns:p16="http://schemas.microsoft.com/office/powerpoint/2015/main" val="1"/>
               </p:ext>
             </p:extLst>
           </p:nvPr>
@@ -19521,7 +20141,7 @@
           <p:cNvPr id="2" name="Titel 1">
             <a:extLst>
               <a:ext uri="{FF2B5EF4-FFF2-40B4-BE49-F238E27FC236}">
-                <a16:creationId xmlns:a16="http://schemas.microsoft.com/office/drawing/2014/main" xmlns="" id="{0B5D0F8F-C92F-BC46-ACC4-7A21698DD272}"/>
+                <a16:creationId xmlns="" xmlns:a16="http://schemas.microsoft.com/office/drawing/2014/main" id="{0B5D0F8F-C92F-BC46-ACC4-7A21698DD272}"/>
               </a:ext>
             </a:extLst>
           </p:cNvPr>
@@ -19561,10 +20181,10 @@
           <p:cNvPr id="10" name="Straight Connector 9">
             <a:extLst>
               <a:ext uri="{FF2B5EF4-FFF2-40B4-BE49-F238E27FC236}">
-                <a16:creationId xmlns:a16="http://schemas.microsoft.com/office/drawing/2014/main" xmlns="" id="{2D72A2C9-F3CA-4216-8BAD-FA4C970C3C4E}"/>
+                <a16:creationId xmlns="" xmlns:a16="http://schemas.microsoft.com/office/drawing/2014/main" id="{2D72A2C9-F3CA-4216-8BAD-FA4C970C3C4E}"/>
               </a:ext>
               <a:ext uri="{C183D7F6-B498-43B3-948B-1728B52AA6E4}">
-                <adec:decorative xmlns:adec="http://schemas.microsoft.com/office/drawing/2017/decorative" xmlns="" val="1"/>
+                <adec:decorative xmlns="" xmlns:adec="http://schemas.microsoft.com/office/drawing/2017/decorative" val="1"/>
               </a:ext>
             </a:extLst>
           </p:cNvPr>
@@ -19574,7 +20194,7 @@
           <p:nvPr>
             <p:extLst>
               <p:ext uri="{386F3935-93C4-4BCD-93E2-E3B085C9AB24}">
-                <p16:designElem xmlns:p16="http://schemas.microsoft.com/office/powerpoint/2015/main" xmlns="" val="1"/>
+                <p16:designElem xmlns="" xmlns:p16="http://schemas.microsoft.com/office/powerpoint/2015/main" val="1"/>
               </p:ext>
             </p:extLst>
           </p:nvPr>
@@ -19616,7 +20236,7 @@
           <p:cNvPr id="3" name="Inhaltsplatzhalter 2">
             <a:extLst>
               <a:ext uri="{FF2B5EF4-FFF2-40B4-BE49-F238E27FC236}">
-                <a16:creationId xmlns:a16="http://schemas.microsoft.com/office/drawing/2014/main" xmlns="" id="{692C889E-3E0C-9E40-9512-4230892B2B42}"/>
+                <a16:creationId xmlns="" xmlns:a16="http://schemas.microsoft.com/office/drawing/2014/main" id="{692C889E-3E0C-9E40-9512-4230892B2B42}"/>
               </a:ext>
             </a:extLst>
           </p:cNvPr>

</xml_diff>